<commit_message>
Aula 03 - Fluxogramas e Exercícios
</commit_message>
<xml_diff>
--- a/LP-Aula-03 - Fluxogramas.pptx
+++ b/LP-Aula-03 - Fluxogramas.pptx
@@ -5,7 +5,7 @@
     <p:sldMasterId id="2147483672" r:id="rId1"/>
   </p:sldMasterIdLst>
   <p:notesMasterIdLst>
-    <p:notesMasterId r:id="rId25"/>
+    <p:notesMasterId r:id="rId28"/>
   </p:notesMasterIdLst>
   <p:sldIdLst>
     <p:sldId id="256" r:id="rId2"/>
@@ -27,10 +27,13 @@
     <p:sldId id="293" r:id="rId18"/>
     <p:sldId id="294" r:id="rId19"/>
     <p:sldId id="281" r:id="rId20"/>
-    <p:sldId id="282" r:id="rId21"/>
-    <p:sldId id="289" r:id="rId22"/>
-    <p:sldId id="291" r:id="rId23"/>
-    <p:sldId id="292" r:id="rId24"/>
+    <p:sldId id="295" r:id="rId21"/>
+    <p:sldId id="296" r:id="rId22"/>
+    <p:sldId id="297" r:id="rId23"/>
+    <p:sldId id="298" r:id="rId24"/>
+    <p:sldId id="299" r:id="rId25"/>
+    <p:sldId id="300" r:id="rId26"/>
+    <p:sldId id="301" r:id="rId27"/>
   </p:sldIdLst>
   <p:sldSz cx="9144000" cy="6858000" type="screen4x3"/>
   <p:notesSz cx="6858000" cy="9144000"/>
@@ -8889,33 +8892,41 @@
         </p:nvSpPr>
         <p:spPr>
           <a:xfrm>
-            <a:off x="836799" y="2222287"/>
-            <a:ext cx="7475214" cy="3636511"/>
+            <a:off x="607500" y="1988840"/>
+            <a:ext cx="7928998" cy="4225693"/>
           </a:xfrm>
           <a:effectLst/>
         </p:spPr>
         <p:txBody>
           <a:bodyPr>
-            <a:normAutofit/>
+            <a:noAutofit/>
           </a:bodyPr>
           <a:lstStyle/>
           <a:p>
             <a:pPr>
               <a:lnSpc>
-                <a:spcPct val="90000"/>
+                <a:spcPct val="150000"/>
               </a:lnSpc>
             </a:pPr>
             <a:r>
-              <a:rPr lang="pt-BR" sz="1300" b="1" dirty="0"/>
-              <a:t>Exercícios (faça o diagrama de blocos no VISIO e depois os pseudocódigos no </a:t>
-            </a:r>
-            <a:r>
-              <a:rPr lang="pt-BR" sz="1300" b="1" dirty="0" err="1"/>
-              <a:t>VisualG</a:t>
-            </a:r>
-            <a:r>
-              <a:rPr lang="pt-BR" sz="1300" b="1" dirty="0"/>
-              <a:t>, faça também o teste de mesa de todos os exercícios)</a:t>
+              <a:rPr lang="pt-BR" sz="1600" b="1" dirty="0"/>
+              <a:t>Exercícios (faça o </a:t>
+            </a:r>
+            <a:r>
+              <a:rPr lang="pt-BR" sz="1600" b="1" dirty="0" smtClean="0"/>
+              <a:t>FLUXOGRAMA </a:t>
+            </a:r>
+            <a:r>
+              <a:rPr lang="pt-BR" sz="1600" b="1" dirty="0"/>
+              <a:t>e depois os </a:t>
+            </a:r>
+            <a:r>
+              <a:rPr lang="pt-BR" sz="1600" b="1" dirty="0" smtClean="0"/>
+              <a:t>códigos em Python, </a:t>
+            </a:r>
+            <a:r>
+              <a:rPr lang="pt-BR" sz="1600" b="1" dirty="0"/>
+              <a:t>faça também o teste de mesa de todos os exercícios)</a:t>
             </a:r>
           </a:p>
           <a:p>
@@ -8926,8 +8937,12 @@
               <a:buNone/>
             </a:pPr>
             <a:r>
-              <a:rPr lang="pt-BR" sz="1300" dirty="0"/>
-              <a:t>1) Construa um programa que :</a:t>
+              <a:rPr lang="pt-BR" sz="1600" b="1" dirty="0"/>
+              <a:t>1)</a:t>
+            </a:r>
+            <a:r>
+              <a:rPr lang="pt-BR" sz="1600" dirty="0"/>
+              <a:t> Construa um programa que :</a:t>
             </a:r>
           </a:p>
           <a:p>
@@ -8938,11 +8953,11 @@
               <a:buNone/>
             </a:pPr>
             <a:r>
-              <a:rPr lang="pt-BR" sz="1300" dirty="0"/>
+              <a:rPr lang="pt-BR" sz="1600" dirty="0"/>
               <a:t>·  Leia a cotação do dólar. </a:t>
             </a:r>
             <a:r>
-              <a:rPr lang="pt-BR" sz="1300" dirty="0" err="1">
+              <a:rPr lang="pt-BR" sz="1600" dirty="0" err="1">
                 <a:solidFill>
                   <a:srgbClr val="FF0000"/>
                 </a:solidFill>
@@ -8950,7 +8965,7 @@
               <a:t>Ex</a:t>
             </a:r>
             <a:r>
-              <a:rPr lang="pt-BR" sz="1300" dirty="0">
+              <a:rPr lang="pt-BR" sz="1600" dirty="0">
                 <a:solidFill>
                   <a:srgbClr val="FF0000"/>
                 </a:solidFill>
@@ -8966,27 +8981,27 @@
               <a:buNone/>
             </a:pPr>
             <a:r>
-              <a:rPr lang="pt-BR" sz="1300" dirty="0"/>
+              <a:rPr lang="pt-BR" sz="1600" dirty="0"/>
               <a:t>·  Leia o valor que quer converter em </a:t>
             </a:r>
             <a:r>
-              <a:rPr lang="pt-BR" sz="1300" dirty="0" err="1"/>
+              <a:rPr lang="pt-BR" sz="1600" dirty="0" err="1"/>
               <a:t>dolar</a:t>
             </a:r>
             <a:r>
-              <a:rPr lang="pt-BR" sz="1300" dirty="0"/>
+              <a:rPr lang="pt-BR" sz="1600" dirty="0"/>
               <a:t> </a:t>
             </a:r>
             <a:r>
-              <a:rPr lang="pt-BR" sz="1300" dirty="0" err="1"/>
+              <a:rPr lang="pt-BR" sz="1600" dirty="0" err="1"/>
               <a:t>Ex</a:t>
             </a:r>
             <a:r>
-              <a:rPr lang="pt-BR" sz="1300" dirty="0"/>
+              <a:rPr lang="pt-BR" sz="1600" dirty="0"/>
               <a:t>: </a:t>
             </a:r>
             <a:r>
-              <a:rPr lang="pt-BR" sz="1300" dirty="0">
+              <a:rPr lang="pt-BR" sz="1600" dirty="0">
                 <a:solidFill>
                   <a:srgbClr val="FF0000"/>
                 </a:solidFill>
@@ -9002,27 +9017,27 @@
               <a:buNone/>
             </a:pPr>
             <a:r>
-              <a:rPr lang="pt-BR" sz="1300" dirty="0"/>
+              <a:rPr lang="pt-BR" sz="1600" dirty="0"/>
               <a:t>·  Converta esse valor para </a:t>
             </a:r>
             <a:r>
-              <a:rPr lang="pt-BR" sz="1300" dirty="0" err="1"/>
+              <a:rPr lang="pt-BR" sz="1600" dirty="0" err="1"/>
               <a:t>dolar</a:t>
             </a:r>
             <a:r>
-              <a:rPr lang="pt-BR" sz="1300" dirty="0"/>
+              <a:rPr lang="pt-BR" sz="1600" dirty="0"/>
               <a:t>. </a:t>
             </a:r>
             <a:r>
-              <a:rPr lang="pt-BR" sz="1300" dirty="0" err="1"/>
+              <a:rPr lang="pt-BR" sz="1600" dirty="0" err="1"/>
               <a:t>Ex</a:t>
             </a:r>
             <a:r>
-              <a:rPr lang="pt-BR" sz="1300" dirty="0"/>
+              <a:rPr lang="pt-BR" sz="1600" dirty="0"/>
               <a:t> .Resposta</a:t>
             </a:r>
             <a:r>
-              <a:rPr lang="pt-BR" sz="1300" dirty="0">
+              <a:rPr lang="pt-BR" sz="1600" dirty="0">
                 <a:solidFill>
                   <a:srgbClr val="FF0000"/>
                 </a:solidFill>
@@ -9038,7 +9053,7 @@
               <a:buNone/>
             </a:pPr>
             <a:r>
-              <a:rPr lang="pt-BR" sz="1300" dirty="0"/>
+              <a:rPr lang="pt-BR" sz="1600" dirty="0"/>
               <a:t>·  Mostre o resultado</a:t>
             </a:r>
           </a:p>
@@ -9050,8 +9065,12 @@
               <a:buNone/>
             </a:pPr>
             <a:r>
-              <a:rPr lang="pt-BR" sz="1300" dirty="0"/>
-              <a:t>2) Desenvolva um programa que:</a:t>
+              <a:rPr lang="pt-BR" sz="1600" b="1" dirty="0"/>
+              <a:t>2)</a:t>
+            </a:r>
+            <a:r>
+              <a:rPr lang="pt-BR" sz="1600" dirty="0"/>
+              <a:t> Desenvolva um programa que:</a:t>
             </a:r>
           </a:p>
           <a:p>
@@ -9062,11 +9081,11 @@
               <a:buNone/>
             </a:pPr>
             <a:r>
-              <a:rPr lang="pt-BR" sz="1300" dirty="0"/>
+              <a:rPr lang="pt-BR" sz="1600" dirty="0"/>
               <a:t>·  Leia 4 (quatro) números. </a:t>
             </a:r>
             <a:r>
-              <a:rPr lang="pt-BR" sz="1300" dirty="0" err="1">
+              <a:rPr lang="pt-BR" sz="1600" dirty="0" err="1">
                 <a:solidFill>
                   <a:srgbClr val="FF0000"/>
                 </a:solidFill>
@@ -9074,7 +9093,7 @@
               <a:t>Ex</a:t>
             </a:r>
             <a:r>
-              <a:rPr lang="pt-BR" sz="1300" dirty="0">
+              <a:rPr lang="pt-BR" sz="1600" dirty="0">
                 <a:solidFill>
                   <a:srgbClr val="FF0000"/>
                 </a:solidFill>
@@ -9090,11 +9109,11 @@
               <a:buNone/>
             </a:pPr>
             <a:r>
-              <a:rPr lang="pt-BR" sz="1300" dirty="0"/>
+              <a:rPr lang="pt-BR" sz="1600" dirty="0"/>
               <a:t>·  Calcule o quadrado para cada um. </a:t>
             </a:r>
             <a:r>
-              <a:rPr lang="pt-BR" sz="1300" dirty="0" err="1">
+              <a:rPr lang="pt-BR" sz="1600" dirty="0" err="1">
                 <a:solidFill>
                   <a:srgbClr val="FF0000"/>
                 </a:solidFill>
@@ -9102,7 +9121,7 @@
               <a:t>Ex</a:t>
             </a:r>
             <a:r>
-              <a:rPr lang="pt-BR" sz="1300" dirty="0">
+              <a:rPr lang="pt-BR" sz="1600" dirty="0">
                 <a:solidFill>
                   <a:srgbClr val="FF0000"/>
                 </a:solidFill>
@@ -9110,7 +9129,7 @@
               <a:t>, </a:t>
             </a:r>
             <a:r>
-              <a:rPr lang="pt-BR" sz="1300" dirty="0" err="1">
+              <a:rPr lang="pt-BR" sz="1600" dirty="0" err="1">
                 <a:solidFill>
                   <a:srgbClr val="FF0000"/>
                 </a:solidFill>
@@ -9118,7 +9137,7 @@
               <a:t>resp</a:t>
             </a:r>
             <a:r>
-              <a:rPr lang="pt-BR" sz="1300" dirty="0">
+              <a:rPr lang="pt-BR" sz="1600" dirty="0">
                 <a:solidFill>
                   <a:srgbClr val="FF0000"/>
                 </a:solidFill>
@@ -9134,11 +9153,11 @@
               <a:buNone/>
             </a:pPr>
             <a:r>
-              <a:rPr lang="pt-BR" sz="1300" dirty="0"/>
+              <a:rPr lang="pt-BR" sz="1600" dirty="0"/>
               <a:t>·  Somem todos</a:t>
             </a:r>
             <a:r>
-              <a:rPr lang="pt-BR" sz="1300" dirty="0">
+              <a:rPr lang="pt-BR" sz="1600" dirty="0">
                 <a:solidFill>
                   <a:srgbClr val="FF0000"/>
                 </a:solidFill>
@@ -9154,26 +9173,22 @@
               <a:buNone/>
             </a:pPr>
             <a:r>
-              <a:rPr lang="pt-BR" sz="1300" dirty="0"/>
+              <a:rPr lang="pt-BR" sz="1600" dirty="0"/>
               <a:t>·  Mostre o resultado Ex. Resposta: </a:t>
             </a:r>
             <a:r>
-              <a:rPr lang="pt-BR" sz="1300" dirty="0">
+              <a:rPr lang="pt-BR" sz="1600" dirty="0" smtClean="0">
                 <a:solidFill>
                   <a:srgbClr val="FF0000"/>
                 </a:solidFill>
               </a:rPr>
               <a:t>81</a:t>
             </a:r>
-          </a:p>
-          <a:p>
-            <a:pPr marL="45720" indent="0">
-              <a:lnSpc>
-                <a:spcPct val="90000"/>
-              </a:lnSpc>
-              <a:buNone/>
-            </a:pPr>
-            <a:endParaRPr lang="pt-BR" sz="1300" dirty="0"/>
+            <a:endParaRPr lang="pt-BR" sz="1600" dirty="0">
+              <a:solidFill>
+                <a:srgbClr val="FF0000"/>
+              </a:solidFill>
+            </a:endParaRPr>
           </a:p>
         </p:txBody>
       </p:sp>
@@ -9650,10 +9665,10 @@
       </p:grpSpPr>
       <p:sp useBgFill="1">
         <p:nvSpPr>
-          <p:cNvPr id="15" name="Rectangle 14">
+          <p:cNvPr id="8" name="Rectangle 7">
             <a:extLst>
               <a:ext uri="{FF2B5EF4-FFF2-40B4-BE49-F238E27FC236}">
-                <a16:creationId xmlns:a16="http://schemas.microsoft.com/office/drawing/2014/main" id="{089A69AF-D57B-49B4-886C-D4A5DC194421}"/>
+                <a16:creationId xmlns:a16="http://schemas.microsoft.com/office/drawing/2014/main" id="{F1E0D4A3-ECB8-4689-ABDB-9CE848CE83B9}"/>
               </a:ext>
               <a:ext uri="{C183D7F6-B498-43B3-948B-1728B52AA6E4}">
                 <adec:decorative xmlns:adec="http://schemas.microsoft.com/office/drawing/2017/decorative" xmlns="" val="1"/>
@@ -9710,10 +9725,50 @@
       </p:sp>
       <p:sp>
         <p:nvSpPr>
-          <p:cNvPr id="17" name="Freeform: Shape 16">
+          <p:cNvPr id="3" name="Título 2"/>
+          <p:cNvSpPr>
+            <a:spLocks noGrp="1"/>
+          </p:cNvSpPr>
+          <p:nvPr>
+            <p:ph type="title"/>
+          </p:nvPr>
+        </p:nvSpPr>
+        <p:spPr>
+          <a:xfrm>
+            <a:off x="607500" y="447188"/>
+            <a:ext cx="7928998" cy="970450"/>
+          </a:xfrm>
+          <a:effectLst/>
+        </p:spPr>
+        <p:txBody>
+          <a:bodyPr anchor="ctr">
+            <a:normAutofit/>
+          </a:bodyPr>
+          <a:lstStyle/>
+          <a:p>
+            <a:pPr algn="ctr"/>
+            <a:r>
+              <a:rPr lang="pt-BR" sz="2400" b="1">
+                <a:solidFill>
+                  <a:schemeClr val="tx1"/>
+                </a:solidFill>
+              </a:rPr>
+              <a:t>DESENVOLVENDO ALGORITMOS</a:t>
+            </a:r>
+            <a:endParaRPr lang="pt-BR" sz="2400">
+              <a:solidFill>
+                <a:schemeClr val="tx1"/>
+              </a:solidFill>
+            </a:endParaRPr>
+          </a:p>
+        </p:txBody>
+      </p:sp>
+      <p:sp>
+        <p:nvSpPr>
+          <p:cNvPr id="10" name="Freeform: Shape 9">
             <a:extLst>
               <a:ext uri="{FF2B5EF4-FFF2-40B4-BE49-F238E27FC236}">
-                <a16:creationId xmlns:a16="http://schemas.microsoft.com/office/drawing/2014/main" id="{CABDC08D-6093-4397-92D4-54D00E2BB1C2}"/>
+                <a16:creationId xmlns:a16="http://schemas.microsoft.com/office/drawing/2014/main" id="{8854772B-9C8F-4037-89E0-3A45208AB395}"/>
               </a:ext>
               <a:ext uri="{C183D7F6-B498-43B3-948B-1728B52AA6E4}">
                 <adec:decorative xmlns:adec="http://schemas.microsoft.com/office/drawing/2017/decorative" xmlns="" val="1"/>
@@ -9731,54 +9786,52 @@
             </p:extLst>
           </p:nvPr>
         </p:nvSpPr>
-        <p:spPr bwMode="auto">
-          <a:xfrm rot="16200000">
-            <a:off x="-1345293" y="1345293"/>
-            <a:ext cx="6858000" cy="4167414"/>
+        <p:spPr>
+          <a:xfrm>
+            <a:off x="477819" y="1576408"/>
+            <a:ext cx="8188361" cy="4638125"/>
           </a:xfrm>
           <a:custGeom>
             <a:avLst/>
             <a:gdLst>
-              <a:gd name="connsiteX0" fmla="*/ 6858000 w 6858000"/>
-              <a:gd name="connsiteY0" fmla="*/ 3445704 h 5556552"/>
-              <a:gd name="connsiteX1" fmla="*/ 3829242 w 6858000"/>
-              <a:gd name="connsiteY1" fmla="*/ 5433322 h 5556552"/>
-              <a:gd name="connsiteX2" fmla="*/ 3827369 w 6858000"/>
-              <a:gd name="connsiteY2" fmla="*/ 5434867 h 5556552"/>
-              <a:gd name="connsiteX3" fmla="*/ 3824583 w 6858000"/>
-              <a:gd name="connsiteY3" fmla="*/ 5436378 h 5556552"/>
-              <a:gd name="connsiteX4" fmla="*/ 3798693 w 6858000"/>
-              <a:gd name="connsiteY4" fmla="*/ 5453370 h 5556552"/>
-              <a:gd name="connsiteX5" fmla="*/ 3785011 w 6858000"/>
-              <a:gd name="connsiteY5" fmla="*/ 5457858 h 5556552"/>
-              <a:gd name="connsiteX6" fmla="*/ 3706339 w 6858000"/>
-              <a:gd name="connsiteY6" fmla="*/ 5500559 h 5556552"/>
-              <a:gd name="connsiteX7" fmla="*/ 3428998 w 6858000"/>
-              <a:gd name="connsiteY7" fmla="*/ 5556552 h 5556552"/>
-              <a:gd name="connsiteX8" fmla="*/ 3151658 w 6858000"/>
-              <a:gd name="connsiteY8" fmla="*/ 5500559 h 5556552"/>
-              <a:gd name="connsiteX9" fmla="*/ 3072996 w 6858000"/>
-              <a:gd name="connsiteY9" fmla="*/ 5457863 h 5556552"/>
-              <a:gd name="connsiteX10" fmla="*/ 3059298 w 6858000"/>
-              <a:gd name="connsiteY10" fmla="*/ 5453370 h 5556552"/>
-              <a:gd name="connsiteX11" fmla="*/ 3033383 w 6858000"/>
-              <a:gd name="connsiteY11" fmla="*/ 5436362 h 5556552"/>
-              <a:gd name="connsiteX12" fmla="*/ 3030627 w 6858000"/>
-              <a:gd name="connsiteY12" fmla="*/ 5434867 h 5556552"/>
-              <a:gd name="connsiteX13" fmla="*/ 3028775 w 6858000"/>
-              <a:gd name="connsiteY13" fmla="*/ 5433338 h 5556552"/>
-              <a:gd name="connsiteX14" fmla="*/ 0 w 6858000"/>
-              <a:gd name="connsiteY14" fmla="*/ 3445704 h 5556552"/>
-              <a:gd name="connsiteX15" fmla="*/ 6858000 w 6858000"/>
-              <a:gd name="connsiteY15" fmla="*/ 0 h 5556552"/>
-              <a:gd name="connsiteX16" fmla="*/ 6858000 w 6858000"/>
-              <a:gd name="connsiteY16" fmla="*/ 349336 h 5556552"/>
-              <a:gd name="connsiteX17" fmla="*/ 6858000 w 6858000"/>
-              <a:gd name="connsiteY17" fmla="*/ 3445703 h 5556552"/>
-              <a:gd name="connsiteX18" fmla="*/ 0 w 6858000"/>
-              <a:gd name="connsiteY18" fmla="*/ 3445703 h 5556552"/>
-              <a:gd name="connsiteX19" fmla="*/ 0 w 6858000"/>
-              <a:gd name="connsiteY19" fmla="*/ 0 h 5556552"/>
+              <a:gd name="connsiteX0" fmla="*/ 5441025 w 10917814"/>
+              <a:gd name="connsiteY0" fmla="*/ 0 h 4638125"/>
+              <a:gd name="connsiteX1" fmla="*/ 5453725 w 10917814"/>
+              <a:gd name="connsiteY1" fmla="*/ 0 h 4638125"/>
+              <a:gd name="connsiteX2" fmla="*/ 5464308 w 10917814"/>
+              <a:gd name="connsiteY2" fmla="*/ 0 h 4638125"/>
+              <a:gd name="connsiteX3" fmla="*/ 5477009 w 10917814"/>
+              <a:gd name="connsiteY3" fmla="*/ 4762 h 4638125"/>
+              <a:gd name="connsiteX4" fmla="*/ 5489708 w 10917814"/>
+              <a:gd name="connsiteY4" fmla="*/ 9525 h 4638125"/>
+              <a:gd name="connsiteX5" fmla="*/ 5498175 w 10917814"/>
+              <a:gd name="connsiteY5" fmla="*/ 12700 h 4638125"/>
+              <a:gd name="connsiteX6" fmla="*/ 5865801 w 10917814"/>
+              <a:gd name="connsiteY6" fmla="*/ 288419 h 4638125"/>
+              <a:gd name="connsiteX7" fmla="*/ 10765009 w 10917814"/>
+              <a:gd name="connsiteY7" fmla="*/ 288419 h 4638125"/>
+              <a:gd name="connsiteX8" fmla="*/ 10917814 w 10917814"/>
+              <a:gd name="connsiteY8" fmla="*/ 441224 h 4638125"/>
+              <a:gd name="connsiteX9" fmla="*/ 10917814 w 10917814"/>
+              <a:gd name="connsiteY9" fmla="*/ 4485320 h 4638125"/>
+              <a:gd name="connsiteX10" fmla="*/ 10765009 w 10917814"/>
+              <a:gd name="connsiteY10" fmla="*/ 4638125 h 4638125"/>
+              <a:gd name="connsiteX11" fmla="*/ 152805 w 10917814"/>
+              <a:gd name="connsiteY11" fmla="*/ 4638125 h 4638125"/>
+              <a:gd name="connsiteX12" fmla="*/ 0 w 10917814"/>
+              <a:gd name="connsiteY12" fmla="*/ 4485320 h 4638125"/>
+              <a:gd name="connsiteX13" fmla="*/ 0 w 10917814"/>
+              <a:gd name="connsiteY13" fmla="*/ 441224 h 4638125"/>
+              <a:gd name="connsiteX14" fmla="*/ 152805 w 10917814"/>
+              <a:gd name="connsiteY14" fmla="*/ 288419 h 4638125"/>
+              <a:gd name="connsiteX15" fmla="*/ 5041650 w 10917814"/>
+              <a:gd name="connsiteY15" fmla="*/ 288419 h 4638125"/>
+              <a:gd name="connsiteX16" fmla="*/ 5409275 w 10917814"/>
+              <a:gd name="connsiteY16" fmla="*/ 12700 h 4638125"/>
+              <a:gd name="connsiteX17" fmla="*/ 5417742 w 10917814"/>
+              <a:gd name="connsiteY17" fmla="*/ 9525 h 4638125"/>
+              <a:gd name="connsiteX18" fmla="*/ 5430442 w 10917814"/>
+              <a:gd name="connsiteY18" fmla="*/ 4762 h 4638125"/>
             </a:gdLst>
             <a:ahLst/>
             <a:cxnLst>
@@ -9839,183 +9892,227 @@
               <a:cxn ang="0">
                 <a:pos x="connsiteX18" y="connsiteY18"/>
               </a:cxn>
-              <a:cxn ang="0">
-                <a:pos x="connsiteX19" y="connsiteY19"/>
-              </a:cxn>
             </a:cxnLst>
             <a:rect l="l" t="t" r="r" b="b"/>
             <a:pathLst>
-              <a:path w="6858000" h="5556552">
+              <a:path w="10917814" h="4638125">
                 <a:moveTo>
-                  <a:pt x="6858000" y="3445704"/>
+                  <a:pt x="5441025" y="0"/>
                 </a:moveTo>
                 <a:lnTo>
-                  <a:pt x="3829242" y="5433322"/>
-                </a:lnTo>
-                <a:lnTo>
-                  <a:pt x="3827369" y="5434867"/>
-                </a:lnTo>
-                <a:lnTo>
-                  <a:pt x="3824583" y="5436378"/>
-                </a:lnTo>
-                <a:lnTo>
-                  <a:pt x="3798693" y="5453370"/>
-                </a:lnTo>
-                <a:lnTo>
-                  <a:pt x="3785011" y="5457858"/>
-                </a:lnTo>
-                <a:lnTo>
-                  <a:pt x="3706339" y="5500559"/>
+                  <a:pt x="5453725" y="0"/>
+                </a:lnTo>
+                <a:lnTo>
+                  <a:pt x="5464308" y="0"/>
+                </a:lnTo>
+                <a:lnTo>
+                  <a:pt x="5477009" y="4762"/>
+                </a:lnTo>
+                <a:lnTo>
+                  <a:pt x="5489708" y="9525"/>
+                </a:lnTo>
+                <a:lnTo>
+                  <a:pt x="5498175" y="12700"/>
+                </a:lnTo>
+                <a:lnTo>
+                  <a:pt x="5865801" y="288419"/>
+                </a:lnTo>
+                <a:lnTo>
+                  <a:pt x="10765009" y="288419"/>
                 </a:lnTo>
                 <a:cubicBezTo>
-                  <a:pt x="3621096" y="5536614"/>
-                  <a:pt x="3527375" y="5556552"/>
-                  <a:pt x="3428998" y="5556552"/>
+                  <a:pt x="10849401" y="288419"/>
+                  <a:pt x="10917814" y="356832"/>
+                  <a:pt x="10917814" y="441224"/>
                 </a:cubicBezTo>
+                <a:lnTo>
+                  <a:pt x="10917814" y="4485320"/>
+                </a:lnTo>
                 <a:cubicBezTo>
-                  <a:pt x="3330621" y="5556552"/>
-                  <a:pt x="3236901" y="5536614"/>
-                  <a:pt x="3151658" y="5500559"/>
+                  <a:pt x="10917814" y="4569712"/>
+                  <a:pt x="10849401" y="4638125"/>
+                  <a:pt x="10765009" y="4638125"/>
                 </a:cubicBezTo>
                 <a:lnTo>
-                  <a:pt x="3072996" y="5457863"/>
-                </a:lnTo>
-                <a:lnTo>
-                  <a:pt x="3059298" y="5453370"/>
-                </a:lnTo>
-                <a:lnTo>
-                  <a:pt x="3033383" y="5436362"/>
-                </a:lnTo>
-                <a:lnTo>
-                  <a:pt x="3030627" y="5434867"/>
-                </a:lnTo>
-                <a:lnTo>
-                  <a:pt x="3028775" y="5433338"/>
-                </a:lnTo>
-                <a:lnTo>
-                  <a:pt x="0" y="3445704"/>
-                </a:lnTo>
-                <a:close/>
-                <a:moveTo>
-                  <a:pt x="6858000" y="0"/>
-                </a:moveTo>
-                <a:lnTo>
-                  <a:pt x="6858000" y="349336"/>
-                </a:lnTo>
-                <a:lnTo>
-                  <a:pt x="6858000" y="3445703"/>
-                </a:lnTo>
-                <a:lnTo>
-                  <a:pt x="0" y="3445703"/>
-                </a:lnTo>
-                <a:lnTo>
-                  <a:pt x="0" y="0"/>
+                  <a:pt x="152805" y="4638125"/>
+                </a:lnTo>
+                <a:cubicBezTo>
+                  <a:pt x="68413" y="4638125"/>
+                  <a:pt x="0" y="4569712"/>
+                  <a:pt x="0" y="4485320"/>
+                </a:cubicBezTo>
+                <a:lnTo>
+                  <a:pt x="0" y="441224"/>
+                </a:lnTo>
+                <a:cubicBezTo>
+                  <a:pt x="0" y="356832"/>
+                  <a:pt x="68413" y="288419"/>
+                  <a:pt x="152805" y="288419"/>
+                </a:cubicBezTo>
+                <a:lnTo>
+                  <a:pt x="5041650" y="288419"/>
+                </a:lnTo>
+                <a:lnTo>
+                  <a:pt x="5409275" y="12700"/>
+                </a:lnTo>
+                <a:lnTo>
+                  <a:pt x="5417742" y="9525"/>
+                </a:lnTo>
+                <a:lnTo>
+                  <a:pt x="5430442" y="4762"/>
                 </a:lnTo>
                 <a:close/>
               </a:path>
             </a:pathLst>
           </a:custGeom>
-          <a:ln>
-            <a:noFill/>
+          <a:noFill/>
+          <a:ln w="38100">
+            <a:solidFill>
+              <a:schemeClr val="accent1"/>
+            </a:solidFill>
           </a:ln>
           <a:effectLst/>
-          <a:extLst>
-            <a:ext uri="{91240B29-F687-4f45-9708-019B960494DF}">
-              <a14:hiddenLine xmlns:a14="http://schemas.microsoft.com/office/drawing/2010/main" xmlns:p14="http://schemas.microsoft.com/office/powerpoint/2010/main" xmlns:a16="http://schemas.microsoft.com/office/drawing/2014/main" xmlns="" w="9525">
-                <a:solidFill>
-                  <a:srgbClr val="000000"/>
-                </a:solidFill>
-                <a:round/>
-                <a:headEnd/>
-                <a:tailEnd/>
-              </a14:hiddenLine>
-            </a:ext>
-          </a:extLst>
         </p:spPr>
         <p:style>
-          <a:lnRef idx="1">
-            <a:schemeClr val="accent1"/>
+          <a:lnRef idx="2">
+            <a:schemeClr val="accent1">
+              <a:shade val="50000"/>
+            </a:schemeClr>
           </a:lnRef>
-          <a:fillRef idx="3">
+          <a:fillRef idx="1">
             <a:schemeClr val="accent1"/>
           </a:fillRef>
-          <a:effectRef idx="2">
+          <a:effectRef idx="0">
             <a:schemeClr val="accent1"/>
           </a:effectRef>
           <a:fontRef idx="minor">
             <a:schemeClr val="lt1"/>
           </a:fontRef>
         </p:style>
-      </p:sp>
-      <p:sp>
-        <p:nvSpPr>
-          <p:cNvPr id="3" name="Título 2"/>
+        <p:txBody>
+          <a:bodyPr wrap="square" rtlCol="0" anchor="ctr">
+            <a:noAutofit/>
+          </a:bodyPr>
+          <a:lstStyle/>
+          <a:p>
+            <a:pPr algn="ctr"/>
+            <a:endParaRPr lang="en-US"/>
+          </a:p>
+        </p:txBody>
+      </p:sp>
+      <p:sp>
+        <p:nvSpPr>
+          <p:cNvPr id="2" name="Espaço Reservado para Conteúdo 1"/>
           <p:cNvSpPr>
             <a:spLocks noGrp="1"/>
           </p:cNvSpPr>
           <p:nvPr>
-            <p:ph type="title"/>
+            <p:ph idx="1"/>
           </p:nvPr>
         </p:nvSpPr>
         <p:spPr>
           <a:xfrm>
-            <a:off x="338636" y="1786228"/>
-            <a:ext cx="2824112" cy="3388287"/>
-          </a:xfrm>
-        </p:spPr>
-        <p:txBody>
-          <a:bodyPr anchor="ctr">
-            <a:normAutofit/>
-          </a:bodyPr>
-          <a:lstStyle/>
-          <a:p>
-            <a:r>
-              <a:rPr lang="pt-BR" sz="2200" b="1" dirty="0"/>
-              <a:t>DESENVOLVENDO ALGORITMOS</a:t>
-            </a:r>
-            <a:endParaRPr lang="pt-BR" sz="2200" dirty="0"/>
-          </a:p>
-        </p:txBody>
-      </p:sp>
-      <p:sp>
-        <p:nvSpPr>
-          <p:cNvPr id="2" name="Espaço Reservado para Conteúdo 1"/>
-          <p:cNvSpPr>
-            <a:spLocks noGrp="1"/>
-          </p:cNvSpPr>
-          <p:nvPr>
-            <p:ph idx="1"/>
-          </p:nvPr>
-        </p:nvSpPr>
-        <p:spPr>
-          <a:xfrm>
-            <a:off x="3779912" y="116633"/>
-            <a:ext cx="5220071" cy="6192688"/>
+            <a:off x="607500" y="1988840"/>
+            <a:ext cx="7928998" cy="4225693"/>
           </a:xfrm>
           <a:effectLst/>
         </p:spPr>
         <p:txBody>
           <a:bodyPr>
-            <a:normAutofit/>
+            <a:noAutofit/>
           </a:bodyPr>
           <a:lstStyle/>
           <a:p>
-            <a:pPr>
+            <a:pPr marL="0" indent="0" algn="just">
+              <a:lnSpc>
+                <a:spcPct val="150000"/>
+              </a:lnSpc>
+              <a:buNone/>
+            </a:pPr>
+            <a:r>
+              <a:rPr lang="pt-BR" sz="1600" b="1" dirty="0"/>
+              <a:t>3</a:t>
+            </a:r>
+            <a:r>
+              <a:rPr lang="pt-BR" sz="1600" b="1" dirty="0"/>
+              <a:t>) Construa um algoritmo para pagamento de comissão de vendedores de peças, levando-se em consideração que sua comissão será de 5% do total da venda e que você precisará dos seguintes dados:</a:t>
+            </a:r>
+          </a:p>
+          <a:p>
+            <a:pPr marL="331470" indent="-285750">
               <a:lnSpc>
                 <a:spcPct val="90000"/>
               </a:lnSpc>
             </a:pPr>
             <a:r>
-              <a:rPr lang="pt-BR" sz="1400" b="1" dirty="0"/>
-              <a:t>Exercícios(</a:t>
-            </a:r>
-            <a:r>
-              <a:rPr lang="pt-BR" sz="1400" b="1" dirty="0" err="1"/>
-              <a:t>cont</a:t>
-            </a:r>
-            <a:r>
-              <a:rPr lang="pt-BR" sz="1400" b="1" dirty="0"/>
-              <a:t>)</a:t>
+              <a:rPr lang="pt-BR" sz="1600" dirty="0" smtClean="0"/>
+              <a:t>Preço </a:t>
+            </a:r>
+            <a:r>
+              <a:rPr lang="pt-BR" sz="1600" dirty="0"/>
+              <a:t>unitário da peça </a:t>
+            </a:r>
+            <a:r>
+              <a:rPr lang="pt-BR" sz="1600" b="1" dirty="0" err="1">
+                <a:solidFill>
+                  <a:srgbClr val="FF0000"/>
+                </a:solidFill>
+              </a:rPr>
+              <a:t>Ex</a:t>
+            </a:r>
+            <a:r>
+              <a:rPr lang="pt-BR" sz="1600" b="1" dirty="0">
+                <a:solidFill>
+                  <a:srgbClr val="FF0000"/>
+                </a:solidFill>
+              </a:rPr>
+              <a:t>: R$2.5</a:t>
+            </a:r>
+          </a:p>
+          <a:p>
+            <a:pPr marL="331470" indent="-285750">
+              <a:lnSpc>
+                <a:spcPct val="90000"/>
+              </a:lnSpc>
+            </a:pPr>
+            <a:r>
+              <a:rPr lang="pt-BR" sz="1600" dirty="0" smtClean="0"/>
+              <a:t>Quantidade </a:t>
+            </a:r>
+            <a:r>
+              <a:rPr lang="pt-BR" sz="1600" dirty="0"/>
+              <a:t>vendida </a:t>
+            </a:r>
+            <a:r>
+              <a:rPr lang="pt-BR" sz="1600" b="1" dirty="0" err="1">
+                <a:solidFill>
+                  <a:srgbClr val="FF0000"/>
+                </a:solidFill>
+              </a:rPr>
+              <a:t>Ex</a:t>
+            </a:r>
+            <a:r>
+              <a:rPr lang="pt-BR" sz="1600" b="1" dirty="0">
+                <a:solidFill>
+                  <a:srgbClr val="FF0000"/>
+                </a:solidFill>
+              </a:rPr>
+              <a:t>: 200</a:t>
+            </a:r>
+          </a:p>
+          <a:p>
+            <a:pPr marL="331470" indent="-285750">
+              <a:lnSpc>
+                <a:spcPct val="90000"/>
+              </a:lnSpc>
+            </a:pPr>
+            <a:r>
+              <a:rPr lang="pt-BR" sz="1600" dirty="0" smtClean="0"/>
+              <a:t>Após </a:t>
+            </a:r>
+            <a:r>
+              <a:rPr lang="pt-BR" sz="1600" dirty="0"/>
+              <a:t>isso, calcular a comissão do vendedor e mostrar na tela </a:t>
             </a:r>
           </a:p>
           <a:p>
@@ -10026,184 +10123,33 @@
               <a:buNone/>
             </a:pPr>
             <a:r>
-              <a:rPr lang="pt-BR" sz="1400" dirty="0"/>
-              <a:t>3) Construa um algoritmo para pagamento de comissão de vendedores de peças, </a:t>
-            </a:r>
-            <a:r>
-              <a:rPr lang="pt-BR" sz="1600" dirty="0"/>
-              <a:t>levando-se</a:t>
-            </a:r>
-            <a:r>
-              <a:rPr lang="pt-BR" sz="1400" dirty="0"/>
-              <a:t> em consideração que sua comissão será de 5% do total da venda e que você precisará dos seguintes dados:</a:t>
-            </a:r>
-          </a:p>
-          <a:p>
-            <a:pPr marL="45720" indent="0">
-              <a:lnSpc>
-                <a:spcPct val="90000"/>
-              </a:lnSpc>
-              <a:buNone/>
-            </a:pPr>
-            <a:r>
-              <a:rPr lang="pt-BR" sz="1400" dirty="0"/>
-              <a:t>·  Preço unitário da peça </a:t>
-            </a:r>
-            <a:r>
-              <a:rPr lang="pt-BR" sz="1400" b="1" dirty="0" err="1">
+              <a:rPr lang="pt-BR" sz="1600" b="1" dirty="0">
                 <a:solidFill>
                   <a:srgbClr val="FF0000"/>
                 </a:solidFill>
               </a:rPr>
-              <a:t>Ex</a:t>
-            </a:r>
-            <a:r>
-              <a:rPr lang="pt-BR" sz="1400" b="1" dirty="0">
+              <a:t>Exemplo: Resposta: R$ 500 de venda e R$ 25,00 de comissão(5</a:t>
+            </a:r>
+            <a:r>
+              <a:rPr lang="pt-BR" sz="1600" b="1" dirty="0" smtClean="0">
                 <a:solidFill>
                   <a:srgbClr val="FF0000"/>
                 </a:solidFill>
               </a:rPr>
-              <a:t>: R$2.5</a:t>
-            </a:r>
-          </a:p>
-          <a:p>
-            <a:pPr marL="45720" indent="0">
-              <a:lnSpc>
-                <a:spcPct val="90000"/>
-              </a:lnSpc>
-              <a:buNone/>
-            </a:pPr>
-            <a:r>
-              <a:rPr lang="pt-BR" sz="1400" dirty="0"/>
-              <a:t>·  Quantidade vendida </a:t>
-            </a:r>
-            <a:r>
-              <a:rPr lang="pt-BR" sz="1400" b="1" dirty="0" err="1">
-                <a:solidFill>
-                  <a:srgbClr val="FF0000"/>
-                </a:solidFill>
-              </a:rPr>
-              <a:t>Ex</a:t>
-            </a:r>
-            <a:r>
-              <a:rPr lang="pt-BR" sz="1400" b="1" dirty="0">
-                <a:solidFill>
-                  <a:srgbClr val="FF0000"/>
-                </a:solidFill>
-              </a:rPr>
-              <a:t>: 200</a:t>
-            </a:r>
-          </a:p>
-          <a:p>
-            <a:pPr marL="45720" indent="0">
-              <a:lnSpc>
-                <a:spcPct val="90000"/>
-              </a:lnSpc>
-              <a:buNone/>
-            </a:pPr>
-            <a:r>
-              <a:rPr lang="pt-BR" sz="1400" dirty="0"/>
-              <a:t>. Após isso, calcular a comissão do vendedor e mostrar na tela </a:t>
-            </a:r>
-          </a:p>
-          <a:p>
-            <a:pPr marL="45720" indent="0">
-              <a:lnSpc>
-                <a:spcPct val="90000"/>
-              </a:lnSpc>
-              <a:buNone/>
-            </a:pPr>
-            <a:r>
-              <a:rPr lang="pt-BR" sz="1400" b="1" dirty="0">
-                <a:solidFill>
-                  <a:srgbClr val="FF0000"/>
-                </a:solidFill>
-              </a:rPr>
-              <a:t>Exemplo: Resposta: R$ 500 de venda e R$ 25,00 de comissão(5%)</a:t>
-            </a:r>
-          </a:p>
-          <a:p>
-            <a:pPr marL="502920" indent="-457200">
-              <a:lnSpc>
-                <a:spcPct val="90000"/>
-              </a:lnSpc>
-              <a:buAutoNum type="arabicParenR" startAt="4"/>
-            </a:pPr>
-            <a:r>
-              <a:rPr lang="pt-BR" sz="1400" dirty="0"/>
-              <a:t>5. O custo ao consumidor de um carro novo é a soma do custo de fábrica com a percentagem do distribuidor e dos impostos (aplicados, primeiro os impostos sobre o custo de fábrica, e depois a percentagem do distribuidor sobre o resultado). Supondo que a percentagem do distribuidor seja de 28% e os impostos 45%. Escrever um algoritmo que leia o custo de fábrica de um carro e informe o custo ao consumidor do mesmo.</a:t>
-            </a:r>
-          </a:p>
-          <a:p>
-            <a:pPr marL="45720" indent="0">
-              <a:lnSpc>
-                <a:spcPct val="90000"/>
-              </a:lnSpc>
-              <a:buNone/>
-            </a:pPr>
-            <a:r>
-              <a:rPr lang="pt-BR" sz="1400" b="1" dirty="0">
-                <a:solidFill>
-                  <a:srgbClr val="FF0000"/>
-                </a:solidFill>
-              </a:rPr>
-              <a:t>Exemplo: Custo de fábrica do carro: R$25.000,00</a:t>
-            </a:r>
-          </a:p>
-          <a:p>
-            <a:pPr marL="45720" indent="0">
-              <a:lnSpc>
-                <a:spcPct val="90000"/>
-              </a:lnSpc>
-              <a:buNone/>
-            </a:pPr>
-            <a:r>
-              <a:rPr lang="pt-BR" sz="1400" b="1" dirty="0">
-                <a:solidFill>
-                  <a:srgbClr val="FF0000"/>
-                </a:solidFill>
-              </a:rPr>
-              <a:t>              Impostos: 45% = R$11.250 (Total R$36.250,00)</a:t>
-            </a:r>
-          </a:p>
-          <a:p>
-            <a:pPr marL="45720" indent="0">
-              <a:lnSpc>
-                <a:spcPct val="90000"/>
-              </a:lnSpc>
-              <a:buNone/>
-            </a:pPr>
-            <a:r>
-              <a:rPr lang="pt-BR" sz="1400" b="1" dirty="0">
-                <a:solidFill>
-                  <a:srgbClr val="FF0000"/>
-                </a:solidFill>
-              </a:rPr>
-              <a:t>              Distribuição 28% = R$10.150 (Total R$ 46.400,00)</a:t>
-            </a:r>
-          </a:p>
-          <a:p>
-            <a:pPr marL="45720" indent="0">
-              <a:lnSpc>
-                <a:spcPct val="90000"/>
-              </a:lnSpc>
-              <a:buNone/>
-            </a:pPr>
-            <a:r>
-              <a:rPr lang="pt-BR" sz="1400" b="1" dirty="0">
-                <a:solidFill>
-                  <a:srgbClr val="FF0000"/>
-                </a:solidFill>
-              </a:rPr>
-              <a:t>	  Para o consumidor: R$ 46.400,00</a:t>
-            </a:r>
+              <a:t>%)</a:t>
+            </a:r>
+            <a:endParaRPr lang="pt-BR" sz="1600" b="1" dirty="0">
+              <a:solidFill>
+                <a:srgbClr val="FF0000"/>
+              </a:solidFill>
+            </a:endParaRPr>
           </a:p>
         </p:txBody>
       </p:sp>
     </p:spTree>
     <p:extLst>
       <p:ext uri="{BB962C8B-B14F-4D97-AF65-F5344CB8AC3E}">
-        <p14:creationId xmlns:p14="http://schemas.microsoft.com/office/powerpoint/2010/main" val="107411007"/>
+        <p14:creationId xmlns:p14="http://schemas.microsoft.com/office/powerpoint/2010/main" val="3405406493"/>
       </p:ext>
     </p:extLst>
   </p:cSld>
@@ -10226,7 +10172,7 @@
     <p:bg>
       <p:bgPr>
         <a:solidFill>
-          <a:schemeClr val="bg2"/>
+          <a:schemeClr val="bg1"/>
         </a:solidFill>
         <a:effectLst/>
       </p:bgPr>
@@ -10247,10 +10193,10 @@
       </p:grpSpPr>
       <p:sp useBgFill="1">
         <p:nvSpPr>
-          <p:cNvPr id="29" name="Rectangle 28">
+          <p:cNvPr id="8" name="Rectangle 7">
             <a:extLst>
               <a:ext uri="{FF2B5EF4-FFF2-40B4-BE49-F238E27FC236}">
-                <a16:creationId xmlns:a16="http://schemas.microsoft.com/office/drawing/2014/main" id="{2654A105-F18C-4E12-B11B-51B12174BB53}"/>
+                <a16:creationId xmlns:a16="http://schemas.microsoft.com/office/drawing/2014/main" id="{F1E0D4A3-ECB8-4689-ABDB-9CE848CE83B9}"/>
               </a:ext>
               <a:ext uri="{C183D7F6-B498-43B3-948B-1728B52AA6E4}">
                 <adec:decorative xmlns:adec="http://schemas.microsoft.com/office/drawing/2017/decorative" xmlns="" val="1"/>
@@ -10307,13 +10253,7 @@
       </p:sp>
       <p:sp>
         <p:nvSpPr>
-          <p:cNvPr id="2" name="Título 1">
-            <a:extLst>
-              <a:ext uri="{FF2B5EF4-FFF2-40B4-BE49-F238E27FC236}">
-                <a16:creationId xmlns:a16="http://schemas.microsoft.com/office/drawing/2014/main" id="{80E5E351-C722-42B0-BFD3-9D9DEB56249A}"/>
-              </a:ext>
-            </a:extLst>
-          </p:cNvPr>
+          <p:cNvPr id="3" name="Título 2"/>
           <p:cNvSpPr>
             <a:spLocks noGrp="1"/>
           </p:cNvSpPr>
@@ -10323,7 +10263,7 @@
         </p:nvSpPr>
         <p:spPr>
           <a:xfrm>
-            <a:off x="323528" y="116633"/>
+            <a:off x="607500" y="447188"/>
             <a:ext cx="7928998" cy="970450"/>
           </a:xfrm>
           <a:effectLst/>
@@ -10334,277 +10274,378 @@
           </a:bodyPr>
           <a:lstStyle/>
           <a:p>
-            <a:r>
-              <a:rPr lang="pt-BR" sz="2400" dirty="0">
+            <a:pPr algn="ctr"/>
+            <a:r>
+              <a:rPr lang="pt-BR" sz="2400" b="1">
                 <a:solidFill>
                   <a:schemeClr val="tx1"/>
                 </a:solidFill>
               </a:rPr>
-              <a:t>Desafio</a:t>
-            </a:r>
-          </a:p>
-        </p:txBody>
-      </p:sp>
-      <p:sp>
-        <p:nvSpPr>
-          <p:cNvPr id="21" name="Espaço Reservado para Conteúdo 2">
+              <a:t>DESENVOLVENDO ALGORITMOS</a:t>
+            </a:r>
+            <a:endParaRPr lang="pt-BR" sz="2400">
+              <a:solidFill>
+                <a:schemeClr val="tx1"/>
+              </a:solidFill>
+            </a:endParaRPr>
+          </a:p>
+        </p:txBody>
+      </p:sp>
+      <p:sp>
+        <p:nvSpPr>
+          <p:cNvPr id="10" name="Freeform: Shape 9">
             <a:extLst>
               <a:ext uri="{FF2B5EF4-FFF2-40B4-BE49-F238E27FC236}">
-                <a16:creationId xmlns:a16="http://schemas.microsoft.com/office/drawing/2014/main" id="{7F0EA9F4-B101-43FA-BBE9-87303929276A}"/>
+                <a16:creationId xmlns:a16="http://schemas.microsoft.com/office/drawing/2014/main" id="{8854772B-9C8F-4037-89E0-3A45208AB395}"/>
+              </a:ext>
+              <a:ext uri="{C183D7F6-B498-43B3-948B-1728B52AA6E4}">
+                <adec:decorative xmlns:adec="http://schemas.microsoft.com/office/drawing/2017/decorative" xmlns="" val="1"/>
               </a:ext>
             </a:extLst>
           </p:cNvPr>
           <p:cNvSpPr>
-            <a:spLocks noGrp="1"/>
-          </p:cNvSpPr>
-          <p:nvPr>
-            <p:ph idx="1"/>
+            <a:spLocks noGrp="1" noRot="1" noChangeAspect="1" noMove="1" noResize="1" noEditPoints="1" noAdjustHandles="1" noChangeArrowheads="1" noChangeShapeType="1" noTextEdit="1"/>
+          </p:cNvSpPr>
+          <p:nvPr>
+            <p:extLst>
+              <p:ext uri="{386F3935-93C4-4BCD-93E2-E3B085C9AB24}">
+                <p16:designElem xmlns:p16="http://schemas.microsoft.com/office/powerpoint/2015/main" val="1"/>
+              </p:ext>
+            </p:extLst>
           </p:nvPr>
         </p:nvSpPr>
         <p:spPr>
           <a:xfrm>
-            <a:off x="323528" y="836712"/>
-            <a:ext cx="8424936" cy="5904655"/>
+            <a:off x="477819" y="1576408"/>
+            <a:ext cx="8188361" cy="4638125"/>
+          </a:xfrm>
+          <a:custGeom>
+            <a:avLst/>
+            <a:gdLst>
+              <a:gd name="connsiteX0" fmla="*/ 5441025 w 10917814"/>
+              <a:gd name="connsiteY0" fmla="*/ 0 h 4638125"/>
+              <a:gd name="connsiteX1" fmla="*/ 5453725 w 10917814"/>
+              <a:gd name="connsiteY1" fmla="*/ 0 h 4638125"/>
+              <a:gd name="connsiteX2" fmla="*/ 5464308 w 10917814"/>
+              <a:gd name="connsiteY2" fmla="*/ 0 h 4638125"/>
+              <a:gd name="connsiteX3" fmla="*/ 5477009 w 10917814"/>
+              <a:gd name="connsiteY3" fmla="*/ 4762 h 4638125"/>
+              <a:gd name="connsiteX4" fmla="*/ 5489708 w 10917814"/>
+              <a:gd name="connsiteY4" fmla="*/ 9525 h 4638125"/>
+              <a:gd name="connsiteX5" fmla="*/ 5498175 w 10917814"/>
+              <a:gd name="connsiteY5" fmla="*/ 12700 h 4638125"/>
+              <a:gd name="connsiteX6" fmla="*/ 5865801 w 10917814"/>
+              <a:gd name="connsiteY6" fmla="*/ 288419 h 4638125"/>
+              <a:gd name="connsiteX7" fmla="*/ 10765009 w 10917814"/>
+              <a:gd name="connsiteY7" fmla="*/ 288419 h 4638125"/>
+              <a:gd name="connsiteX8" fmla="*/ 10917814 w 10917814"/>
+              <a:gd name="connsiteY8" fmla="*/ 441224 h 4638125"/>
+              <a:gd name="connsiteX9" fmla="*/ 10917814 w 10917814"/>
+              <a:gd name="connsiteY9" fmla="*/ 4485320 h 4638125"/>
+              <a:gd name="connsiteX10" fmla="*/ 10765009 w 10917814"/>
+              <a:gd name="connsiteY10" fmla="*/ 4638125 h 4638125"/>
+              <a:gd name="connsiteX11" fmla="*/ 152805 w 10917814"/>
+              <a:gd name="connsiteY11" fmla="*/ 4638125 h 4638125"/>
+              <a:gd name="connsiteX12" fmla="*/ 0 w 10917814"/>
+              <a:gd name="connsiteY12" fmla="*/ 4485320 h 4638125"/>
+              <a:gd name="connsiteX13" fmla="*/ 0 w 10917814"/>
+              <a:gd name="connsiteY13" fmla="*/ 441224 h 4638125"/>
+              <a:gd name="connsiteX14" fmla="*/ 152805 w 10917814"/>
+              <a:gd name="connsiteY14" fmla="*/ 288419 h 4638125"/>
+              <a:gd name="connsiteX15" fmla="*/ 5041650 w 10917814"/>
+              <a:gd name="connsiteY15" fmla="*/ 288419 h 4638125"/>
+              <a:gd name="connsiteX16" fmla="*/ 5409275 w 10917814"/>
+              <a:gd name="connsiteY16" fmla="*/ 12700 h 4638125"/>
+              <a:gd name="connsiteX17" fmla="*/ 5417742 w 10917814"/>
+              <a:gd name="connsiteY17" fmla="*/ 9525 h 4638125"/>
+              <a:gd name="connsiteX18" fmla="*/ 5430442 w 10917814"/>
+              <a:gd name="connsiteY18" fmla="*/ 4762 h 4638125"/>
+            </a:gdLst>
+            <a:ahLst/>
+            <a:cxnLst>
+              <a:cxn ang="0">
+                <a:pos x="connsiteX0" y="connsiteY0"/>
+              </a:cxn>
+              <a:cxn ang="0">
+                <a:pos x="connsiteX1" y="connsiteY1"/>
+              </a:cxn>
+              <a:cxn ang="0">
+                <a:pos x="connsiteX2" y="connsiteY2"/>
+              </a:cxn>
+              <a:cxn ang="0">
+                <a:pos x="connsiteX3" y="connsiteY3"/>
+              </a:cxn>
+              <a:cxn ang="0">
+                <a:pos x="connsiteX4" y="connsiteY4"/>
+              </a:cxn>
+              <a:cxn ang="0">
+                <a:pos x="connsiteX5" y="connsiteY5"/>
+              </a:cxn>
+              <a:cxn ang="0">
+                <a:pos x="connsiteX6" y="connsiteY6"/>
+              </a:cxn>
+              <a:cxn ang="0">
+                <a:pos x="connsiteX7" y="connsiteY7"/>
+              </a:cxn>
+              <a:cxn ang="0">
+                <a:pos x="connsiteX8" y="connsiteY8"/>
+              </a:cxn>
+              <a:cxn ang="0">
+                <a:pos x="connsiteX9" y="connsiteY9"/>
+              </a:cxn>
+              <a:cxn ang="0">
+                <a:pos x="connsiteX10" y="connsiteY10"/>
+              </a:cxn>
+              <a:cxn ang="0">
+                <a:pos x="connsiteX11" y="connsiteY11"/>
+              </a:cxn>
+              <a:cxn ang="0">
+                <a:pos x="connsiteX12" y="connsiteY12"/>
+              </a:cxn>
+              <a:cxn ang="0">
+                <a:pos x="connsiteX13" y="connsiteY13"/>
+              </a:cxn>
+              <a:cxn ang="0">
+                <a:pos x="connsiteX14" y="connsiteY14"/>
+              </a:cxn>
+              <a:cxn ang="0">
+                <a:pos x="connsiteX15" y="connsiteY15"/>
+              </a:cxn>
+              <a:cxn ang="0">
+                <a:pos x="connsiteX16" y="connsiteY16"/>
+              </a:cxn>
+              <a:cxn ang="0">
+                <a:pos x="connsiteX17" y="connsiteY17"/>
+              </a:cxn>
+              <a:cxn ang="0">
+                <a:pos x="connsiteX18" y="connsiteY18"/>
+              </a:cxn>
+            </a:cxnLst>
+            <a:rect l="l" t="t" r="r" b="b"/>
+            <a:pathLst>
+              <a:path w="10917814" h="4638125">
+                <a:moveTo>
+                  <a:pt x="5441025" y="0"/>
+                </a:moveTo>
+                <a:lnTo>
+                  <a:pt x="5453725" y="0"/>
+                </a:lnTo>
+                <a:lnTo>
+                  <a:pt x="5464308" y="0"/>
+                </a:lnTo>
+                <a:lnTo>
+                  <a:pt x="5477009" y="4762"/>
+                </a:lnTo>
+                <a:lnTo>
+                  <a:pt x="5489708" y="9525"/>
+                </a:lnTo>
+                <a:lnTo>
+                  <a:pt x="5498175" y="12700"/>
+                </a:lnTo>
+                <a:lnTo>
+                  <a:pt x="5865801" y="288419"/>
+                </a:lnTo>
+                <a:lnTo>
+                  <a:pt x="10765009" y="288419"/>
+                </a:lnTo>
+                <a:cubicBezTo>
+                  <a:pt x="10849401" y="288419"/>
+                  <a:pt x="10917814" y="356832"/>
+                  <a:pt x="10917814" y="441224"/>
+                </a:cubicBezTo>
+                <a:lnTo>
+                  <a:pt x="10917814" y="4485320"/>
+                </a:lnTo>
+                <a:cubicBezTo>
+                  <a:pt x="10917814" y="4569712"/>
+                  <a:pt x="10849401" y="4638125"/>
+                  <a:pt x="10765009" y="4638125"/>
+                </a:cubicBezTo>
+                <a:lnTo>
+                  <a:pt x="152805" y="4638125"/>
+                </a:lnTo>
+                <a:cubicBezTo>
+                  <a:pt x="68413" y="4638125"/>
+                  <a:pt x="0" y="4569712"/>
+                  <a:pt x="0" y="4485320"/>
+                </a:cubicBezTo>
+                <a:lnTo>
+                  <a:pt x="0" y="441224"/>
+                </a:lnTo>
+                <a:cubicBezTo>
+                  <a:pt x="0" y="356832"/>
+                  <a:pt x="68413" y="288419"/>
+                  <a:pt x="152805" y="288419"/>
+                </a:cubicBezTo>
+                <a:lnTo>
+                  <a:pt x="5041650" y="288419"/>
+                </a:lnTo>
+                <a:lnTo>
+                  <a:pt x="5409275" y="12700"/>
+                </a:lnTo>
+                <a:lnTo>
+                  <a:pt x="5417742" y="9525"/>
+                </a:lnTo>
+                <a:lnTo>
+                  <a:pt x="5430442" y="4762"/>
+                </a:lnTo>
+                <a:close/>
+              </a:path>
+            </a:pathLst>
+          </a:custGeom>
+          <a:noFill/>
+          <a:ln w="38100">
+            <a:solidFill>
+              <a:schemeClr val="accent1"/>
+            </a:solidFill>
+          </a:ln>
+          <a:effectLst/>
+        </p:spPr>
+        <p:style>
+          <a:lnRef idx="2">
+            <a:schemeClr val="accent1">
+              <a:shade val="50000"/>
+            </a:schemeClr>
+          </a:lnRef>
+          <a:fillRef idx="1">
+            <a:schemeClr val="accent1"/>
+          </a:fillRef>
+          <a:effectRef idx="0">
+            <a:schemeClr val="accent1"/>
+          </a:effectRef>
+          <a:fontRef idx="minor">
+            <a:schemeClr val="lt1"/>
+          </a:fontRef>
+        </p:style>
+        <p:txBody>
+          <a:bodyPr wrap="square" rtlCol="0" anchor="ctr">
+            <a:noAutofit/>
+          </a:bodyPr>
+          <a:lstStyle/>
+          <a:p>
+            <a:pPr algn="ctr"/>
+            <a:endParaRPr lang="en-US"/>
+          </a:p>
+        </p:txBody>
+      </p:sp>
+      <p:sp>
+        <p:nvSpPr>
+          <p:cNvPr id="2" name="Espaço Reservado para Conteúdo 1"/>
+          <p:cNvSpPr>
+            <a:spLocks noGrp="1"/>
+          </p:cNvSpPr>
+          <p:nvPr>
+            <p:ph idx="1"/>
+          </p:nvPr>
+        </p:nvSpPr>
+        <p:spPr>
+          <a:xfrm>
+            <a:off x="607500" y="1988840"/>
+            <a:ext cx="7928998" cy="4225693"/>
           </a:xfrm>
           <a:effectLst/>
         </p:spPr>
         <p:txBody>
-          <a:bodyPr anchor="t">
-            <a:normAutofit fontScale="92500" lnSpcReduction="10000"/>
+          <a:bodyPr>
+            <a:noAutofit/>
           </a:bodyPr>
           <a:lstStyle/>
           <a:p>
-            <a:pPr>
+            <a:pPr marL="0" indent="0" algn="just">
               <a:lnSpc>
-                <a:spcPct val="90000"/>
+                <a:spcPct val="150000"/>
               </a:lnSpc>
+              <a:buNone/>
             </a:pPr>
             <a:r>
-              <a:rPr lang="pt-BR" b="1" dirty="0"/>
-              <a:t>Lista de Exercícios:</a:t>
-            </a:r>
-          </a:p>
-          <a:p>
-            <a:pPr marL="0" indent="0">
+              <a:rPr lang="pt-BR" sz="1600" b="1" dirty="0"/>
+              <a:t>4</a:t>
+            </a:r>
+            <a:r>
+              <a:rPr lang="pt-BR" sz="1600" b="1" dirty="0"/>
+              <a:t>) O custo ao consumidor de um carro novo é a soma do custo de fábrica com a percentagem do distribuidor e dos impostos (aplicados, primeiro os impostos sobre o custo de fábrica, e depois a percentagem do distribuidor sobre o resultado). Supondo que a percentagem do distribuidor seja de 28% e os impostos 45%. Escrever um algoritmo que leia o custo de fábrica de um carro e informe o custo ao consumidor do mesmo.</a:t>
+            </a:r>
+          </a:p>
+          <a:p>
+            <a:pPr marL="45720" indent="0">
               <a:lnSpc>
                 <a:spcPct val="90000"/>
               </a:lnSpc>
               <a:buNone/>
             </a:pPr>
             <a:r>
-              <a:rPr lang="pt-BR" b="1" dirty="0"/>
-              <a:t>1) Faça um algoritmo que faça conversão de minutos e horas em segundos. Solicite ao usuário a hora e os minutos separado.</a:t>
-            </a:r>
-          </a:p>
-          <a:p>
-            <a:pPr>
-              <a:lnSpc>
-                <a:spcPct val="90000"/>
-              </a:lnSpc>
-              <a:buFont typeface="Wingdings" panose="05000000000000000000" pitchFamily="2" charset="2"/>
-              <a:buChar char="Ø"/>
-            </a:pPr>
-            <a:r>
-              <a:rPr lang="pt-BR" b="1" dirty="0">
+              <a:rPr lang="pt-BR" sz="1600" b="1" dirty="0">
                 <a:solidFill>
-                  <a:srgbClr val="0070C0"/>
+                  <a:srgbClr val="FF0000"/>
                 </a:solidFill>
               </a:rPr>
-              <a:t> Por exemplo 4h23 minutos equivale a 4.38 para fazer cálculos matemáticos</a:t>
-            </a:r>
-          </a:p>
-          <a:p>
-            <a:pPr>
-              <a:lnSpc>
-                <a:spcPct val="90000"/>
-              </a:lnSpc>
-              <a:buFont typeface="Wingdings" panose="05000000000000000000" pitchFamily="2" charset="2"/>
-              <a:buChar char="Ø"/>
-            </a:pPr>
-            <a:r>
-              <a:rPr lang="pt-BR" b="1" dirty="0">
-                <a:solidFill>
-                  <a:srgbClr val="0070C0"/>
-                </a:solidFill>
-              </a:rPr>
-              <a:t>Para chegar a essa conclusão: 23/60 = 0,38 </a:t>
-            </a:r>
-            <a:r>
-              <a:rPr lang="pt-BR" b="1" dirty="0">
-                <a:solidFill>
-                  <a:srgbClr val="0070C0"/>
-                </a:solidFill>
-                <a:sym typeface="Wingdings" panose="05000000000000000000" pitchFamily="2" charset="2"/>
-              </a:rPr>
-              <a:t> 4+0,38 = 4,38</a:t>
-            </a:r>
-            <a:endParaRPr lang="pt-BR" b="1" dirty="0">
-              <a:solidFill>
-                <a:srgbClr val="0070C0"/>
-              </a:solidFill>
-            </a:endParaRPr>
-          </a:p>
-          <a:p>
-            <a:pPr>
-              <a:lnSpc>
-                <a:spcPct val="90000"/>
-              </a:lnSpc>
-              <a:buFont typeface="Wingdings" panose="05000000000000000000" pitchFamily="2" charset="2"/>
-              <a:buChar char="Ø"/>
-            </a:pPr>
-            <a:r>
-              <a:rPr lang="pt-BR" b="1" dirty="0"/>
-              <a:t>	</a:t>
-            </a:r>
-            <a:r>
-              <a:rPr lang="pt-BR" b="1" dirty="0">
-                <a:solidFill>
-                  <a:schemeClr val="accent1">
-                    <a:lumMod val="60000"/>
-                    <a:lumOff val="40000"/>
-                  </a:schemeClr>
-                </a:solidFill>
-              </a:rPr>
-              <a:t>Para o Teste de Mesa</a:t>
-            </a:r>
-          </a:p>
-          <a:p>
-            <a:pPr marL="0" indent="0">
+              <a:t>Exemplo:	Custo de fábrica do carro: R$25.000,00</a:t>
+            </a:r>
+          </a:p>
+          <a:p>
+            <a:pPr marL="45720" indent="0">
               <a:lnSpc>
                 <a:spcPct val="90000"/>
               </a:lnSpc>
               <a:buNone/>
             </a:pPr>
             <a:r>
-              <a:rPr lang="pt-BR" b="1" dirty="0">
+              <a:rPr lang="pt-BR" sz="1600" b="1" dirty="0">
                 <a:solidFill>
-                  <a:schemeClr val="accent1">
-                    <a:lumMod val="60000"/>
-                    <a:lumOff val="40000"/>
-                  </a:schemeClr>
+                  <a:srgbClr val="FF0000"/>
                 </a:solidFill>
               </a:rPr>
-              <a:t>	3h40 = 3.67</a:t>
-            </a:r>
-          </a:p>
-          <a:p>
-            <a:pPr marL="0" indent="0">
+              <a:t>			Impostos: 45% = R$11.250 (Total R$36.250,00)</a:t>
+            </a:r>
+          </a:p>
+          <a:p>
+            <a:pPr marL="45720" indent="0">
               <a:lnSpc>
                 <a:spcPct val="90000"/>
               </a:lnSpc>
               <a:buNone/>
             </a:pPr>
             <a:r>
-              <a:rPr lang="pt-BR" b="1" dirty="0">
+              <a:rPr lang="pt-BR" sz="1600" b="1" dirty="0">
                 <a:solidFill>
-                  <a:schemeClr val="accent1">
-                    <a:lumMod val="60000"/>
-                    <a:lumOff val="40000"/>
-                  </a:schemeClr>
+                  <a:srgbClr val="FF0000"/>
                 </a:solidFill>
               </a:rPr>
-              <a:t>	1h32 = 1.52	</a:t>
-            </a:r>
-          </a:p>
-          <a:p>
-            <a:pPr marL="0" indent="0">
+              <a:t>			Distribuição 28% = R$10.150 (Total R$ 46.400,00)</a:t>
+            </a:r>
+          </a:p>
+          <a:p>
+            <a:pPr marL="45720" indent="0">
               <a:lnSpc>
                 <a:spcPct val="90000"/>
               </a:lnSpc>
               <a:buNone/>
             </a:pPr>
             <a:r>
-              <a:rPr lang="pt-BR" b="1" dirty="0"/>
-              <a:t>2) Continuando do exercício anterior, um funcionário trabalha em determinada empresa e quer saber quanto irá ganhar de hora extra. Você deverá fazer um algoritmo que solicite quantas horas e quantos minutos ele trabalhou, solicite horas e minutos de forma separada. Depois pergunte quanto ele ganha por hora e informe quanto ele irá ganhar. Sabendo que nessa empresa o funcionário ganha 70% a mais pelas horas trabalhadas.</a:t>
-            </a:r>
-          </a:p>
-          <a:p>
-            <a:pPr marL="0" indent="0">
-              <a:lnSpc>
-                <a:spcPct val="90000"/>
-              </a:lnSpc>
-              <a:buNone/>
-            </a:pPr>
-            <a:r>
-              <a:rPr lang="pt-BR" b="1" dirty="0">
+              <a:rPr lang="pt-BR" sz="1600" b="1" dirty="0">
                 <a:solidFill>
-                  <a:srgbClr val="0070C0"/>
+                  <a:srgbClr val="FF0000"/>
                 </a:solidFill>
               </a:rPr>
-              <a:t>Ex. Trabalhei neste mês 15h45min == 15.75</a:t>
-            </a:r>
-          </a:p>
-          <a:p>
-            <a:pPr marL="0" indent="0">
-              <a:lnSpc>
-                <a:spcPct val="90000"/>
-              </a:lnSpc>
-              <a:buNone/>
-            </a:pPr>
-            <a:r>
-              <a:rPr lang="pt-BR" b="1" dirty="0">
-                <a:solidFill>
-                  <a:srgbClr val="0070C0"/>
-                </a:solidFill>
-              </a:rPr>
-              <a:t>Ganho R$ 25 reais por hora</a:t>
-            </a:r>
-          </a:p>
-          <a:p>
-            <a:pPr marL="0" indent="0">
-              <a:lnSpc>
-                <a:spcPct val="90000"/>
-              </a:lnSpc>
-              <a:buNone/>
-            </a:pPr>
-            <a:r>
-              <a:rPr lang="pt-BR" b="1" dirty="0">
-                <a:solidFill>
-                  <a:srgbClr val="0070C0"/>
-                </a:solidFill>
-              </a:rPr>
-              <a:t>Resultado tem que ser = R$ 669,37 com os 70% amais</a:t>
-            </a:r>
-          </a:p>
-          <a:p>
-            <a:pPr marL="0" indent="0">
-              <a:lnSpc>
-                <a:spcPct val="90000"/>
-              </a:lnSpc>
-              <a:buNone/>
-            </a:pPr>
-            <a:r>
-              <a:rPr lang="pt-BR" b="1" dirty="0">
-                <a:solidFill>
-                  <a:schemeClr val="accent1">
-                    <a:lumMod val="60000"/>
-                    <a:lumOff val="40000"/>
-                  </a:schemeClr>
-                </a:solidFill>
-              </a:rPr>
-              <a:t>Outro teste de mesa: Se trabalhei 20h, devo ganhar R$ 850,00</a:t>
-            </a:r>
-          </a:p>
-          <a:p>
-            <a:pPr marL="0" indent="0">
-              <a:lnSpc>
-                <a:spcPct val="90000"/>
-              </a:lnSpc>
-              <a:buNone/>
-            </a:pPr>
-            <a:endParaRPr lang="pt-BR" sz="900" dirty="0"/>
+              <a:t>			Para o consumidor: R$ 46.400,00</a:t>
+            </a:r>
+            <a:endParaRPr lang="pt-BR" sz="1600" b="1" dirty="0">
+              <a:solidFill>
+                <a:srgbClr val="FF0000"/>
+              </a:solidFill>
+            </a:endParaRPr>
           </a:p>
         </p:txBody>
       </p:sp>
     </p:spTree>
     <p:extLst>
       <p:ext uri="{BB962C8B-B14F-4D97-AF65-F5344CB8AC3E}">
-        <p14:creationId xmlns:p14="http://schemas.microsoft.com/office/powerpoint/2010/main" val="2889787771"/>
+        <p14:creationId xmlns:p14="http://schemas.microsoft.com/office/powerpoint/2010/main" val="3106280531"/>
       </p:ext>
     </p:extLst>
   </p:cSld>
   <p:clrMapOvr>
-    <a:masterClrMapping/>
+    <a:overrideClrMapping bg1="lt1" tx1="dk1" bg2="lt2" tx2="dk2" accent1="accent1" accent2="accent2" accent3="accent3" accent4="accent4" accent5="accent5" accent6="accent6" hlink="hlink" folHlink="folHlink"/>
   </p:clrMapOvr>
   <p:timing>
     <p:tnLst>
@@ -10622,7 +10663,7 @@
     <p:bg>
       <p:bgPr>
         <a:solidFill>
-          <a:schemeClr val="bg2"/>
+          <a:schemeClr val="bg1"/>
         </a:solidFill>
         <a:effectLst/>
       </p:bgPr>
@@ -10643,10 +10684,10 @@
       </p:grpSpPr>
       <p:sp useBgFill="1">
         <p:nvSpPr>
-          <p:cNvPr id="29" name="Rectangle 28">
+          <p:cNvPr id="8" name="Rectangle 7">
             <a:extLst>
               <a:ext uri="{FF2B5EF4-FFF2-40B4-BE49-F238E27FC236}">
-                <a16:creationId xmlns:a16="http://schemas.microsoft.com/office/drawing/2014/main" id="{2654A105-F18C-4E12-B11B-51B12174BB53}"/>
+                <a16:creationId xmlns:a16="http://schemas.microsoft.com/office/drawing/2014/main" id="{F1E0D4A3-ECB8-4689-ABDB-9CE848CE83B9}"/>
               </a:ext>
               <a:ext uri="{C183D7F6-B498-43B3-948B-1728B52AA6E4}">
                 <adec:decorative xmlns:adec="http://schemas.microsoft.com/office/drawing/2017/decorative" xmlns="" val="1"/>
@@ -10703,13 +10744,7 @@
       </p:sp>
       <p:sp>
         <p:nvSpPr>
-          <p:cNvPr id="2" name="Título 1">
-            <a:extLst>
-              <a:ext uri="{FF2B5EF4-FFF2-40B4-BE49-F238E27FC236}">
-                <a16:creationId xmlns:a16="http://schemas.microsoft.com/office/drawing/2014/main" id="{80E5E351-C722-42B0-BFD3-9D9DEB56249A}"/>
-              </a:ext>
-            </a:extLst>
-          </p:cNvPr>
+          <p:cNvPr id="3" name="Título 2"/>
           <p:cNvSpPr>
             <a:spLocks noGrp="1"/>
           </p:cNvSpPr>
@@ -10719,7 +10754,7 @@
         </p:nvSpPr>
         <p:spPr>
           <a:xfrm>
-            <a:off x="323528" y="116633"/>
+            <a:off x="607500" y="447188"/>
             <a:ext cx="7928998" cy="970450"/>
           </a:xfrm>
           <a:effectLst/>
@@ -10730,256 +10765,415 @@
           </a:bodyPr>
           <a:lstStyle/>
           <a:p>
-            <a:r>
-              <a:rPr lang="pt-BR" sz="2400" dirty="0">
+            <a:pPr algn="ctr"/>
+            <a:r>
+              <a:rPr lang="pt-BR" sz="2400" dirty="0" smtClean="0">
                 <a:solidFill>
                   <a:schemeClr val="tx1"/>
                 </a:solidFill>
               </a:rPr>
-              <a:t>Desafio</a:t>
-            </a:r>
-          </a:p>
-        </p:txBody>
-      </p:sp>
-      <p:sp>
-        <p:nvSpPr>
-          <p:cNvPr id="21" name="Espaço Reservado para Conteúdo 2">
+              <a:t>DESAFIO -  LISTA DE EXERCÍCIOS</a:t>
+            </a:r>
+            <a:endParaRPr lang="pt-BR" sz="2400" dirty="0">
+              <a:solidFill>
+                <a:schemeClr val="tx1"/>
+              </a:solidFill>
+            </a:endParaRPr>
+          </a:p>
+        </p:txBody>
+      </p:sp>
+      <p:sp>
+        <p:nvSpPr>
+          <p:cNvPr id="10" name="Freeform: Shape 9">
             <a:extLst>
               <a:ext uri="{FF2B5EF4-FFF2-40B4-BE49-F238E27FC236}">
-                <a16:creationId xmlns:a16="http://schemas.microsoft.com/office/drawing/2014/main" id="{7F0EA9F4-B101-43FA-BBE9-87303929276A}"/>
+                <a16:creationId xmlns:a16="http://schemas.microsoft.com/office/drawing/2014/main" id="{8854772B-9C8F-4037-89E0-3A45208AB395}"/>
+              </a:ext>
+              <a:ext uri="{C183D7F6-B498-43B3-948B-1728B52AA6E4}">
+                <adec:decorative xmlns:adec="http://schemas.microsoft.com/office/drawing/2017/decorative" xmlns="" val="1"/>
               </a:ext>
             </a:extLst>
           </p:cNvPr>
           <p:cNvSpPr>
-            <a:spLocks noGrp="1"/>
-          </p:cNvSpPr>
-          <p:nvPr>
-            <p:ph idx="1"/>
+            <a:spLocks noGrp="1" noRot="1" noChangeAspect="1" noMove="1" noResize="1" noEditPoints="1" noAdjustHandles="1" noChangeArrowheads="1" noChangeShapeType="1" noTextEdit="1"/>
+          </p:cNvSpPr>
+          <p:nvPr>
+            <p:extLst>
+              <p:ext uri="{386F3935-93C4-4BCD-93E2-E3B085C9AB24}">
+                <p16:designElem xmlns:p16="http://schemas.microsoft.com/office/powerpoint/2015/main" val="1"/>
+              </p:ext>
+            </p:extLst>
           </p:nvPr>
         </p:nvSpPr>
         <p:spPr>
           <a:xfrm>
-            <a:off x="323528" y="836712"/>
-            <a:ext cx="8424936" cy="5904655"/>
+            <a:off x="477819" y="1576408"/>
+            <a:ext cx="8188361" cy="4638125"/>
+          </a:xfrm>
+          <a:custGeom>
+            <a:avLst/>
+            <a:gdLst>
+              <a:gd name="connsiteX0" fmla="*/ 5441025 w 10917814"/>
+              <a:gd name="connsiteY0" fmla="*/ 0 h 4638125"/>
+              <a:gd name="connsiteX1" fmla="*/ 5453725 w 10917814"/>
+              <a:gd name="connsiteY1" fmla="*/ 0 h 4638125"/>
+              <a:gd name="connsiteX2" fmla="*/ 5464308 w 10917814"/>
+              <a:gd name="connsiteY2" fmla="*/ 0 h 4638125"/>
+              <a:gd name="connsiteX3" fmla="*/ 5477009 w 10917814"/>
+              <a:gd name="connsiteY3" fmla="*/ 4762 h 4638125"/>
+              <a:gd name="connsiteX4" fmla="*/ 5489708 w 10917814"/>
+              <a:gd name="connsiteY4" fmla="*/ 9525 h 4638125"/>
+              <a:gd name="connsiteX5" fmla="*/ 5498175 w 10917814"/>
+              <a:gd name="connsiteY5" fmla="*/ 12700 h 4638125"/>
+              <a:gd name="connsiteX6" fmla="*/ 5865801 w 10917814"/>
+              <a:gd name="connsiteY6" fmla="*/ 288419 h 4638125"/>
+              <a:gd name="connsiteX7" fmla="*/ 10765009 w 10917814"/>
+              <a:gd name="connsiteY7" fmla="*/ 288419 h 4638125"/>
+              <a:gd name="connsiteX8" fmla="*/ 10917814 w 10917814"/>
+              <a:gd name="connsiteY8" fmla="*/ 441224 h 4638125"/>
+              <a:gd name="connsiteX9" fmla="*/ 10917814 w 10917814"/>
+              <a:gd name="connsiteY9" fmla="*/ 4485320 h 4638125"/>
+              <a:gd name="connsiteX10" fmla="*/ 10765009 w 10917814"/>
+              <a:gd name="connsiteY10" fmla="*/ 4638125 h 4638125"/>
+              <a:gd name="connsiteX11" fmla="*/ 152805 w 10917814"/>
+              <a:gd name="connsiteY11" fmla="*/ 4638125 h 4638125"/>
+              <a:gd name="connsiteX12" fmla="*/ 0 w 10917814"/>
+              <a:gd name="connsiteY12" fmla="*/ 4485320 h 4638125"/>
+              <a:gd name="connsiteX13" fmla="*/ 0 w 10917814"/>
+              <a:gd name="connsiteY13" fmla="*/ 441224 h 4638125"/>
+              <a:gd name="connsiteX14" fmla="*/ 152805 w 10917814"/>
+              <a:gd name="connsiteY14" fmla="*/ 288419 h 4638125"/>
+              <a:gd name="connsiteX15" fmla="*/ 5041650 w 10917814"/>
+              <a:gd name="connsiteY15" fmla="*/ 288419 h 4638125"/>
+              <a:gd name="connsiteX16" fmla="*/ 5409275 w 10917814"/>
+              <a:gd name="connsiteY16" fmla="*/ 12700 h 4638125"/>
+              <a:gd name="connsiteX17" fmla="*/ 5417742 w 10917814"/>
+              <a:gd name="connsiteY17" fmla="*/ 9525 h 4638125"/>
+              <a:gd name="connsiteX18" fmla="*/ 5430442 w 10917814"/>
+              <a:gd name="connsiteY18" fmla="*/ 4762 h 4638125"/>
+            </a:gdLst>
+            <a:ahLst/>
+            <a:cxnLst>
+              <a:cxn ang="0">
+                <a:pos x="connsiteX0" y="connsiteY0"/>
+              </a:cxn>
+              <a:cxn ang="0">
+                <a:pos x="connsiteX1" y="connsiteY1"/>
+              </a:cxn>
+              <a:cxn ang="0">
+                <a:pos x="connsiteX2" y="connsiteY2"/>
+              </a:cxn>
+              <a:cxn ang="0">
+                <a:pos x="connsiteX3" y="connsiteY3"/>
+              </a:cxn>
+              <a:cxn ang="0">
+                <a:pos x="connsiteX4" y="connsiteY4"/>
+              </a:cxn>
+              <a:cxn ang="0">
+                <a:pos x="connsiteX5" y="connsiteY5"/>
+              </a:cxn>
+              <a:cxn ang="0">
+                <a:pos x="connsiteX6" y="connsiteY6"/>
+              </a:cxn>
+              <a:cxn ang="0">
+                <a:pos x="connsiteX7" y="connsiteY7"/>
+              </a:cxn>
+              <a:cxn ang="0">
+                <a:pos x="connsiteX8" y="connsiteY8"/>
+              </a:cxn>
+              <a:cxn ang="0">
+                <a:pos x="connsiteX9" y="connsiteY9"/>
+              </a:cxn>
+              <a:cxn ang="0">
+                <a:pos x="connsiteX10" y="connsiteY10"/>
+              </a:cxn>
+              <a:cxn ang="0">
+                <a:pos x="connsiteX11" y="connsiteY11"/>
+              </a:cxn>
+              <a:cxn ang="0">
+                <a:pos x="connsiteX12" y="connsiteY12"/>
+              </a:cxn>
+              <a:cxn ang="0">
+                <a:pos x="connsiteX13" y="connsiteY13"/>
+              </a:cxn>
+              <a:cxn ang="0">
+                <a:pos x="connsiteX14" y="connsiteY14"/>
+              </a:cxn>
+              <a:cxn ang="0">
+                <a:pos x="connsiteX15" y="connsiteY15"/>
+              </a:cxn>
+              <a:cxn ang="0">
+                <a:pos x="connsiteX16" y="connsiteY16"/>
+              </a:cxn>
+              <a:cxn ang="0">
+                <a:pos x="connsiteX17" y="connsiteY17"/>
+              </a:cxn>
+              <a:cxn ang="0">
+                <a:pos x="connsiteX18" y="connsiteY18"/>
+              </a:cxn>
+            </a:cxnLst>
+            <a:rect l="l" t="t" r="r" b="b"/>
+            <a:pathLst>
+              <a:path w="10917814" h="4638125">
+                <a:moveTo>
+                  <a:pt x="5441025" y="0"/>
+                </a:moveTo>
+                <a:lnTo>
+                  <a:pt x="5453725" y="0"/>
+                </a:lnTo>
+                <a:lnTo>
+                  <a:pt x="5464308" y="0"/>
+                </a:lnTo>
+                <a:lnTo>
+                  <a:pt x="5477009" y="4762"/>
+                </a:lnTo>
+                <a:lnTo>
+                  <a:pt x="5489708" y="9525"/>
+                </a:lnTo>
+                <a:lnTo>
+                  <a:pt x="5498175" y="12700"/>
+                </a:lnTo>
+                <a:lnTo>
+                  <a:pt x="5865801" y="288419"/>
+                </a:lnTo>
+                <a:lnTo>
+                  <a:pt x="10765009" y="288419"/>
+                </a:lnTo>
+                <a:cubicBezTo>
+                  <a:pt x="10849401" y="288419"/>
+                  <a:pt x="10917814" y="356832"/>
+                  <a:pt x="10917814" y="441224"/>
+                </a:cubicBezTo>
+                <a:lnTo>
+                  <a:pt x="10917814" y="4485320"/>
+                </a:lnTo>
+                <a:cubicBezTo>
+                  <a:pt x="10917814" y="4569712"/>
+                  <a:pt x="10849401" y="4638125"/>
+                  <a:pt x="10765009" y="4638125"/>
+                </a:cubicBezTo>
+                <a:lnTo>
+                  <a:pt x="152805" y="4638125"/>
+                </a:lnTo>
+                <a:cubicBezTo>
+                  <a:pt x="68413" y="4638125"/>
+                  <a:pt x="0" y="4569712"/>
+                  <a:pt x="0" y="4485320"/>
+                </a:cubicBezTo>
+                <a:lnTo>
+                  <a:pt x="0" y="441224"/>
+                </a:lnTo>
+                <a:cubicBezTo>
+                  <a:pt x="0" y="356832"/>
+                  <a:pt x="68413" y="288419"/>
+                  <a:pt x="152805" y="288419"/>
+                </a:cubicBezTo>
+                <a:lnTo>
+                  <a:pt x="5041650" y="288419"/>
+                </a:lnTo>
+                <a:lnTo>
+                  <a:pt x="5409275" y="12700"/>
+                </a:lnTo>
+                <a:lnTo>
+                  <a:pt x="5417742" y="9525"/>
+                </a:lnTo>
+                <a:lnTo>
+                  <a:pt x="5430442" y="4762"/>
+                </a:lnTo>
+                <a:close/>
+              </a:path>
+            </a:pathLst>
+          </a:custGeom>
+          <a:noFill/>
+          <a:ln w="38100">
+            <a:solidFill>
+              <a:schemeClr val="accent1"/>
+            </a:solidFill>
+          </a:ln>
+          <a:effectLst/>
+        </p:spPr>
+        <p:style>
+          <a:lnRef idx="2">
+            <a:schemeClr val="accent1">
+              <a:shade val="50000"/>
+            </a:schemeClr>
+          </a:lnRef>
+          <a:fillRef idx="1">
+            <a:schemeClr val="accent1"/>
+          </a:fillRef>
+          <a:effectRef idx="0">
+            <a:schemeClr val="accent1"/>
+          </a:effectRef>
+          <a:fontRef idx="minor">
+            <a:schemeClr val="lt1"/>
+          </a:fontRef>
+        </p:style>
+        <p:txBody>
+          <a:bodyPr wrap="square" rtlCol="0" anchor="ctr">
+            <a:noAutofit/>
+          </a:bodyPr>
+          <a:lstStyle/>
+          <a:p>
+            <a:pPr algn="ctr"/>
+            <a:endParaRPr lang="en-US"/>
+          </a:p>
+        </p:txBody>
+      </p:sp>
+      <p:sp>
+        <p:nvSpPr>
+          <p:cNvPr id="2" name="Espaço Reservado para Conteúdo 1"/>
+          <p:cNvSpPr>
+            <a:spLocks noGrp="1"/>
+          </p:cNvSpPr>
+          <p:nvPr>
+            <p:ph idx="1"/>
+          </p:nvPr>
+        </p:nvSpPr>
+        <p:spPr>
+          <a:xfrm>
+            <a:off x="607500" y="1988840"/>
+            <a:ext cx="7928998" cy="4225693"/>
           </a:xfrm>
           <a:effectLst/>
         </p:spPr>
         <p:txBody>
-          <a:bodyPr anchor="t">
-            <a:normAutofit/>
+          <a:bodyPr>
+            <a:noAutofit/>
           </a:bodyPr>
           <a:lstStyle/>
           <a:p>
-            <a:pPr>
+            <a:pPr marL="0" indent="0" algn="just">
               <a:lnSpc>
-                <a:spcPct val="90000"/>
-              </a:lnSpc>
-            </a:pPr>
-            <a:r>
-              <a:rPr lang="pt-BR" b="1" dirty="0"/>
-              <a:t>Lista de Exercícios:</a:t>
-            </a:r>
-          </a:p>
-          <a:p>
-            <a:pPr marL="0" indent="0">
-              <a:lnSpc>
-                <a:spcPct val="90000"/>
+                <a:spcPct val="150000"/>
               </a:lnSpc>
               <a:buNone/>
             </a:pPr>
             <a:r>
-              <a:rPr lang="pt-BR" b="1" dirty="0"/>
-              <a:t>3) Faça um algoritmo que calcule quanto o usuário irá gastar de gasolina em uma viagem, solicitando os seguinte dados:</a:t>
+              <a:rPr lang="pt-BR" sz="1600" b="1" dirty="0"/>
+              <a:t>5) Faça um algoritmo que faça conversão de minutos e horas em segundos. Solicite ao usuário a hora e os minutos separado.</a:t>
+            </a:r>
+          </a:p>
+          <a:p>
+            <a:pPr>
+              <a:lnSpc>
+                <a:spcPct val="150000"/>
+              </a:lnSpc>
+              <a:buFont typeface="Wingdings" panose="05000000000000000000" pitchFamily="2" charset="2"/>
+              <a:buChar char="Ø"/>
+            </a:pPr>
+            <a:r>
+              <a:rPr lang="pt-BR" sz="1600" b="1" dirty="0" smtClean="0">
+                <a:solidFill>
+                  <a:srgbClr val="FF0000"/>
+                </a:solidFill>
+              </a:rPr>
+              <a:t>Por </a:t>
+            </a:r>
+            <a:r>
+              <a:rPr lang="pt-BR" sz="1600" b="1" dirty="0">
+                <a:solidFill>
+                  <a:srgbClr val="FF0000"/>
+                </a:solidFill>
+              </a:rPr>
+              <a:t>exemplo 4h23 minutos equivale a 4.38 para fazer cálculos matemáticos</a:t>
+            </a:r>
+          </a:p>
+          <a:p>
+            <a:pPr>
+              <a:lnSpc>
+                <a:spcPct val="150000"/>
+              </a:lnSpc>
+              <a:buFont typeface="Wingdings" panose="05000000000000000000" pitchFamily="2" charset="2"/>
+              <a:buChar char="Ø"/>
+            </a:pPr>
+            <a:r>
+              <a:rPr lang="pt-BR" sz="1600" b="1" dirty="0">
+                <a:solidFill>
+                  <a:srgbClr val="FF0000"/>
+                </a:solidFill>
+              </a:rPr>
+              <a:t>Para chegar a essa conclusão: 23/60 = 0,38 </a:t>
+            </a:r>
+            <a:r>
+              <a:rPr lang="pt-BR" sz="1600" b="1" dirty="0">
+                <a:solidFill>
+                  <a:srgbClr val="FF0000"/>
+                </a:solidFill>
+                <a:sym typeface="Wingdings" panose="05000000000000000000" pitchFamily="2" charset="2"/>
+              </a:rPr>
+              <a:t> 4+0,38 = 4,38</a:t>
+            </a:r>
+            <a:endParaRPr lang="pt-BR" sz="1600" b="1" dirty="0">
+              <a:solidFill>
+                <a:srgbClr val="FF0000"/>
+              </a:solidFill>
+            </a:endParaRPr>
+          </a:p>
+          <a:p>
+            <a:pPr>
+              <a:lnSpc>
+                <a:spcPct val="150000"/>
+              </a:lnSpc>
+              <a:buFont typeface="Wingdings" panose="05000000000000000000" pitchFamily="2" charset="2"/>
+              <a:buChar char="Ø"/>
+            </a:pPr>
+            <a:r>
+              <a:rPr lang="pt-BR" sz="1600" b="1" dirty="0">
+                <a:solidFill>
+                  <a:srgbClr val="FF0000"/>
+                </a:solidFill>
+              </a:rPr>
+              <a:t>	Para o Teste de Mesa</a:t>
             </a:r>
           </a:p>
           <a:p>
             <a:pPr marL="0" indent="0">
               <a:lnSpc>
-                <a:spcPct val="90000"/>
+                <a:spcPct val="150000"/>
               </a:lnSpc>
               <a:buNone/>
             </a:pPr>
             <a:r>
-              <a:rPr lang="pt-BR" b="1" dirty="0" err="1"/>
-              <a:t>Kilometros</a:t>
-            </a:r>
-            <a:r>
-              <a:rPr lang="pt-BR" b="1" dirty="0"/>
-              <a:t> a percorrer: </a:t>
-            </a:r>
-            <a:r>
-              <a:rPr lang="pt-BR" b="1" dirty="0">
+              <a:rPr lang="pt-BR" sz="1600" b="1" dirty="0">
                 <a:solidFill>
-                  <a:srgbClr val="0070C0"/>
+                  <a:srgbClr val="FF0000"/>
                 </a:solidFill>
               </a:rPr>
-              <a:t>Ex. 450km</a:t>
+              <a:t>	3h40 = 3.67</a:t>
             </a:r>
           </a:p>
           <a:p>
             <a:pPr marL="0" indent="0">
               <a:lnSpc>
-                <a:spcPct val="90000"/>
+                <a:spcPct val="150000"/>
               </a:lnSpc>
               <a:buNone/>
             </a:pPr>
             <a:r>
-              <a:rPr lang="pt-BR" b="1" dirty="0"/>
-              <a:t>Quanto Seu carro consome de Gasolina: </a:t>
-            </a:r>
-            <a:r>
-              <a:rPr lang="pt-BR" b="1" dirty="0">
+              <a:rPr lang="pt-BR" sz="1600" b="1" dirty="0">
                 <a:solidFill>
-                  <a:srgbClr val="0070C0"/>
+                  <a:srgbClr val="FF0000"/>
                 </a:solidFill>
               </a:rPr>
-              <a:t>Ex. 10km por litro</a:t>
-            </a:r>
-          </a:p>
-          <a:p>
-            <a:pPr marL="0" indent="0">
-              <a:lnSpc>
-                <a:spcPct val="90000"/>
-              </a:lnSpc>
-              <a:buNone/>
-            </a:pPr>
-            <a:r>
-              <a:rPr lang="pt-BR" b="1" dirty="0"/>
-              <a:t>Preço Médio da Gasolina: </a:t>
-            </a:r>
-            <a:r>
-              <a:rPr lang="pt-BR" b="1" dirty="0">
-                <a:solidFill>
-                  <a:srgbClr val="0070C0"/>
-                </a:solidFill>
-              </a:rPr>
-              <a:t>Ex. R$ 4,50</a:t>
-            </a:r>
-          </a:p>
-          <a:p>
-            <a:pPr marL="0" indent="0">
-              <a:lnSpc>
-                <a:spcPct val="90000"/>
-              </a:lnSpc>
-              <a:buNone/>
-            </a:pPr>
-            <a:r>
-              <a:rPr lang="pt-BR" b="1" dirty="0">
-                <a:solidFill>
-                  <a:srgbClr val="0070C0"/>
-                </a:solidFill>
-              </a:rPr>
-              <a:t>Ao final o sistema deverá responder ao usuário nesse caso que ele gastará em média: R$ 202,00 para ida ou R$ 404,00 para ida e volta.</a:t>
-            </a:r>
-          </a:p>
-          <a:p>
-            <a:pPr marL="0" indent="0">
-              <a:lnSpc>
-                <a:spcPct val="90000"/>
-              </a:lnSpc>
-              <a:buNone/>
-            </a:pPr>
-            <a:endParaRPr lang="pt-BR" b="1" dirty="0"/>
-          </a:p>
-          <a:p>
-            <a:pPr marL="0" indent="0">
-              <a:lnSpc>
-                <a:spcPct val="90000"/>
-              </a:lnSpc>
-              <a:buNone/>
-            </a:pPr>
-            <a:r>
-              <a:rPr lang="pt-BR" b="1" dirty="0"/>
-              <a:t>4) Faça um algoritmo para prever a velocidade média de um carro, sabendo que futuramente esse programa irá  calcular também o valor da multa, se ele tiver acima da velocidade,  para isso solicite os seguintes dados: Obs. A velocidade máxima dessa estrada é 110Km/h</a:t>
-            </a:r>
-          </a:p>
-          <a:p>
-            <a:pPr marL="0" indent="0">
-              <a:lnSpc>
-                <a:spcPct val="90000"/>
-              </a:lnSpc>
-              <a:buNone/>
-            </a:pPr>
-            <a:r>
-              <a:rPr lang="pt-BR" b="1" dirty="0"/>
-              <a:t>Qual o percurso percorrido: </a:t>
-            </a:r>
-            <a:r>
-              <a:rPr lang="pt-BR" b="1" dirty="0">
-                <a:solidFill>
-                  <a:srgbClr val="0070C0"/>
-                </a:solidFill>
-              </a:rPr>
-              <a:t>Ex. 150km</a:t>
-            </a:r>
-          </a:p>
-          <a:p>
-            <a:pPr marL="0" indent="0">
-              <a:lnSpc>
-                <a:spcPct val="90000"/>
-              </a:lnSpc>
-              <a:buNone/>
-            </a:pPr>
-            <a:r>
-              <a:rPr lang="pt-BR" b="1" dirty="0"/>
-              <a:t>Qual o tempo gasto nesse percurso: </a:t>
-            </a:r>
-            <a:r>
-              <a:rPr lang="pt-BR" b="1" dirty="0">
-                <a:solidFill>
-                  <a:srgbClr val="0070C0"/>
-                </a:solidFill>
-              </a:rPr>
-              <a:t>Ex. 1h13</a:t>
-            </a:r>
-          </a:p>
-          <a:p>
-            <a:pPr marL="0" indent="0">
-              <a:lnSpc>
-                <a:spcPct val="90000"/>
-              </a:lnSpc>
-              <a:buNone/>
-            </a:pPr>
-            <a:r>
-              <a:rPr lang="pt-BR" b="1" dirty="0"/>
-              <a:t>O Resultado deverá ser: </a:t>
-            </a:r>
-            <a:r>
-              <a:rPr lang="pt-BR" b="1" dirty="0">
-                <a:solidFill>
-                  <a:srgbClr val="0070C0"/>
-                </a:solidFill>
-              </a:rPr>
-              <a:t>122km/h</a:t>
-            </a:r>
-          </a:p>
-          <a:p>
-            <a:pPr marL="0" indent="0">
-              <a:lnSpc>
-                <a:spcPct val="90000"/>
-              </a:lnSpc>
-              <a:buNone/>
-            </a:pPr>
-            <a:r>
-              <a:rPr lang="pt-BR" sz="1050" dirty="0">
-                <a:solidFill>
-                  <a:schemeClr val="accent1"/>
-                </a:solidFill>
-              </a:rPr>
-              <a:t>Neste caso o exercício irá parar por aqui no entanto o assunto das próximas aulas incluirão operadores relacionais, lógicos e condições onde iremos calcular o valor da multa.</a:t>
-            </a:r>
+              <a:t>	1h32 = 1.52</a:t>
+            </a:r>
+            <a:endParaRPr lang="pt-BR" sz="1600" b="1" dirty="0">
+              <a:solidFill>
+                <a:srgbClr val="FF0000"/>
+              </a:solidFill>
+            </a:endParaRPr>
           </a:p>
         </p:txBody>
       </p:sp>
     </p:spTree>
     <p:extLst>
       <p:ext uri="{BB962C8B-B14F-4D97-AF65-F5344CB8AC3E}">
-        <p14:creationId xmlns:p14="http://schemas.microsoft.com/office/powerpoint/2010/main" val="1567031608"/>
+        <p14:creationId xmlns:p14="http://schemas.microsoft.com/office/powerpoint/2010/main" val="866091100"/>
       </p:ext>
     </p:extLst>
   </p:cSld>
   <p:clrMapOvr>
-    <a:masterClrMapping/>
+    <a:overrideClrMapping bg1="lt1" tx1="dk1" bg2="lt2" tx2="dk2" accent1="accent1" accent2="accent2" accent3="accent3" accent4="accent4" accent5="accent5" accent6="accent6" hlink="hlink" folHlink="folHlink"/>
   </p:clrMapOvr>
   <p:timing>
     <p:tnLst>
@@ -10997,7 +11191,7 @@
     <p:bg>
       <p:bgPr>
         <a:solidFill>
-          <a:schemeClr val="bg2"/>
+          <a:schemeClr val="bg1"/>
         </a:solidFill>
         <a:effectLst/>
       </p:bgPr>
@@ -11018,10 +11212,10 @@
       </p:grpSpPr>
       <p:sp useBgFill="1">
         <p:nvSpPr>
-          <p:cNvPr id="29" name="Rectangle 28">
+          <p:cNvPr id="8" name="Rectangle 7">
             <a:extLst>
               <a:ext uri="{FF2B5EF4-FFF2-40B4-BE49-F238E27FC236}">
-                <a16:creationId xmlns:a16="http://schemas.microsoft.com/office/drawing/2014/main" id="{2654A105-F18C-4E12-B11B-51B12174BB53}"/>
+                <a16:creationId xmlns:a16="http://schemas.microsoft.com/office/drawing/2014/main" id="{F1E0D4A3-ECB8-4689-ABDB-9CE848CE83B9}"/>
               </a:ext>
               <a:ext uri="{C183D7F6-B498-43B3-948B-1728B52AA6E4}">
                 <adec:decorative xmlns:adec="http://schemas.microsoft.com/office/drawing/2017/decorative" xmlns="" val="1"/>
@@ -11078,13 +11272,7 @@
       </p:sp>
       <p:sp>
         <p:nvSpPr>
-          <p:cNvPr id="2" name="Título 1">
-            <a:extLst>
-              <a:ext uri="{FF2B5EF4-FFF2-40B4-BE49-F238E27FC236}">
-                <a16:creationId xmlns:a16="http://schemas.microsoft.com/office/drawing/2014/main" id="{80E5E351-C722-42B0-BFD3-9D9DEB56249A}"/>
-              </a:ext>
-            </a:extLst>
-          </p:cNvPr>
+          <p:cNvPr id="3" name="Título 2"/>
           <p:cNvSpPr>
             <a:spLocks noGrp="1"/>
           </p:cNvSpPr>
@@ -11094,7 +11282,7 @@
         </p:nvSpPr>
         <p:spPr>
           <a:xfrm>
-            <a:off x="323528" y="116633"/>
+            <a:off x="607500" y="447188"/>
             <a:ext cx="7928998" cy="970450"/>
           </a:xfrm>
           <a:effectLst/>
@@ -11105,43 +11293,1782 @@
           </a:bodyPr>
           <a:lstStyle/>
           <a:p>
-            <a:r>
-              <a:rPr lang="pt-BR" sz="3600" dirty="0">
+            <a:pPr algn="ctr"/>
+            <a:r>
+              <a:rPr lang="pt-BR" sz="2400" dirty="0" smtClean="0">
                 <a:solidFill>
                   <a:schemeClr val="tx1"/>
                 </a:solidFill>
               </a:rPr>
-              <a:t>Desafio</a:t>
-            </a:r>
-          </a:p>
-        </p:txBody>
-      </p:sp>
-      <p:sp>
-        <p:nvSpPr>
-          <p:cNvPr id="21" name="Espaço Reservado para Conteúdo 2">
+              <a:t>DESAFIO -  LISTA DE EXERCÍCIOS</a:t>
+            </a:r>
+            <a:endParaRPr lang="pt-BR" sz="2400" dirty="0">
+              <a:solidFill>
+                <a:schemeClr val="tx1"/>
+              </a:solidFill>
+            </a:endParaRPr>
+          </a:p>
+        </p:txBody>
+      </p:sp>
+      <p:sp>
+        <p:nvSpPr>
+          <p:cNvPr id="10" name="Freeform: Shape 9">
             <a:extLst>
               <a:ext uri="{FF2B5EF4-FFF2-40B4-BE49-F238E27FC236}">
-                <a16:creationId xmlns:a16="http://schemas.microsoft.com/office/drawing/2014/main" id="{7F0EA9F4-B101-43FA-BBE9-87303929276A}"/>
+                <a16:creationId xmlns:a16="http://schemas.microsoft.com/office/drawing/2014/main" id="{8854772B-9C8F-4037-89E0-3A45208AB395}"/>
+              </a:ext>
+              <a:ext uri="{C183D7F6-B498-43B3-948B-1728B52AA6E4}">
+                <adec:decorative xmlns:adec="http://schemas.microsoft.com/office/drawing/2017/decorative" xmlns="" val="1"/>
               </a:ext>
             </a:extLst>
           </p:cNvPr>
           <p:cNvSpPr>
-            <a:spLocks noGrp="1"/>
-          </p:cNvSpPr>
-          <p:nvPr>
-            <p:ph idx="1"/>
+            <a:spLocks noGrp="1" noRot="1" noChangeAspect="1" noMove="1" noResize="1" noEditPoints="1" noAdjustHandles="1" noChangeArrowheads="1" noChangeShapeType="1" noTextEdit="1"/>
+          </p:cNvSpPr>
+          <p:nvPr>
+            <p:extLst>
+              <p:ext uri="{386F3935-93C4-4BCD-93E2-E3B085C9AB24}">
+                <p16:designElem xmlns:p16="http://schemas.microsoft.com/office/powerpoint/2015/main" val="1"/>
+              </p:ext>
+            </p:extLst>
           </p:nvPr>
         </p:nvSpPr>
         <p:spPr>
           <a:xfrm>
-            <a:off x="311120" y="1556792"/>
-            <a:ext cx="8424936" cy="5904655"/>
+            <a:off x="477819" y="1576408"/>
+            <a:ext cx="8188361" cy="4638125"/>
+          </a:xfrm>
+          <a:custGeom>
+            <a:avLst/>
+            <a:gdLst>
+              <a:gd name="connsiteX0" fmla="*/ 5441025 w 10917814"/>
+              <a:gd name="connsiteY0" fmla="*/ 0 h 4638125"/>
+              <a:gd name="connsiteX1" fmla="*/ 5453725 w 10917814"/>
+              <a:gd name="connsiteY1" fmla="*/ 0 h 4638125"/>
+              <a:gd name="connsiteX2" fmla="*/ 5464308 w 10917814"/>
+              <a:gd name="connsiteY2" fmla="*/ 0 h 4638125"/>
+              <a:gd name="connsiteX3" fmla="*/ 5477009 w 10917814"/>
+              <a:gd name="connsiteY3" fmla="*/ 4762 h 4638125"/>
+              <a:gd name="connsiteX4" fmla="*/ 5489708 w 10917814"/>
+              <a:gd name="connsiteY4" fmla="*/ 9525 h 4638125"/>
+              <a:gd name="connsiteX5" fmla="*/ 5498175 w 10917814"/>
+              <a:gd name="connsiteY5" fmla="*/ 12700 h 4638125"/>
+              <a:gd name="connsiteX6" fmla="*/ 5865801 w 10917814"/>
+              <a:gd name="connsiteY6" fmla="*/ 288419 h 4638125"/>
+              <a:gd name="connsiteX7" fmla="*/ 10765009 w 10917814"/>
+              <a:gd name="connsiteY7" fmla="*/ 288419 h 4638125"/>
+              <a:gd name="connsiteX8" fmla="*/ 10917814 w 10917814"/>
+              <a:gd name="connsiteY8" fmla="*/ 441224 h 4638125"/>
+              <a:gd name="connsiteX9" fmla="*/ 10917814 w 10917814"/>
+              <a:gd name="connsiteY9" fmla="*/ 4485320 h 4638125"/>
+              <a:gd name="connsiteX10" fmla="*/ 10765009 w 10917814"/>
+              <a:gd name="connsiteY10" fmla="*/ 4638125 h 4638125"/>
+              <a:gd name="connsiteX11" fmla="*/ 152805 w 10917814"/>
+              <a:gd name="connsiteY11" fmla="*/ 4638125 h 4638125"/>
+              <a:gd name="connsiteX12" fmla="*/ 0 w 10917814"/>
+              <a:gd name="connsiteY12" fmla="*/ 4485320 h 4638125"/>
+              <a:gd name="connsiteX13" fmla="*/ 0 w 10917814"/>
+              <a:gd name="connsiteY13" fmla="*/ 441224 h 4638125"/>
+              <a:gd name="connsiteX14" fmla="*/ 152805 w 10917814"/>
+              <a:gd name="connsiteY14" fmla="*/ 288419 h 4638125"/>
+              <a:gd name="connsiteX15" fmla="*/ 5041650 w 10917814"/>
+              <a:gd name="connsiteY15" fmla="*/ 288419 h 4638125"/>
+              <a:gd name="connsiteX16" fmla="*/ 5409275 w 10917814"/>
+              <a:gd name="connsiteY16" fmla="*/ 12700 h 4638125"/>
+              <a:gd name="connsiteX17" fmla="*/ 5417742 w 10917814"/>
+              <a:gd name="connsiteY17" fmla="*/ 9525 h 4638125"/>
+              <a:gd name="connsiteX18" fmla="*/ 5430442 w 10917814"/>
+              <a:gd name="connsiteY18" fmla="*/ 4762 h 4638125"/>
+            </a:gdLst>
+            <a:ahLst/>
+            <a:cxnLst>
+              <a:cxn ang="0">
+                <a:pos x="connsiteX0" y="connsiteY0"/>
+              </a:cxn>
+              <a:cxn ang="0">
+                <a:pos x="connsiteX1" y="connsiteY1"/>
+              </a:cxn>
+              <a:cxn ang="0">
+                <a:pos x="connsiteX2" y="connsiteY2"/>
+              </a:cxn>
+              <a:cxn ang="0">
+                <a:pos x="connsiteX3" y="connsiteY3"/>
+              </a:cxn>
+              <a:cxn ang="0">
+                <a:pos x="connsiteX4" y="connsiteY4"/>
+              </a:cxn>
+              <a:cxn ang="0">
+                <a:pos x="connsiteX5" y="connsiteY5"/>
+              </a:cxn>
+              <a:cxn ang="0">
+                <a:pos x="connsiteX6" y="connsiteY6"/>
+              </a:cxn>
+              <a:cxn ang="0">
+                <a:pos x="connsiteX7" y="connsiteY7"/>
+              </a:cxn>
+              <a:cxn ang="0">
+                <a:pos x="connsiteX8" y="connsiteY8"/>
+              </a:cxn>
+              <a:cxn ang="0">
+                <a:pos x="connsiteX9" y="connsiteY9"/>
+              </a:cxn>
+              <a:cxn ang="0">
+                <a:pos x="connsiteX10" y="connsiteY10"/>
+              </a:cxn>
+              <a:cxn ang="0">
+                <a:pos x="connsiteX11" y="connsiteY11"/>
+              </a:cxn>
+              <a:cxn ang="0">
+                <a:pos x="connsiteX12" y="connsiteY12"/>
+              </a:cxn>
+              <a:cxn ang="0">
+                <a:pos x="connsiteX13" y="connsiteY13"/>
+              </a:cxn>
+              <a:cxn ang="0">
+                <a:pos x="connsiteX14" y="connsiteY14"/>
+              </a:cxn>
+              <a:cxn ang="0">
+                <a:pos x="connsiteX15" y="connsiteY15"/>
+              </a:cxn>
+              <a:cxn ang="0">
+                <a:pos x="connsiteX16" y="connsiteY16"/>
+              </a:cxn>
+              <a:cxn ang="0">
+                <a:pos x="connsiteX17" y="connsiteY17"/>
+              </a:cxn>
+              <a:cxn ang="0">
+                <a:pos x="connsiteX18" y="connsiteY18"/>
+              </a:cxn>
+            </a:cxnLst>
+            <a:rect l="l" t="t" r="r" b="b"/>
+            <a:pathLst>
+              <a:path w="10917814" h="4638125">
+                <a:moveTo>
+                  <a:pt x="5441025" y="0"/>
+                </a:moveTo>
+                <a:lnTo>
+                  <a:pt x="5453725" y="0"/>
+                </a:lnTo>
+                <a:lnTo>
+                  <a:pt x="5464308" y="0"/>
+                </a:lnTo>
+                <a:lnTo>
+                  <a:pt x="5477009" y="4762"/>
+                </a:lnTo>
+                <a:lnTo>
+                  <a:pt x="5489708" y="9525"/>
+                </a:lnTo>
+                <a:lnTo>
+                  <a:pt x="5498175" y="12700"/>
+                </a:lnTo>
+                <a:lnTo>
+                  <a:pt x="5865801" y="288419"/>
+                </a:lnTo>
+                <a:lnTo>
+                  <a:pt x="10765009" y="288419"/>
+                </a:lnTo>
+                <a:cubicBezTo>
+                  <a:pt x="10849401" y="288419"/>
+                  <a:pt x="10917814" y="356832"/>
+                  <a:pt x="10917814" y="441224"/>
+                </a:cubicBezTo>
+                <a:lnTo>
+                  <a:pt x="10917814" y="4485320"/>
+                </a:lnTo>
+                <a:cubicBezTo>
+                  <a:pt x="10917814" y="4569712"/>
+                  <a:pt x="10849401" y="4638125"/>
+                  <a:pt x="10765009" y="4638125"/>
+                </a:cubicBezTo>
+                <a:lnTo>
+                  <a:pt x="152805" y="4638125"/>
+                </a:lnTo>
+                <a:cubicBezTo>
+                  <a:pt x="68413" y="4638125"/>
+                  <a:pt x="0" y="4569712"/>
+                  <a:pt x="0" y="4485320"/>
+                </a:cubicBezTo>
+                <a:lnTo>
+                  <a:pt x="0" y="441224"/>
+                </a:lnTo>
+                <a:cubicBezTo>
+                  <a:pt x="0" y="356832"/>
+                  <a:pt x="68413" y="288419"/>
+                  <a:pt x="152805" y="288419"/>
+                </a:cubicBezTo>
+                <a:lnTo>
+                  <a:pt x="5041650" y="288419"/>
+                </a:lnTo>
+                <a:lnTo>
+                  <a:pt x="5409275" y="12700"/>
+                </a:lnTo>
+                <a:lnTo>
+                  <a:pt x="5417742" y="9525"/>
+                </a:lnTo>
+                <a:lnTo>
+                  <a:pt x="5430442" y="4762"/>
+                </a:lnTo>
+                <a:close/>
+              </a:path>
+            </a:pathLst>
+          </a:custGeom>
+          <a:noFill/>
+          <a:ln w="38100">
+            <a:solidFill>
+              <a:schemeClr val="accent1"/>
+            </a:solidFill>
+          </a:ln>
+          <a:effectLst/>
+        </p:spPr>
+        <p:style>
+          <a:lnRef idx="2">
+            <a:schemeClr val="accent1">
+              <a:shade val="50000"/>
+            </a:schemeClr>
+          </a:lnRef>
+          <a:fillRef idx="1">
+            <a:schemeClr val="accent1"/>
+          </a:fillRef>
+          <a:effectRef idx="0">
+            <a:schemeClr val="accent1"/>
+          </a:effectRef>
+          <a:fontRef idx="minor">
+            <a:schemeClr val="lt1"/>
+          </a:fontRef>
+        </p:style>
+        <p:txBody>
+          <a:bodyPr wrap="square" rtlCol="0" anchor="ctr">
+            <a:noAutofit/>
+          </a:bodyPr>
+          <a:lstStyle/>
+          <a:p>
+            <a:pPr algn="ctr"/>
+            <a:endParaRPr lang="en-US"/>
+          </a:p>
+        </p:txBody>
+      </p:sp>
+      <p:sp>
+        <p:nvSpPr>
+          <p:cNvPr id="2" name="Espaço Reservado para Conteúdo 1"/>
+          <p:cNvSpPr>
+            <a:spLocks noGrp="1"/>
+          </p:cNvSpPr>
+          <p:nvPr>
+            <p:ph idx="1"/>
+          </p:nvPr>
+        </p:nvSpPr>
+        <p:spPr>
+          <a:xfrm>
+            <a:off x="607500" y="1988840"/>
+            <a:ext cx="7928998" cy="4225693"/>
           </a:xfrm>
           <a:effectLst/>
         </p:spPr>
         <p:txBody>
-          <a:bodyPr anchor="t">
+          <a:bodyPr>
+            <a:noAutofit/>
+          </a:bodyPr>
+          <a:lstStyle/>
+          <a:p>
+            <a:pPr marL="0" indent="0" algn="just">
+              <a:lnSpc>
+                <a:spcPct val="150000"/>
+              </a:lnSpc>
+              <a:buNone/>
+            </a:pPr>
+            <a:r>
+              <a:rPr lang="pt-BR" sz="1600" b="1" dirty="0"/>
+              <a:t>6) </a:t>
+            </a:r>
+            <a:r>
+              <a:rPr lang="pt-BR" sz="1600" b="1" dirty="0"/>
+              <a:t>Continuando do exercício anterior, um funcionário trabalha em determinada empresa e quer saber quanto irá ganhar de hora extra. Você deverá fazer um algoritmo que solicite quantas horas e quantos minutos ele trabalhou, solicite horas e minutos de forma separada. Depois pergunte quanto ele ganha por hora e informe quanto ele irá ganhar. Sabendo que nessa empresa o funcionário ganha 70% a mais pelas horas trabalhadas.</a:t>
+            </a:r>
+          </a:p>
+          <a:p>
+            <a:pPr marL="0" indent="0">
+              <a:lnSpc>
+                <a:spcPct val="90000"/>
+              </a:lnSpc>
+              <a:buNone/>
+            </a:pPr>
+            <a:r>
+              <a:rPr lang="pt-BR" sz="1600" b="1" dirty="0">
+                <a:solidFill>
+                  <a:srgbClr val="FF0000"/>
+                </a:solidFill>
+              </a:rPr>
+              <a:t>Ex. Trabalhei neste mês 15h45min == 15.75</a:t>
+            </a:r>
+          </a:p>
+          <a:p>
+            <a:pPr marL="0" indent="0">
+              <a:lnSpc>
+                <a:spcPct val="90000"/>
+              </a:lnSpc>
+              <a:buNone/>
+            </a:pPr>
+            <a:r>
+              <a:rPr lang="pt-BR" sz="1600" b="1" dirty="0">
+                <a:solidFill>
+                  <a:srgbClr val="FF0000"/>
+                </a:solidFill>
+              </a:rPr>
+              <a:t>Ganho R$ 25 reais por hora</a:t>
+            </a:r>
+          </a:p>
+          <a:p>
+            <a:pPr marL="0" indent="0">
+              <a:lnSpc>
+                <a:spcPct val="90000"/>
+              </a:lnSpc>
+              <a:buNone/>
+            </a:pPr>
+            <a:r>
+              <a:rPr lang="pt-BR" sz="1600" b="1" dirty="0">
+                <a:solidFill>
+                  <a:srgbClr val="FF0000"/>
+                </a:solidFill>
+              </a:rPr>
+              <a:t>Resultado tem que ser = R$ 669,37 com os 70% amais</a:t>
+            </a:r>
+          </a:p>
+          <a:p>
+            <a:pPr marL="0" indent="0">
+              <a:lnSpc>
+                <a:spcPct val="90000"/>
+              </a:lnSpc>
+              <a:buNone/>
+            </a:pPr>
+            <a:r>
+              <a:rPr lang="pt-BR" sz="1600" b="1" dirty="0">
+                <a:solidFill>
+                  <a:srgbClr val="FF0000"/>
+                </a:solidFill>
+              </a:rPr>
+              <a:t>Outro teste de mesa: Se trabalhei 20h, devo ganhar R$ 850,00</a:t>
+            </a:r>
+            <a:endParaRPr lang="pt-BR" sz="1600" b="1" dirty="0">
+              <a:solidFill>
+                <a:srgbClr val="FF0000"/>
+              </a:solidFill>
+            </a:endParaRPr>
+          </a:p>
+        </p:txBody>
+      </p:sp>
+    </p:spTree>
+    <p:extLst>
+      <p:ext uri="{BB962C8B-B14F-4D97-AF65-F5344CB8AC3E}">
+        <p14:creationId xmlns:p14="http://schemas.microsoft.com/office/powerpoint/2010/main" val="4134520004"/>
+      </p:ext>
+    </p:extLst>
+  </p:cSld>
+  <p:clrMapOvr>
+    <a:overrideClrMapping bg1="lt1" tx1="dk1" bg2="lt2" tx2="dk2" accent1="accent1" accent2="accent2" accent3="accent3" accent4="accent4" accent5="accent5" accent6="accent6" hlink="hlink" folHlink="folHlink"/>
+  </p:clrMapOvr>
+  <p:timing>
+    <p:tnLst>
+      <p:par>
+        <p:cTn id="1" dur="indefinite" restart="never" nodeType="tmRoot"/>
+      </p:par>
+    </p:tnLst>
+  </p:timing>
+</p:sld>
+</file>
+
+<file path=ppt/slides/slide24.xml><?xml version="1.0" encoding="utf-8"?>
+<p:sld xmlns:a="http://schemas.openxmlformats.org/drawingml/2006/main" xmlns:r="http://schemas.openxmlformats.org/officeDocument/2006/relationships" xmlns:p="http://schemas.openxmlformats.org/presentationml/2006/main">
+  <p:cSld>
+    <p:bg>
+      <p:bgPr>
+        <a:solidFill>
+          <a:schemeClr val="bg1"/>
+        </a:solidFill>
+        <a:effectLst/>
+      </p:bgPr>
+    </p:bg>
+    <p:spTree>
+      <p:nvGrpSpPr>
+        <p:cNvPr id="1" name=""/>
+        <p:cNvGrpSpPr/>
+        <p:nvPr/>
+      </p:nvGrpSpPr>
+      <p:grpSpPr>
+        <a:xfrm>
+          <a:off x="0" y="0"/>
+          <a:ext cx="0" cy="0"/>
+          <a:chOff x="0" y="0"/>
+          <a:chExt cx="0" cy="0"/>
+        </a:xfrm>
+      </p:grpSpPr>
+      <p:sp useBgFill="1">
+        <p:nvSpPr>
+          <p:cNvPr id="8" name="Rectangle 7">
+            <a:extLst>
+              <a:ext uri="{FF2B5EF4-FFF2-40B4-BE49-F238E27FC236}">
+                <a16:creationId xmlns:a16="http://schemas.microsoft.com/office/drawing/2014/main" id="{F1E0D4A3-ECB8-4689-ABDB-9CE848CE83B9}"/>
+              </a:ext>
+              <a:ext uri="{C183D7F6-B498-43B3-948B-1728B52AA6E4}">
+                <adec:decorative xmlns:adec="http://schemas.microsoft.com/office/drawing/2017/decorative" xmlns="" val="1"/>
+              </a:ext>
+            </a:extLst>
+          </p:cNvPr>
+          <p:cNvSpPr>
+            <a:spLocks noGrp="1" noRot="1" noChangeAspect="1" noMove="1" noResize="1" noEditPoints="1" noAdjustHandles="1" noChangeArrowheads="1" noChangeShapeType="1" noTextEdit="1"/>
+          </p:cNvSpPr>
+          <p:nvPr>
+            <p:extLst>
+              <p:ext uri="{386F3935-93C4-4BCD-93E2-E3B085C9AB24}">
+                <p16:designElem xmlns:p16="http://schemas.microsoft.com/office/powerpoint/2015/main" val="1"/>
+              </p:ext>
+            </p:extLst>
+          </p:nvPr>
+        </p:nvSpPr>
+        <p:spPr>
+          <a:xfrm>
+            <a:off x="0" y="0"/>
+            <a:ext cx="9144000" cy="6858000"/>
+          </a:xfrm>
+          <a:prstGeom prst="rect">
+            <a:avLst/>
+          </a:prstGeom>
+          <a:ln>
+            <a:noFill/>
+          </a:ln>
+        </p:spPr>
+        <p:style>
+          <a:lnRef idx="2">
+            <a:schemeClr val="accent1">
+              <a:shade val="50000"/>
+            </a:schemeClr>
+          </a:lnRef>
+          <a:fillRef idx="1">
+            <a:schemeClr val="accent1"/>
+          </a:fillRef>
+          <a:effectRef idx="0">
+            <a:schemeClr val="accent1"/>
+          </a:effectRef>
+          <a:fontRef idx="minor">
+            <a:schemeClr val="lt1"/>
+          </a:fontRef>
+        </p:style>
+        <p:txBody>
+          <a:bodyPr rtlCol="0" anchor="ctr"/>
+          <a:lstStyle/>
+          <a:p>
+            <a:pPr algn="ctr"/>
+            <a:endParaRPr lang="en-US"/>
+          </a:p>
+        </p:txBody>
+      </p:sp>
+      <p:sp>
+        <p:nvSpPr>
+          <p:cNvPr id="3" name="Título 2"/>
+          <p:cNvSpPr>
+            <a:spLocks noGrp="1"/>
+          </p:cNvSpPr>
+          <p:nvPr>
+            <p:ph type="title"/>
+          </p:nvPr>
+        </p:nvSpPr>
+        <p:spPr>
+          <a:xfrm>
+            <a:off x="607500" y="447188"/>
+            <a:ext cx="7928998" cy="970450"/>
+          </a:xfrm>
+          <a:effectLst/>
+        </p:spPr>
+        <p:txBody>
+          <a:bodyPr anchor="ctr">
             <a:normAutofit/>
+          </a:bodyPr>
+          <a:lstStyle/>
+          <a:p>
+            <a:pPr algn="ctr"/>
+            <a:r>
+              <a:rPr lang="pt-BR" sz="2400" dirty="0" smtClean="0">
+                <a:solidFill>
+                  <a:schemeClr val="tx1"/>
+                </a:solidFill>
+              </a:rPr>
+              <a:t>DESAFIO -  LISTA DE EXERCÍCIOS</a:t>
+            </a:r>
+            <a:endParaRPr lang="pt-BR" sz="2400" dirty="0">
+              <a:solidFill>
+                <a:schemeClr val="tx1"/>
+              </a:solidFill>
+            </a:endParaRPr>
+          </a:p>
+        </p:txBody>
+      </p:sp>
+      <p:sp>
+        <p:nvSpPr>
+          <p:cNvPr id="10" name="Freeform: Shape 9">
+            <a:extLst>
+              <a:ext uri="{FF2B5EF4-FFF2-40B4-BE49-F238E27FC236}">
+                <a16:creationId xmlns:a16="http://schemas.microsoft.com/office/drawing/2014/main" id="{8854772B-9C8F-4037-89E0-3A45208AB395}"/>
+              </a:ext>
+              <a:ext uri="{C183D7F6-B498-43B3-948B-1728B52AA6E4}">
+                <adec:decorative xmlns:adec="http://schemas.microsoft.com/office/drawing/2017/decorative" xmlns="" val="1"/>
+              </a:ext>
+            </a:extLst>
+          </p:cNvPr>
+          <p:cNvSpPr>
+            <a:spLocks noGrp="1" noRot="1" noChangeAspect="1" noMove="1" noResize="1" noEditPoints="1" noAdjustHandles="1" noChangeArrowheads="1" noChangeShapeType="1" noTextEdit="1"/>
+          </p:cNvSpPr>
+          <p:nvPr>
+            <p:extLst>
+              <p:ext uri="{386F3935-93C4-4BCD-93E2-E3B085C9AB24}">
+                <p16:designElem xmlns:p16="http://schemas.microsoft.com/office/powerpoint/2015/main" val="1"/>
+              </p:ext>
+            </p:extLst>
+          </p:nvPr>
+        </p:nvSpPr>
+        <p:spPr>
+          <a:xfrm>
+            <a:off x="477819" y="1576408"/>
+            <a:ext cx="8188361" cy="4638125"/>
+          </a:xfrm>
+          <a:custGeom>
+            <a:avLst/>
+            <a:gdLst>
+              <a:gd name="connsiteX0" fmla="*/ 5441025 w 10917814"/>
+              <a:gd name="connsiteY0" fmla="*/ 0 h 4638125"/>
+              <a:gd name="connsiteX1" fmla="*/ 5453725 w 10917814"/>
+              <a:gd name="connsiteY1" fmla="*/ 0 h 4638125"/>
+              <a:gd name="connsiteX2" fmla="*/ 5464308 w 10917814"/>
+              <a:gd name="connsiteY2" fmla="*/ 0 h 4638125"/>
+              <a:gd name="connsiteX3" fmla="*/ 5477009 w 10917814"/>
+              <a:gd name="connsiteY3" fmla="*/ 4762 h 4638125"/>
+              <a:gd name="connsiteX4" fmla="*/ 5489708 w 10917814"/>
+              <a:gd name="connsiteY4" fmla="*/ 9525 h 4638125"/>
+              <a:gd name="connsiteX5" fmla="*/ 5498175 w 10917814"/>
+              <a:gd name="connsiteY5" fmla="*/ 12700 h 4638125"/>
+              <a:gd name="connsiteX6" fmla="*/ 5865801 w 10917814"/>
+              <a:gd name="connsiteY6" fmla="*/ 288419 h 4638125"/>
+              <a:gd name="connsiteX7" fmla="*/ 10765009 w 10917814"/>
+              <a:gd name="connsiteY7" fmla="*/ 288419 h 4638125"/>
+              <a:gd name="connsiteX8" fmla="*/ 10917814 w 10917814"/>
+              <a:gd name="connsiteY8" fmla="*/ 441224 h 4638125"/>
+              <a:gd name="connsiteX9" fmla="*/ 10917814 w 10917814"/>
+              <a:gd name="connsiteY9" fmla="*/ 4485320 h 4638125"/>
+              <a:gd name="connsiteX10" fmla="*/ 10765009 w 10917814"/>
+              <a:gd name="connsiteY10" fmla="*/ 4638125 h 4638125"/>
+              <a:gd name="connsiteX11" fmla="*/ 152805 w 10917814"/>
+              <a:gd name="connsiteY11" fmla="*/ 4638125 h 4638125"/>
+              <a:gd name="connsiteX12" fmla="*/ 0 w 10917814"/>
+              <a:gd name="connsiteY12" fmla="*/ 4485320 h 4638125"/>
+              <a:gd name="connsiteX13" fmla="*/ 0 w 10917814"/>
+              <a:gd name="connsiteY13" fmla="*/ 441224 h 4638125"/>
+              <a:gd name="connsiteX14" fmla="*/ 152805 w 10917814"/>
+              <a:gd name="connsiteY14" fmla="*/ 288419 h 4638125"/>
+              <a:gd name="connsiteX15" fmla="*/ 5041650 w 10917814"/>
+              <a:gd name="connsiteY15" fmla="*/ 288419 h 4638125"/>
+              <a:gd name="connsiteX16" fmla="*/ 5409275 w 10917814"/>
+              <a:gd name="connsiteY16" fmla="*/ 12700 h 4638125"/>
+              <a:gd name="connsiteX17" fmla="*/ 5417742 w 10917814"/>
+              <a:gd name="connsiteY17" fmla="*/ 9525 h 4638125"/>
+              <a:gd name="connsiteX18" fmla="*/ 5430442 w 10917814"/>
+              <a:gd name="connsiteY18" fmla="*/ 4762 h 4638125"/>
+            </a:gdLst>
+            <a:ahLst/>
+            <a:cxnLst>
+              <a:cxn ang="0">
+                <a:pos x="connsiteX0" y="connsiteY0"/>
+              </a:cxn>
+              <a:cxn ang="0">
+                <a:pos x="connsiteX1" y="connsiteY1"/>
+              </a:cxn>
+              <a:cxn ang="0">
+                <a:pos x="connsiteX2" y="connsiteY2"/>
+              </a:cxn>
+              <a:cxn ang="0">
+                <a:pos x="connsiteX3" y="connsiteY3"/>
+              </a:cxn>
+              <a:cxn ang="0">
+                <a:pos x="connsiteX4" y="connsiteY4"/>
+              </a:cxn>
+              <a:cxn ang="0">
+                <a:pos x="connsiteX5" y="connsiteY5"/>
+              </a:cxn>
+              <a:cxn ang="0">
+                <a:pos x="connsiteX6" y="connsiteY6"/>
+              </a:cxn>
+              <a:cxn ang="0">
+                <a:pos x="connsiteX7" y="connsiteY7"/>
+              </a:cxn>
+              <a:cxn ang="0">
+                <a:pos x="connsiteX8" y="connsiteY8"/>
+              </a:cxn>
+              <a:cxn ang="0">
+                <a:pos x="connsiteX9" y="connsiteY9"/>
+              </a:cxn>
+              <a:cxn ang="0">
+                <a:pos x="connsiteX10" y="connsiteY10"/>
+              </a:cxn>
+              <a:cxn ang="0">
+                <a:pos x="connsiteX11" y="connsiteY11"/>
+              </a:cxn>
+              <a:cxn ang="0">
+                <a:pos x="connsiteX12" y="connsiteY12"/>
+              </a:cxn>
+              <a:cxn ang="0">
+                <a:pos x="connsiteX13" y="connsiteY13"/>
+              </a:cxn>
+              <a:cxn ang="0">
+                <a:pos x="connsiteX14" y="connsiteY14"/>
+              </a:cxn>
+              <a:cxn ang="0">
+                <a:pos x="connsiteX15" y="connsiteY15"/>
+              </a:cxn>
+              <a:cxn ang="0">
+                <a:pos x="connsiteX16" y="connsiteY16"/>
+              </a:cxn>
+              <a:cxn ang="0">
+                <a:pos x="connsiteX17" y="connsiteY17"/>
+              </a:cxn>
+              <a:cxn ang="0">
+                <a:pos x="connsiteX18" y="connsiteY18"/>
+              </a:cxn>
+            </a:cxnLst>
+            <a:rect l="l" t="t" r="r" b="b"/>
+            <a:pathLst>
+              <a:path w="10917814" h="4638125">
+                <a:moveTo>
+                  <a:pt x="5441025" y="0"/>
+                </a:moveTo>
+                <a:lnTo>
+                  <a:pt x="5453725" y="0"/>
+                </a:lnTo>
+                <a:lnTo>
+                  <a:pt x="5464308" y="0"/>
+                </a:lnTo>
+                <a:lnTo>
+                  <a:pt x="5477009" y="4762"/>
+                </a:lnTo>
+                <a:lnTo>
+                  <a:pt x="5489708" y="9525"/>
+                </a:lnTo>
+                <a:lnTo>
+                  <a:pt x="5498175" y="12700"/>
+                </a:lnTo>
+                <a:lnTo>
+                  <a:pt x="5865801" y="288419"/>
+                </a:lnTo>
+                <a:lnTo>
+                  <a:pt x="10765009" y="288419"/>
+                </a:lnTo>
+                <a:cubicBezTo>
+                  <a:pt x="10849401" y="288419"/>
+                  <a:pt x="10917814" y="356832"/>
+                  <a:pt x="10917814" y="441224"/>
+                </a:cubicBezTo>
+                <a:lnTo>
+                  <a:pt x="10917814" y="4485320"/>
+                </a:lnTo>
+                <a:cubicBezTo>
+                  <a:pt x="10917814" y="4569712"/>
+                  <a:pt x="10849401" y="4638125"/>
+                  <a:pt x="10765009" y="4638125"/>
+                </a:cubicBezTo>
+                <a:lnTo>
+                  <a:pt x="152805" y="4638125"/>
+                </a:lnTo>
+                <a:cubicBezTo>
+                  <a:pt x="68413" y="4638125"/>
+                  <a:pt x="0" y="4569712"/>
+                  <a:pt x="0" y="4485320"/>
+                </a:cubicBezTo>
+                <a:lnTo>
+                  <a:pt x="0" y="441224"/>
+                </a:lnTo>
+                <a:cubicBezTo>
+                  <a:pt x="0" y="356832"/>
+                  <a:pt x="68413" y="288419"/>
+                  <a:pt x="152805" y="288419"/>
+                </a:cubicBezTo>
+                <a:lnTo>
+                  <a:pt x="5041650" y="288419"/>
+                </a:lnTo>
+                <a:lnTo>
+                  <a:pt x="5409275" y="12700"/>
+                </a:lnTo>
+                <a:lnTo>
+                  <a:pt x="5417742" y="9525"/>
+                </a:lnTo>
+                <a:lnTo>
+                  <a:pt x="5430442" y="4762"/>
+                </a:lnTo>
+                <a:close/>
+              </a:path>
+            </a:pathLst>
+          </a:custGeom>
+          <a:noFill/>
+          <a:ln w="38100">
+            <a:solidFill>
+              <a:schemeClr val="accent1"/>
+            </a:solidFill>
+          </a:ln>
+          <a:effectLst/>
+        </p:spPr>
+        <p:style>
+          <a:lnRef idx="2">
+            <a:schemeClr val="accent1">
+              <a:shade val="50000"/>
+            </a:schemeClr>
+          </a:lnRef>
+          <a:fillRef idx="1">
+            <a:schemeClr val="accent1"/>
+          </a:fillRef>
+          <a:effectRef idx="0">
+            <a:schemeClr val="accent1"/>
+          </a:effectRef>
+          <a:fontRef idx="minor">
+            <a:schemeClr val="lt1"/>
+          </a:fontRef>
+        </p:style>
+        <p:txBody>
+          <a:bodyPr wrap="square" rtlCol="0" anchor="ctr">
+            <a:noAutofit/>
+          </a:bodyPr>
+          <a:lstStyle/>
+          <a:p>
+            <a:pPr algn="ctr"/>
+            <a:endParaRPr lang="en-US"/>
+          </a:p>
+        </p:txBody>
+      </p:sp>
+      <p:sp>
+        <p:nvSpPr>
+          <p:cNvPr id="2" name="Espaço Reservado para Conteúdo 1"/>
+          <p:cNvSpPr>
+            <a:spLocks noGrp="1"/>
+          </p:cNvSpPr>
+          <p:nvPr>
+            <p:ph idx="1"/>
+          </p:nvPr>
+        </p:nvSpPr>
+        <p:spPr>
+          <a:xfrm>
+            <a:off x="607500" y="1988840"/>
+            <a:ext cx="7928998" cy="4225693"/>
+          </a:xfrm>
+          <a:effectLst/>
+        </p:spPr>
+        <p:txBody>
+          <a:bodyPr>
+            <a:noAutofit/>
+          </a:bodyPr>
+          <a:lstStyle/>
+          <a:p>
+            <a:pPr marL="0" indent="0" algn="just">
+              <a:lnSpc>
+                <a:spcPct val="150000"/>
+              </a:lnSpc>
+              <a:buNone/>
+            </a:pPr>
+            <a:r>
+              <a:rPr lang="pt-BR" sz="1600" b="1" dirty="0"/>
+              <a:t>7) </a:t>
+            </a:r>
+            <a:r>
+              <a:rPr lang="pt-BR" sz="1600" b="1" dirty="0"/>
+              <a:t>Faça um algoritmo que calcule quanto o usuário irá gastar de gasolina em uma viagem, solicitando os seguinte dados:</a:t>
+            </a:r>
+          </a:p>
+          <a:p>
+            <a:pPr marL="0" indent="0">
+              <a:lnSpc>
+                <a:spcPct val="90000"/>
+              </a:lnSpc>
+              <a:buNone/>
+            </a:pPr>
+            <a:r>
+              <a:rPr lang="pt-BR" sz="1600" b="1" dirty="0" smtClean="0"/>
+              <a:t>Quilômetros </a:t>
+            </a:r>
+            <a:r>
+              <a:rPr lang="pt-BR" sz="1600" b="1" dirty="0"/>
+              <a:t>a percorrer: </a:t>
+            </a:r>
+            <a:r>
+              <a:rPr lang="pt-BR" sz="1600" b="1" dirty="0">
+                <a:solidFill>
+                  <a:srgbClr val="FF0000"/>
+                </a:solidFill>
+              </a:rPr>
+              <a:t>Ex. 450km</a:t>
+            </a:r>
+          </a:p>
+          <a:p>
+            <a:pPr marL="0" indent="0">
+              <a:lnSpc>
+                <a:spcPct val="90000"/>
+              </a:lnSpc>
+              <a:buNone/>
+            </a:pPr>
+            <a:r>
+              <a:rPr lang="pt-BR" sz="1600" b="1" dirty="0"/>
+              <a:t>Quanto Seu carro consome de Gasolina: </a:t>
+            </a:r>
+            <a:r>
+              <a:rPr lang="pt-BR" sz="1600" b="1" dirty="0">
+                <a:solidFill>
+                  <a:srgbClr val="FF0000"/>
+                </a:solidFill>
+              </a:rPr>
+              <a:t>Ex. 10km por litro</a:t>
+            </a:r>
+          </a:p>
+          <a:p>
+            <a:pPr marL="0" indent="0">
+              <a:lnSpc>
+                <a:spcPct val="90000"/>
+              </a:lnSpc>
+              <a:buNone/>
+            </a:pPr>
+            <a:r>
+              <a:rPr lang="pt-BR" sz="1600" b="1" dirty="0"/>
+              <a:t>Preço Médio da Gasolina: </a:t>
+            </a:r>
+            <a:r>
+              <a:rPr lang="pt-BR" sz="1600" b="1" dirty="0">
+                <a:solidFill>
+                  <a:srgbClr val="FF0000"/>
+                </a:solidFill>
+              </a:rPr>
+              <a:t>Ex. R$ 4,50</a:t>
+            </a:r>
+          </a:p>
+          <a:p>
+            <a:pPr marL="0" indent="0">
+              <a:lnSpc>
+                <a:spcPct val="90000"/>
+              </a:lnSpc>
+              <a:buNone/>
+            </a:pPr>
+            <a:r>
+              <a:rPr lang="pt-BR" sz="1600" b="1" dirty="0">
+                <a:solidFill>
+                  <a:srgbClr val="FF0000"/>
+                </a:solidFill>
+              </a:rPr>
+              <a:t>Ao final o sistema deverá responder ao usuário nesse caso que ele gastará em média: R$ 202,00 para ida ou R$ 404,00 para ida e volta.</a:t>
+            </a:r>
+            <a:endParaRPr lang="pt-BR" sz="1600" b="1" dirty="0">
+              <a:solidFill>
+                <a:srgbClr val="FF0000"/>
+              </a:solidFill>
+            </a:endParaRPr>
+          </a:p>
+        </p:txBody>
+      </p:sp>
+    </p:spTree>
+    <p:extLst>
+      <p:ext uri="{BB962C8B-B14F-4D97-AF65-F5344CB8AC3E}">
+        <p14:creationId xmlns:p14="http://schemas.microsoft.com/office/powerpoint/2010/main" val="1057214314"/>
+      </p:ext>
+    </p:extLst>
+  </p:cSld>
+  <p:clrMapOvr>
+    <a:overrideClrMapping bg1="lt1" tx1="dk1" bg2="lt2" tx2="dk2" accent1="accent1" accent2="accent2" accent3="accent3" accent4="accent4" accent5="accent5" accent6="accent6" hlink="hlink" folHlink="folHlink"/>
+  </p:clrMapOvr>
+  <p:timing>
+    <p:tnLst>
+      <p:par>
+        <p:cTn id="1" dur="indefinite" restart="never" nodeType="tmRoot"/>
+      </p:par>
+    </p:tnLst>
+  </p:timing>
+</p:sld>
+</file>
+
+<file path=ppt/slides/slide25.xml><?xml version="1.0" encoding="utf-8"?>
+<p:sld xmlns:a="http://schemas.openxmlformats.org/drawingml/2006/main" xmlns:r="http://schemas.openxmlformats.org/officeDocument/2006/relationships" xmlns:p="http://schemas.openxmlformats.org/presentationml/2006/main">
+  <p:cSld>
+    <p:bg>
+      <p:bgPr>
+        <a:solidFill>
+          <a:schemeClr val="bg1"/>
+        </a:solidFill>
+        <a:effectLst/>
+      </p:bgPr>
+    </p:bg>
+    <p:spTree>
+      <p:nvGrpSpPr>
+        <p:cNvPr id="1" name=""/>
+        <p:cNvGrpSpPr/>
+        <p:nvPr/>
+      </p:nvGrpSpPr>
+      <p:grpSpPr>
+        <a:xfrm>
+          <a:off x="0" y="0"/>
+          <a:ext cx="0" cy="0"/>
+          <a:chOff x="0" y="0"/>
+          <a:chExt cx="0" cy="0"/>
+        </a:xfrm>
+      </p:grpSpPr>
+      <p:sp useBgFill="1">
+        <p:nvSpPr>
+          <p:cNvPr id="8" name="Rectangle 7">
+            <a:extLst>
+              <a:ext uri="{FF2B5EF4-FFF2-40B4-BE49-F238E27FC236}">
+                <a16:creationId xmlns:a16="http://schemas.microsoft.com/office/drawing/2014/main" id="{F1E0D4A3-ECB8-4689-ABDB-9CE848CE83B9}"/>
+              </a:ext>
+              <a:ext uri="{C183D7F6-B498-43B3-948B-1728B52AA6E4}">
+                <adec:decorative xmlns:adec="http://schemas.microsoft.com/office/drawing/2017/decorative" xmlns="" val="1"/>
+              </a:ext>
+            </a:extLst>
+          </p:cNvPr>
+          <p:cNvSpPr>
+            <a:spLocks noGrp="1" noRot="1" noChangeAspect="1" noMove="1" noResize="1" noEditPoints="1" noAdjustHandles="1" noChangeArrowheads="1" noChangeShapeType="1" noTextEdit="1"/>
+          </p:cNvSpPr>
+          <p:nvPr>
+            <p:extLst>
+              <p:ext uri="{386F3935-93C4-4BCD-93E2-E3B085C9AB24}">
+                <p16:designElem xmlns:p16="http://schemas.microsoft.com/office/powerpoint/2015/main" val="1"/>
+              </p:ext>
+            </p:extLst>
+          </p:nvPr>
+        </p:nvSpPr>
+        <p:spPr>
+          <a:xfrm>
+            <a:off x="0" y="0"/>
+            <a:ext cx="9144000" cy="6858000"/>
+          </a:xfrm>
+          <a:prstGeom prst="rect">
+            <a:avLst/>
+          </a:prstGeom>
+          <a:ln>
+            <a:noFill/>
+          </a:ln>
+        </p:spPr>
+        <p:style>
+          <a:lnRef idx="2">
+            <a:schemeClr val="accent1">
+              <a:shade val="50000"/>
+            </a:schemeClr>
+          </a:lnRef>
+          <a:fillRef idx="1">
+            <a:schemeClr val="accent1"/>
+          </a:fillRef>
+          <a:effectRef idx="0">
+            <a:schemeClr val="accent1"/>
+          </a:effectRef>
+          <a:fontRef idx="minor">
+            <a:schemeClr val="lt1"/>
+          </a:fontRef>
+        </p:style>
+        <p:txBody>
+          <a:bodyPr rtlCol="0" anchor="ctr"/>
+          <a:lstStyle/>
+          <a:p>
+            <a:pPr algn="ctr"/>
+            <a:endParaRPr lang="en-US"/>
+          </a:p>
+        </p:txBody>
+      </p:sp>
+      <p:sp>
+        <p:nvSpPr>
+          <p:cNvPr id="3" name="Título 2"/>
+          <p:cNvSpPr>
+            <a:spLocks noGrp="1"/>
+          </p:cNvSpPr>
+          <p:nvPr>
+            <p:ph type="title"/>
+          </p:nvPr>
+        </p:nvSpPr>
+        <p:spPr>
+          <a:xfrm>
+            <a:off x="607500" y="447188"/>
+            <a:ext cx="7928998" cy="970450"/>
+          </a:xfrm>
+          <a:effectLst/>
+        </p:spPr>
+        <p:txBody>
+          <a:bodyPr anchor="ctr">
+            <a:normAutofit/>
+          </a:bodyPr>
+          <a:lstStyle/>
+          <a:p>
+            <a:pPr algn="ctr"/>
+            <a:r>
+              <a:rPr lang="pt-BR" sz="2400" dirty="0" smtClean="0">
+                <a:solidFill>
+                  <a:schemeClr val="tx1"/>
+                </a:solidFill>
+              </a:rPr>
+              <a:t>DESAFIO -  LISTA DE EXERCÍCIOS</a:t>
+            </a:r>
+            <a:endParaRPr lang="pt-BR" sz="2400" dirty="0">
+              <a:solidFill>
+                <a:schemeClr val="tx1"/>
+              </a:solidFill>
+            </a:endParaRPr>
+          </a:p>
+        </p:txBody>
+      </p:sp>
+      <p:sp>
+        <p:nvSpPr>
+          <p:cNvPr id="10" name="Freeform: Shape 9">
+            <a:extLst>
+              <a:ext uri="{FF2B5EF4-FFF2-40B4-BE49-F238E27FC236}">
+                <a16:creationId xmlns:a16="http://schemas.microsoft.com/office/drawing/2014/main" id="{8854772B-9C8F-4037-89E0-3A45208AB395}"/>
+              </a:ext>
+              <a:ext uri="{C183D7F6-B498-43B3-948B-1728B52AA6E4}">
+                <adec:decorative xmlns:adec="http://schemas.microsoft.com/office/drawing/2017/decorative" xmlns="" val="1"/>
+              </a:ext>
+            </a:extLst>
+          </p:cNvPr>
+          <p:cNvSpPr>
+            <a:spLocks noGrp="1" noRot="1" noChangeAspect="1" noMove="1" noResize="1" noEditPoints="1" noAdjustHandles="1" noChangeArrowheads="1" noChangeShapeType="1" noTextEdit="1"/>
+          </p:cNvSpPr>
+          <p:nvPr>
+            <p:extLst>
+              <p:ext uri="{386F3935-93C4-4BCD-93E2-E3B085C9AB24}">
+                <p16:designElem xmlns:p16="http://schemas.microsoft.com/office/powerpoint/2015/main" val="1"/>
+              </p:ext>
+            </p:extLst>
+          </p:nvPr>
+        </p:nvSpPr>
+        <p:spPr>
+          <a:xfrm>
+            <a:off x="477819" y="1576408"/>
+            <a:ext cx="8188361" cy="4638125"/>
+          </a:xfrm>
+          <a:custGeom>
+            <a:avLst/>
+            <a:gdLst>
+              <a:gd name="connsiteX0" fmla="*/ 5441025 w 10917814"/>
+              <a:gd name="connsiteY0" fmla="*/ 0 h 4638125"/>
+              <a:gd name="connsiteX1" fmla="*/ 5453725 w 10917814"/>
+              <a:gd name="connsiteY1" fmla="*/ 0 h 4638125"/>
+              <a:gd name="connsiteX2" fmla="*/ 5464308 w 10917814"/>
+              <a:gd name="connsiteY2" fmla="*/ 0 h 4638125"/>
+              <a:gd name="connsiteX3" fmla="*/ 5477009 w 10917814"/>
+              <a:gd name="connsiteY3" fmla="*/ 4762 h 4638125"/>
+              <a:gd name="connsiteX4" fmla="*/ 5489708 w 10917814"/>
+              <a:gd name="connsiteY4" fmla="*/ 9525 h 4638125"/>
+              <a:gd name="connsiteX5" fmla="*/ 5498175 w 10917814"/>
+              <a:gd name="connsiteY5" fmla="*/ 12700 h 4638125"/>
+              <a:gd name="connsiteX6" fmla="*/ 5865801 w 10917814"/>
+              <a:gd name="connsiteY6" fmla="*/ 288419 h 4638125"/>
+              <a:gd name="connsiteX7" fmla="*/ 10765009 w 10917814"/>
+              <a:gd name="connsiteY7" fmla="*/ 288419 h 4638125"/>
+              <a:gd name="connsiteX8" fmla="*/ 10917814 w 10917814"/>
+              <a:gd name="connsiteY8" fmla="*/ 441224 h 4638125"/>
+              <a:gd name="connsiteX9" fmla="*/ 10917814 w 10917814"/>
+              <a:gd name="connsiteY9" fmla="*/ 4485320 h 4638125"/>
+              <a:gd name="connsiteX10" fmla="*/ 10765009 w 10917814"/>
+              <a:gd name="connsiteY10" fmla="*/ 4638125 h 4638125"/>
+              <a:gd name="connsiteX11" fmla="*/ 152805 w 10917814"/>
+              <a:gd name="connsiteY11" fmla="*/ 4638125 h 4638125"/>
+              <a:gd name="connsiteX12" fmla="*/ 0 w 10917814"/>
+              <a:gd name="connsiteY12" fmla="*/ 4485320 h 4638125"/>
+              <a:gd name="connsiteX13" fmla="*/ 0 w 10917814"/>
+              <a:gd name="connsiteY13" fmla="*/ 441224 h 4638125"/>
+              <a:gd name="connsiteX14" fmla="*/ 152805 w 10917814"/>
+              <a:gd name="connsiteY14" fmla="*/ 288419 h 4638125"/>
+              <a:gd name="connsiteX15" fmla="*/ 5041650 w 10917814"/>
+              <a:gd name="connsiteY15" fmla="*/ 288419 h 4638125"/>
+              <a:gd name="connsiteX16" fmla="*/ 5409275 w 10917814"/>
+              <a:gd name="connsiteY16" fmla="*/ 12700 h 4638125"/>
+              <a:gd name="connsiteX17" fmla="*/ 5417742 w 10917814"/>
+              <a:gd name="connsiteY17" fmla="*/ 9525 h 4638125"/>
+              <a:gd name="connsiteX18" fmla="*/ 5430442 w 10917814"/>
+              <a:gd name="connsiteY18" fmla="*/ 4762 h 4638125"/>
+            </a:gdLst>
+            <a:ahLst/>
+            <a:cxnLst>
+              <a:cxn ang="0">
+                <a:pos x="connsiteX0" y="connsiteY0"/>
+              </a:cxn>
+              <a:cxn ang="0">
+                <a:pos x="connsiteX1" y="connsiteY1"/>
+              </a:cxn>
+              <a:cxn ang="0">
+                <a:pos x="connsiteX2" y="connsiteY2"/>
+              </a:cxn>
+              <a:cxn ang="0">
+                <a:pos x="connsiteX3" y="connsiteY3"/>
+              </a:cxn>
+              <a:cxn ang="0">
+                <a:pos x="connsiteX4" y="connsiteY4"/>
+              </a:cxn>
+              <a:cxn ang="0">
+                <a:pos x="connsiteX5" y="connsiteY5"/>
+              </a:cxn>
+              <a:cxn ang="0">
+                <a:pos x="connsiteX6" y="connsiteY6"/>
+              </a:cxn>
+              <a:cxn ang="0">
+                <a:pos x="connsiteX7" y="connsiteY7"/>
+              </a:cxn>
+              <a:cxn ang="0">
+                <a:pos x="connsiteX8" y="connsiteY8"/>
+              </a:cxn>
+              <a:cxn ang="0">
+                <a:pos x="connsiteX9" y="connsiteY9"/>
+              </a:cxn>
+              <a:cxn ang="0">
+                <a:pos x="connsiteX10" y="connsiteY10"/>
+              </a:cxn>
+              <a:cxn ang="0">
+                <a:pos x="connsiteX11" y="connsiteY11"/>
+              </a:cxn>
+              <a:cxn ang="0">
+                <a:pos x="connsiteX12" y="connsiteY12"/>
+              </a:cxn>
+              <a:cxn ang="0">
+                <a:pos x="connsiteX13" y="connsiteY13"/>
+              </a:cxn>
+              <a:cxn ang="0">
+                <a:pos x="connsiteX14" y="connsiteY14"/>
+              </a:cxn>
+              <a:cxn ang="0">
+                <a:pos x="connsiteX15" y="connsiteY15"/>
+              </a:cxn>
+              <a:cxn ang="0">
+                <a:pos x="connsiteX16" y="connsiteY16"/>
+              </a:cxn>
+              <a:cxn ang="0">
+                <a:pos x="connsiteX17" y="connsiteY17"/>
+              </a:cxn>
+              <a:cxn ang="0">
+                <a:pos x="connsiteX18" y="connsiteY18"/>
+              </a:cxn>
+            </a:cxnLst>
+            <a:rect l="l" t="t" r="r" b="b"/>
+            <a:pathLst>
+              <a:path w="10917814" h="4638125">
+                <a:moveTo>
+                  <a:pt x="5441025" y="0"/>
+                </a:moveTo>
+                <a:lnTo>
+                  <a:pt x="5453725" y="0"/>
+                </a:lnTo>
+                <a:lnTo>
+                  <a:pt x="5464308" y="0"/>
+                </a:lnTo>
+                <a:lnTo>
+                  <a:pt x="5477009" y="4762"/>
+                </a:lnTo>
+                <a:lnTo>
+                  <a:pt x="5489708" y="9525"/>
+                </a:lnTo>
+                <a:lnTo>
+                  <a:pt x="5498175" y="12700"/>
+                </a:lnTo>
+                <a:lnTo>
+                  <a:pt x="5865801" y="288419"/>
+                </a:lnTo>
+                <a:lnTo>
+                  <a:pt x="10765009" y="288419"/>
+                </a:lnTo>
+                <a:cubicBezTo>
+                  <a:pt x="10849401" y="288419"/>
+                  <a:pt x="10917814" y="356832"/>
+                  <a:pt x="10917814" y="441224"/>
+                </a:cubicBezTo>
+                <a:lnTo>
+                  <a:pt x="10917814" y="4485320"/>
+                </a:lnTo>
+                <a:cubicBezTo>
+                  <a:pt x="10917814" y="4569712"/>
+                  <a:pt x="10849401" y="4638125"/>
+                  <a:pt x="10765009" y="4638125"/>
+                </a:cubicBezTo>
+                <a:lnTo>
+                  <a:pt x="152805" y="4638125"/>
+                </a:lnTo>
+                <a:cubicBezTo>
+                  <a:pt x="68413" y="4638125"/>
+                  <a:pt x="0" y="4569712"/>
+                  <a:pt x="0" y="4485320"/>
+                </a:cubicBezTo>
+                <a:lnTo>
+                  <a:pt x="0" y="441224"/>
+                </a:lnTo>
+                <a:cubicBezTo>
+                  <a:pt x="0" y="356832"/>
+                  <a:pt x="68413" y="288419"/>
+                  <a:pt x="152805" y="288419"/>
+                </a:cubicBezTo>
+                <a:lnTo>
+                  <a:pt x="5041650" y="288419"/>
+                </a:lnTo>
+                <a:lnTo>
+                  <a:pt x="5409275" y="12700"/>
+                </a:lnTo>
+                <a:lnTo>
+                  <a:pt x="5417742" y="9525"/>
+                </a:lnTo>
+                <a:lnTo>
+                  <a:pt x="5430442" y="4762"/>
+                </a:lnTo>
+                <a:close/>
+              </a:path>
+            </a:pathLst>
+          </a:custGeom>
+          <a:noFill/>
+          <a:ln w="38100">
+            <a:solidFill>
+              <a:schemeClr val="accent1"/>
+            </a:solidFill>
+          </a:ln>
+          <a:effectLst/>
+        </p:spPr>
+        <p:style>
+          <a:lnRef idx="2">
+            <a:schemeClr val="accent1">
+              <a:shade val="50000"/>
+            </a:schemeClr>
+          </a:lnRef>
+          <a:fillRef idx="1">
+            <a:schemeClr val="accent1"/>
+          </a:fillRef>
+          <a:effectRef idx="0">
+            <a:schemeClr val="accent1"/>
+          </a:effectRef>
+          <a:fontRef idx="minor">
+            <a:schemeClr val="lt1"/>
+          </a:fontRef>
+        </p:style>
+        <p:txBody>
+          <a:bodyPr wrap="square" rtlCol="0" anchor="ctr">
+            <a:noAutofit/>
+          </a:bodyPr>
+          <a:lstStyle/>
+          <a:p>
+            <a:pPr algn="ctr"/>
+            <a:endParaRPr lang="en-US"/>
+          </a:p>
+        </p:txBody>
+      </p:sp>
+      <p:sp>
+        <p:nvSpPr>
+          <p:cNvPr id="2" name="Espaço Reservado para Conteúdo 1"/>
+          <p:cNvSpPr>
+            <a:spLocks noGrp="1"/>
+          </p:cNvSpPr>
+          <p:nvPr>
+            <p:ph idx="1"/>
+          </p:nvPr>
+        </p:nvSpPr>
+        <p:spPr>
+          <a:xfrm>
+            <a:off x="607500" y="1988840"/>
+            <a:ext cx="7928998" cy="4225693"/>
+          </a:xfrm>
+          <a:effectLst/>
+        </p:spPr>
+        <p:txBody>
+          <a:bodyPr>
+            <a:noAutofit/>
+          </a:bodyPr>
+          <a:lstStyle/>
+          <a:p>
+            <a:pPr marL="0" indent="0" algn="just">
+              <a:lnSpc>
+                <a:spcPct val="150000"/>
+              </a:lnSpc>
+              <a:buNone/>
+            </a:pPr>
+            <a:r>
+              <a:rPr lang="pt-BR" sz="1600" b="1" dirty="0"/>
+              <a:t>8) Faça um algoritmo para prever a velocidade média de um carro, sabendo que futuramente esse programa irá  calcular também o valor da multa, se ele tiver acima da velocidade,  para isso solicite os seguintes dados: Obs. A velocidade máxima dessa estrada é </a:t>
+            </a:r>
+            <a:r>
+              <a:rPr lang="pt-BR" sz="1600" b="1" dirty="0" smtClean="0"/>
+              <a:t>110Km/h.</a:t>
+            </a:r>
+            <a:endParaRPr lang="pt-BR" sz="1600" b="1" dirty="0"/>
+          </a:p>
+          <a:p>
+            <a:pPr marL="0" indent="0">
+              <a:lnSpc>
+                <a:spcPct val="90000"/>
+              </a:lnSpc>
+              <a:buNone/>
+            </a:pPr>
+            <a:r>
+              <a:rPr lang="pt-BR" sz="1600" b="1" dirty="0"/>
+              <a:t>Qual o percurso percorrido: </a:t>
+            </a:r>
+            <a:r>
+              <a:rPr lang="pt-BR" sz="1600" b="1" dirty="0">
+                <a:solidFill>
+                  <a:srgbClr val="FF0000"/>
+                </a:solidFill>
+              </a:rPr>
+              <a:t>Ex. 150km</a:t>
+            </a:r>
+          </a:p>
+          <a:p>
+            <a:pPr marL="0" indent="0">
+              <a:lnSpc>
+                <a:spcPct val="90000"/>
+              </a:lnSpc>
+              <a:buNone/>
+            </a:pPr>
+            <a:r>
+              <a:rPr lang="pt-BR" sz="1600" b="1" dirty="0"/>
+              <a:t>Qual o tempo gasto nesse percurso: </a:t>
+            </a:r>
+            <a:r>
+              <a:rPr lang="pt-BR" sz="1600" b="1" dirty="0">
+                <a:solidFill>
+                  <a:srgbClr val="FF0000"/>
+                </a:solidFill>
+              </a:rPr>
+              <a:t>Ex. 1h13</a:t>
+            </a:r>
+          </a:p>
+          <a:p>
+            <a:pPr marL="0" indent="0">
+              <a:lnSpc>
+                <a:spcPct val="90000"/>
+              </a:lnSpc>
+              <a:buNone/>
+            </a:pPr>
+            <a:r>
+              <a:rPr lang="pt-BR" sz="1600" b="1" dirty="0"/>
+              <a:t>O Resultado deverá ser: </a:t>
+            </a:r>
+            <a:r>
+              <a:rPr lang="pt-BR" sz="1600" b="1" dirty="0">
+                <a:solidFill>
+                  <a:srgbClr val="FF0000"/>
+                </a:solidFill>
+              </a:rPr>
+              <a:t>122km/h</a:t>
+            </a:r>
+          </a:p>
+          <a:p>
+            <a:pPr marL="0" indent="0">
+              <a:lnSpc>
+                <a:spcPct val="90000"/>
+              </a:lnSpc>
+              <a:buNone/>
+            </a:pPr>
+            <a:r>
+              <a:rPr lang="pt-BR" dirty="0">
+                <a:solidFill>
+                  <a:srgbClr val="FF0000"/>
+                </a:solidFill>
+              </a:rPr>
+              <a:t>Neste caso o exercício irá parar por aqui no entanto o assunto das próximas aulas incluirão operadores relacionais, lógicos e condições onde iremos calcular o valor da multa.</a:t>
+            </a:r>
+            <a:endParaRPr lang="pt-BR" dirty="0">
+              <a:solidFill>
+                <a:srgbClr val="FF0000"/>
+              </a:solidFill>
+            </a:endParaRPr>
+          </a:p>
+        </p:txBody>
+      </p:sp>
+    </p:spTree>
+    <p:extLst>
+      <p:ext uri="{BB962C8B-B14F-4D97-AF65-F5344CB8AC3E}">
+        <p14:creationId xmlns:p14="http://schemas.microsoft.com/office/powerpoint/2010/main" val="1640057827"/>
+      </p:ext>
+    </p:extLst>
+  </p:cSld>
+  <p:clrMapOvr>
+    <a:overrideClrMapping bg1="lt1" tx1="dk1" bg2="lt2" tx2="dk2" accent1="accent1" accent2="accent2" accent3="accent3" accent4="accent4" accent5="accent5" accent6="accent6" hlink="hlink" folHlink="folHlink"/>
+  </p:clrMapOvr>
+  <p:timing>
+    <p:tnLst>
+      <p:par>
+        <p:cTn id="1" dur="indefinite" restart="never" nodeType="tmRoot"/>
+      </p:par>
+    </p:tnLst>
+  </p:timing>
+</p:sld>
+</file>
+
+<file path=ppt/slides/slide26.xml><?xml version="1.0" encoding="utf-8"?>
+<p:sld xmlns:a="http://schemas.openxmlformats.org/drawingml/2006/main" xmlns:r="http://schemas.openxmlformats.org/officeDocument/2006/relationships" xmlns:p="http://schemas.openxmlformats.org/presentationml/2006/main">
+  <p:cSld>
+    <p:bg>
+      <p:bgPr>
+        <a:solidFill>
+          <a:schemeClr val="bg1"/>
+        </a:solidFill>
+        <a:effectLst/>
+      </p:bgPr>
+    </p:bg>
+    <p:spTree>
+      <p:nvGrpSpPr>
+        <p:cNvPr id="1" name=""/>
+        <p:cNvGrpSpPr/>
+        <p:nvPr/>
+      </p:nvGrpSpPr>
+      <p:grpSpPr>
+        <a:xfrm>
+          <a:off x="0" y="0"/>
+          <a:ext cx="0" cy="0"/>
+          <a:chOff x="0" y="0"/>
+          <a:chExt cx="0" cy="0"/>
+        </a:xfrm>
+      </p:grpSpPr>
+      <p:sp useBgFill="1">
+        <p:nvSpPr>
+          <p:cNvPr id="8" name="Rectangle 7">
+            <a:extLst>
+              <a:ext uri="{FF2B5EF4-FFF2-40B4-BE49-F238E27FC236}">
+                <a16:creationId xmlns:a16="http://schemas.microsoft.com/office/drawing/2014/main" id="{F1E0D4A3-ECB8-4689-ABDB-9CE848CE83B9}"/>
+              </a:ext>
+              <a:ext uri="{C183D7F6-B498-43B3-948B-1728B52AA6E4}">
+                <adec:decorative xmlns:adec="http://schemas.microsoft.com/office/drawing/2017/decorative" xmlns="" val="1"/>
+              </a:ext>
+            </a:extLst>
+          </p:cNvPr>
+          <p:cNvSpPr>
+            <a:spLocks noGrp="1" noRot="1" noChangeAspect="1" noMove="1" noResize="1" noEditPoints="1" noAdjustHandles="1" noChangeArrowheads="1" noChangeShapeType="1" noTextEdit="1"/>
+          </p:cNvSpPr>
+          <p:nvPr>
+            <p:extLst>
+              <p:ext uri="{386F3935-93C4-4BCD-93E2-E3B085C9AB24}">
+                <p16:designElem xmlns:p16="http://schemas.microsoft.com/office/powerpoint/2015/main" val="1"/>
+              </p:ext>
+            </p:extLst>
+          </p:nvPr>
+        </p:nvSpPr>
+        <p:spPr>
+          <a:xfrm>
+            <a:off x="0" y="0"/>
+            <a:ext cx="9144000" cy="6858000"/>
+          </a:xfrm>
+          <a:prstGeom prst="rect">
+            <a:avLst/>
+          </a:prstGeom>
+          <a:ln>
+            <a:noFill/>
+          </a:ln>
+        </p:spPr>
+        <p:style>
+          <a:lnRef idx="2">
+            <a:schemeClr val="accent1">
+              <a:shade val="50000"/>
+            </a:schemeClr>
+          </a:lnRef>
+          <a:fillRef idx="1">
+            <a:schemeClr val="accent1"/>
+          </a:fillRef>
+          <a:effectRef idx="0">
+            <a:schemeClr val="accent1"/>
+          </a:effectRef>
+          <a:fontRef idx="minor">
+            <a:schemeClr val="lt1"/>
+          </a:fontRef>
+        </p:style>
+        <p:txBody>
+          <a:bodyPr rtlCol="0" anchor="ctr"/>
+          <a:lstStyle/>
+          <a:p>
+            <a:pPr algn="ctr"/>
+            <a:endParaRPr lang="en-US"/>
+          </a:p>
+        </p:txBody>
+      </p:sp>
+      <p:sp>
+        <p:nvSpPr>
+          <p:cNvPr id="3" name="Título 2"/>
+          <p:cNvSpPr>
+            <a:spLocks noGrp="1"/>
+          </p:cNvSpPr>
+          <p:nvPr>
+            <p:ph type="title"/>
+          </p:nvPr>
+        </p:nvSpPr>
+        <p:spPr>
+          <a:xfrm>
+            <a:off x="607500" y="447188"/>
+            <a:ext cx="7928998" cy="970450"/>
+          </a:xfrm>
+          <a:effectLst/>
+        </p:spPr>
+        <p:txBody>
+          <a:bodyPr anchor="ctr">
+            <a:normAutofit/>
+          </a:bodyPr>
+          <a:lstStyle/>
+          <a:p>
+            <a:pPr algn="ctr"/>
+            <a:r>
+              <a:rPr lang="pt-BR" sz="2400" dirty="0" smtClean="0">
+                <a:solidFill>
+                  <a:schemeClr val="tx1"/>
+                </a:solidFill>
+              </a:rPr>
+              <a:t>DESAFIO -  LISTA DE EXERCÍCIOS</a:t>
+            </a:r>
+            <a:endParaRPr lang="pt-BR" sz="2400" dirty="0">
+              <a:solidFill>
+                <a:schemeClr val="tx1"/>
+              </a:solidFill>
+            </a:endParaRPr>
+          </a:p>
+        </p:txBody>
+      </p:sp>
+      <p:sp>
+        <p:nvSpPr>
+          <p:cNvPr id="10" name="Freeform: Shape 9">
+            <a:extLst>
+              <a:ext uri="{FF2B5EF4-FFF2-40B4-BE49-F238E27FC236}">
+                <a16:creationId xmlns:a16="http://schemas.microsoft.com/office/drawing/2014/main" id="{8854772B-9C8F-4037-89E0-3A45208AB395}"/>
+              </a:ext>
+              <a:ext uri="{C183D7F6-B498-43B3-948B-1728B52AA6E4}">
+                <adec:decorative xmlns:adec="http://schemas.microsoft.com/office/drawing/2017/decorative" xmlns="" val="1"/>
+              </a:ext>
+            </a:extLst>
+          </p:cNvPr>
+          <p:cNvSpPr>
+            <a:spLocks noGrp="1" noRot="1" noChangeAspect="1" noMove="1" noResize="1" noEditPoints="1" noAdjustHandles="1" noChangeArrowheads="1" noChangeShapeType="1" noTextEdit="1"/>
+          </p:cNvSpPr>
+          <p:nvPr>
+            <p:extLst>
+              <p:ext uri="{386F3935-93C4-4BCD-93E2-E3B085C9AB24}">
+                <p16:designElem xmlns:p16="http://schemas.microsoft.com/office/powerpoint/2015/main" val="1"/>
+              </p:ext>
+            </p:extLst>
+          </p:nvPr>
+        </p:nvSpPr>
+        <p:spPr>
+          <a:xfrm>
+            <a:off x="477819" y="1576408"/>
+            <a:ext cx="8188361" cy="4638125"/>
+          </a:xfrm>
+          <a:custGeom>
+            <a:avLst/>
+            <a:gdLst>
+              <a:gd name="connsiteX0" fmla="*/ 5441025 w 10917814"/>
+              <a:gd name="connsiteY0" fmla="*/ 0 h 4638125"/>
+              <a:gd name="connsiteX1" fmla="*/ 5453725 w 10917814"/>
+              <a:gd name="connsiteY1" fmla="*/ 0 h 4638125"/>
+              <a:gd name="connsiteX2" fmla="*/ 5464308 w 10917814"/>
+              <a:gd name="connsiteY2" fmla="*/ 0 h 4638125"/>
+              <a:gd name="connsiteX3" fmla="*/ 5477009 w 10917814"/>
+              <a:gd name="connsiteY3" fmla="*/ 4762 h 4638125"/>
+              <a:gd name="connsiteX4" fmla="*/ 5489708 w 10917814"/>
+              <a:gd name="connsiteY4" fmla="*/ 9525 h 4638125"/>
+              <a:gd name="connsiteX5" fmla="*/ 5498175 w 10917814"/>
+              <a:gd name="connsiteY5" fmla="*/ 12700 h 4638125"/>
+              <a:gd name="connsiteX6" fmla="*/ 5865801 w 10917814"/>
+              <a:gd name="connsiteY6" fmla="*/ 288419 h 4638125"/>
+              <a:gd name="connsiteX7" fmla="*/ 10765009 w 10917814"/>
+              <a:gd name="connsiteY7" fmla="*/ 288419 h 4638125"/>
+              <a:gd name="connsiteX8" fmla="*/ 10917814 w 10917814"/>
+              <a:gd name="connsiteY8" fmla="*/ 441224 h 4638125"/>
+              <a:gd name="connsiteX9" fmla="*/ 10917814 w 10917814"/>
+              <a:gd name="connsiteY9" fmla="*/ 4485320 h 4638125"/>
+              <a:gd name="connsiteX10" fmla="*/ 10765009 w 10917814"/>
+              <a:gd name="connsiteY10" fmla="*/ 4638125 h 4638125"/>
+              <a:gd name="connsiteX11" fmla="*/ 152805 w 10917814"/>
+              <a:gd name="connsiteY11" fmla="*/ 4638125 h 4638125"/>
+              <a:gd name="connsiteX12" fmla="*/ 0 w 10917814"/>
+              <a:gd name="connsiteY12" fmla="*/ 4485320 h 4638125"/>
+              <a:gd name="connsiteX13" fmla="*/ 0 w 10917814"/>
+              <a:gd name="connsiteY13" fmla="*/ 441224 h 4638125"/>
+              <a:gd name="connsiteX14" fmla="*/ 152805 w 10917814"/>
+              <a:gd name="connsiteY14" fmla="*/ 288419 h 4638125"/>
+              <a:gd name="connsiteX15" fmla="*/ 5041650 w 10917814"/>
+              <a:gd name="connsiteY15" fmla="*/ 288419 h 4638125"/>
+              <a:gd name="connsiteX16" fmla="*/ 5409275 w 10917814"/>
+              <a:gd name="connsiteY16" fmla="*/ 12700 h 4638125"/>
+              <a:gd name="connsiteX17" fmla="*/ 5417742 w 10917814"/>
+              <a:gd name="connsiteY17" fmla="*/ 9525 h 4638125"/>
+              <a:gd name="connsiteX18" fmla="*/ 5430442 w 10917814"/>
+              <a:gd name="connsiteY18" fmla="*/ 4762 h 4638125"/>
+            </a:gdLst>
+            <a:ahLst/>
+            <a:cxnLst>
+              <a:cxn ang="0">
+                <a:pos x="connsiteX0" y="connsiteY0"/>
+              </a:cxn>
+              <a:cxn ang="0">
+                <a:pos x="connsiteX1" y="connsiteY1"/>
+              </a:cxn>
+              <a:cxn ang="0">
+                <a:pos x="connsiteX2" y="connsiteY2"/>
+              </a:cxn>
+              <a:cxn ang="0">
+                <a:pos x="connsiteX3" y="connsiteY3"/>
+              </a:cxn>
+              <a:cxn ang="0">
+                <a:pos x="connsiteX4" y="connsiteY4"/>
+              </a:cxn>
+              <a:cxn ang="0">
+                <a:pos x="connsiteX5" y="connsiteY5"/>
+              </a:cxn>
+              <a:cxn ang="0">
+                <a:pos x="connsiteX6" y="connsiteY6"/>
+              </a:cxn>
+              <a:cxn ang="0">
+                <a:pos x="connsiteX7" y="connsiteY7"/>
+              </a:cxn>
+              <a:cxn ang="0">
+                <a:pos x="connsiteX8" y="connsiteY8"/>
+              </a:cxn>
+              <a:cxn ang="0">
+                <a:pos x="connsiteX9" y="connsiteY9"/>
+              </a:cxn>
+              <a:cxn ang="0">
+                <a:pos x="connsiteX10" y="connsiteY10"/>
+              </a:cxn>
+              <a:cxn ang="0">
+                <a:pos x="connsiteX11" y="connsiteY11"/>
+              </a:cxn>
+              <a:cxn ang="0">
+                <a:pos x="connsiteX12" y="connsiteY12"/>
+              </a:cxn>
+              <a:cxn ang="0">
+                <a:pos x="connsiteX13" y="connsiteY13"/>
+              </a:cxn>
+              <a:cxn ang="0">
+                <a:pos x="connsiteX14" y="connsiteY14"/>
+              </a:cxn>
+              <a:cxn ang="0">
+                <a:pos x="connsiteX15" y="connsiteY15"/>
+              </a:cxn>
+              <a:cxn ang="0">
+                <a:pos x="connsiteX16" y="connsiteY16"/>
+              </a:cxn>
+              <a:cxn ang="0">
+                <a:pos x="connsiteX17" y="connsiteY17"/>
+              </a:cxn>
+              <a:cxn ang="0">
+                <a:pos x="connsiteX18" y="connsiteY18"/>
+              </a:cxn>
+            </a:cxnLst>
+            <a:rect l="l" t="t" r="r" b="b"/>
+            <a:pathLst>
+              <a:path w="10917814" h="4638125">
+                <a:moveTo>
+                  <a:pt x="5441025" y="0"/>
+                </a:moveTo>
+                <a:lnTo>
+                  <a:pt x="5453725" y="0"/>
+                </a:lnTo>
+                <a:lnTo>
+                  <a:pt x="5464308" y="0"/>
+                </a:lnTo>
+                <a:lnTo>
+                  <a:pt x="5477009" y="4762"/>
+                </a:lnTo>
+                <a:lnTo>
+                  <a:pt x="5489708" y="9525"/>
+                </a:lnTo>
+                <a:lnTo>
+                  <a:pt x="5498175" y="12700"/>
+                </a:lnTo>
+                <a:lnTo>
+                  <a:pt x="5865801" y="288419"/>
+                </a:lnTo>
+                <a:lnTo>
+                  <a:pt x="10765009" y="288419"/>
+                </a:lnTo>
+                <a:cubicBezTo>
+                  <a:pt x="10849401" y="288419"/>
+                  <a:pt x="10917814" y="356832"/>
+                  <a:pt x="10917814" y="441224"/>
+                </a:cubicBezTo>
+                <a:lnTo>
+                  <a:pt x="10917814" y="4485320"/>
+                </a:lnTo>
+                <a:cubicBezTo>
+                  <a:pt x="10917814" y="4569712"/>
+                  <a:pt x="10849401" y="4638125"/>
+                  <a:pt x="10765009" y="4638125"/>
+                </a:cubicBezTo>
+                <a:lnTo>
+                  <a:pt x="152805" y="4638125"/>
+                </a:lnTo>
+                <a:cubicBezTo>
+                  <a:pt x="68413" y="4638125"/>
+                  <a:pt x="0" y="4569712"/>
+                  <a:pt x="0" y="4485320"/>
+                </a:cubicBezTo>
+                <a:lnTo>
+                  <a:pt x="0" y="441224"/>
+                </a:lnTo>
+                <a:cubicBezTo>
+                  <a:pt x="0" y="356832"/>
+                  <a:pt x="68413" y="288419"/>
+                  <a:pt x="152805" y="288419"/>
+                </a:cubicBezTo>
+                <a:lnTo>
+                  <a:pt x="5041650" y="288419"/>
+                </a:lnTo>
+                <a:lnTo>
+                  <a:pt x="5409275" y="12700"/>
+                </a:lnTo>
+                <a:lnTo>
+                  <a:pt x="5417742" y="9525"/>
+                </a:lnTo>
+                <a:lnTo>
+                  <a:pt x="5430442" y="4762"/>
+                </a:lnTo>
+                <a:close/>
+              </a:path>
+            </a:pathLst>
+          </a:custGeom>
+          <a:noFill/>
+          <a:ln w="38100">
+            <a:solidFill>
+              <a:schemeClr val="accent1"/>
+            </a:solidFill>
+          </a:ln>
+          <a:effectLst/>
+        </p:spPr>
+        <p:style>
+          <a:lnRef idx="2">
+            <a:schemeClr val="accent1">
+              <a:shade val="50000"/>
+            </a:schemeClr>
+          </a:lnRef>
+          <a:fillRef idx="1">
+            <a:schemeClr val="accent1"/>
+          </a:fillRef>
+          <a:effectRef idx="0">
+            <a:schemeClr val="accent1"/>
+          </a:effectRef>
+          <a:fontRef idx="minor">
+            <a:schemeClr val="lt1"/>
+          </a:fontRef>
+        </p:style>
+        <p:txBody>
+          <a:bodyPr wrap="square" rtlCol="0" anchor="ctr">
+            <a:noAutofit/>
+          </a:bodyPr>
+          <a:lstStyle/>
+          <a:p>
+            <a:pPr algn="ctr"/>
+            <a:endParaRPr lang="en-US"/>
+          </a:p>
+        </p:txBody>
+      </p:sp>
+      <p:sp>
+        <p:nvSpPr>
+          <p:cNvPr id="2" name="Espaço Reservado para Conteúdo 1"/>
+          <p:cNvSpPr>
+            <a:spLocks noGrp="1"/>
+          </p:cNvSpPr>
+          <p:nvPr>
+            <p:ph idx="1"/>
+          </p:nvPr>
+        </p:nvSpPr>
+        <p:spPr>
+          <a:xfrm>
+            <a:off x="607500" y="1988840"/>
+            <a:ext cx="7928998" cy="4225693"/>
+          </a:xfrm>
+          <a:effectLst/>
+        </p:spPr>
+        <p:txBody>
+          <a:bodyPr>
+            <a:noAutofit/>
           </a:bodyPr>
           <a:lstStyle/>
           <a:p>
@@ -11153,9 +13080,9 @@
               <a:buChar char="Ø"/>
             </a:pPr>
             <a:r>
-              <a:rPr lang="pt-BR" sz="4400" dirty="0">
+              <a:rPr lang="pt-BR" sz="4400" b="1" dirty="0">
                 <a:solidFill>
-                  <a:schemeClr val="accent1"/>
+                  <a:srgbClr val="FF0000"/>
                 </a:solidFill>
               </a:rPr>
               <a:t>Vocês irão fazer os algoritmos e;</a:t>
@@ -11170,25 +13097,30 @@
               <a:buChar char="Ø"/>
             </a:pPr>
             <a:r>
-              <a:rPr lang="pt-BR" sz="4400" dirty="0">
+              <a:rPr lang="pt-BR" sz="4400" b="1" dirty="0">
                 <a:solidFill>
-                  <a:schemeClr val="accent1"/>
+                  <a:srgbClr val="FF0000"/>
                 </a:solidFill>
               </a:rPr>
               <a:t>Faça os Fluxogramas de cada Exercício.</a:t>
             </a:r>
+            <a:endParaRPr lang="pt-BR" sz="4400" b="1" dirty="0">
+              <a:solidFill>
+                <a:srgbClr val="FF0000"/>
+              </a:solidFill>
+            </a:endParaRPr>
           </a:p>
         </p:txBody>
       </p:sp>
     </p:spTree>
     <p:extLst>
       <p:ext uri="{BB962C8B-B14F-4D97-AF65-F5344CB8AC3E}">
-        <p14:creationId xmlns:p14="http://schemas.microsoft.com/office/powerpoint/2010/main" val="4191541349"/>
+        <p14:creationId xmlns:p14="http://schemas.microsoft.com/office/powerpoint/2010/main" val="868342131"/>
       </p:ext>
     </p:extLst>
   </p:cSld>
   <p:clrMapOvr>
-    <a:masterClrMapping/>
+    <a:overrideClrMapping bg1="lt1" tx1="dk1" bg2="lt2" tx2="dk2" accent1="accent1" accent2="accent2" accent3="accent3" accent4="accent4" accent5="accent5" accent6="accent6" hlink="hlink" folHlink="folHlink"/>
   </p:clrMapOvr>
   <p:timing>
     <p:tnLst>

</xml_diff>

<commit_message>
Editado exemplo do exercicio 05
</commit_message>
<xml_diff>
--- a/LP-Aula-03 - Fluxogramas.pptx
+++ b/LP-Aula-03 - Fluxogramas.pptx
@@ -233,7 +233,7 @@
           <a:p>
             <a:fld id="{34785C70-90AD-44DE-8AE9-5255B6AB3650}" type="datetimeFigureOut">
               <a:rPr lang="pt-BR" smtClean="0"/>
-              <a:t>13/03/2024</a:t>
+              <a:t>05/04/2024</a:t>
             </a:fld>
             <a:endParaRPr lang="pt-BR"/>
           </a:p>
@@ -787,7 +787,7 @@
           <a:p>
             <a:fld id="{572F0586-0D06-461B-97BB-78406097ECB1}" type="datetimeFigureOut">
               <a:rPr lang="pt-BR" smtClean="0"/>
-              <a:t>13/03/2024</a:t>
+              <a:t>05/04/2024</a:t>
             </a:fld>
             <a:endParaRPr lang="pt-BR"/>
           </a:p>
@@ -1109,7 +1109,7 @@
           <a:p>
             <a:fld id="{572F0586-0D06-461B-97BB-78406097ECB1}" type="datetimeFigureOut">
               <a:rPr lang="pt-BR" smtClean="0"/>
-              <a:t>13/03/2024</a:t>
+              <a:t>05/04/2024</a:t>
             </a:fld>
             <a:endParaRPr lang="pt-BR"/>
           </a:p>
@@ -1601,7 +1601,7 @@
           <a:p>
             <a:fld id="{572F0586-0D06-461B-97BB-78406097ECB1}" type="datetimeFigureOut">
               <a:rPr lang="pt-BR" smtClean="0"/>
-              <a:t>13/03/2024</a:t>
+              <a:t>05/04/2024</a:t>
             </a:fld>
             <a:endParaRPr lang="pt-BR"/>
           </a:p>
@@ -1974,7 +1974,7 @@
           <a:p>
             <a:fld id="{572F0586-0D06-461B-97BB-78406097ECB1}" type="datetimeFigureOut">
               <a:rPr lang="pt-BR" smtClean="0"/>
-              <a:t>13/03/2024</a:t>
+              <a:t>05/04/2024</a:t>
             </a:fld>
             <a:endParaRPr lang="pt-BR"/>
           </a:p>
@@ -2251,7 +2251,7 @@
           <a:p>
             <a:fld id="{572F0586-0D06-461B-97BB-78406097ECB1}" type="datetimeFigureOut">
               <a:rPr lang="pt-BR" smtClean="0"/>
-              <a:t>13/03/2024</a:t>
+              <a:t>05/04/2024</a:t>
             </a:fld>
             <a:endParaRPr lang="pt-BR"/>
           </a:p>
@@ -2581,7 +2581,7 @@
           <a:p>
             <a:fld id="{572F0586-0D06-461B-97BB-78406097ECB1}" type="datetimeFigureOut">
               <a:rPr lang="pt-BR" smtClean="0"/>
-              <a:t>13/03/2024</a:t>
+              <a:t>05/04/2024</a:t>
             </a:fld>
             <a:endParaRPr lang="pt-BR"/>
           </a:p>
@@ -2863,7 +2863,7 @@
           <a:p>
             <a:fld id="{572F0586-0D06-461B-97BB-78406097ECB1}" type="datetimeFigureOut">
               <a:rPr lang="pt-BR" smtClean="0"/>
-              <a:t>13/03/2024</a:t>
+              <a:t>05/04/2024</a:t>
             </a:fld>
             <a:endParaRPr lang="pt-BR"/>
           </a:p>
@@ -3210,7 +3210,7 @@
           <a:p>
             <a:fld id="{572F0586-0D06-461B-97BB-78406097ECB1}" type="datetimeFigureOut">
               <a:rPr lang="pt-BR" smtClean="0"/>
-              <a:t>13/03/2024</a:t>
+              <a:t>05/04/2024</a:t>
             </a:fld>
             <a:endParaRPr lang="pt-BR"/>
           </a:p>
@@ -3549,7 +3549,7 @@
           <a:p>
             <a:fld id="{572F0586-0D06-461B-97BB-78406097ECB1}" type="datetimeFigureOut">
               <a:rPr lang="pt-BR" smtClean="0"/>
-              <a:t>13/03/2024</a:t>
+              <a:t>05/04/2024</a:t>
             </a:fld>
             <a:endParaRPr lang="pt-BR"/>
           </a:p>
@@ -4026,7 +4026,7 @@
           <a:p>
             <a:fld id="{572F0586-0D06-461B-97BB-78406097ECB1}" type="datetimeFigureOut">
               <a:rPr lang="pt-BR" smtClean="0"/>
-              <a:t>13/03/2024</a:t>
+              <a:t>05/04/2024</a:t>
             </a:fld>
             <a:endParaRPr lang="pt-BR"/>
           </a:p>
@@ -4247,7 +4247,7 @@
           <a:p>
             <a:fld id="{572F0586-0D06-461B-97BB-78406097ECB1}" type="datetimeFigureOut">
               <a:rPr lang="pt-BR" smtClean="0"/>
-              <a:t>13/03/2024</a:t>
+              <a:t>05/04/2024</a:t>
             </a:fld>
             <a:endParaRPr lang="pt-BR"/>
           </a:p>
@@ -4346,7 +4346,7 @@
           <a:p>
             <a:fld id="{572F0586-0D06-461B-97BB-78406097ECB1}" type="datetimeFigureOut">
               <a:rPr lang="pt-BR" smtClean="0"/>
-              <a:t>13/03/2024</a:t>
+              <a:t>05/04/2024</a:t>
             </a:fld>
             <a:endParaRPr lang="pt-BR"/>
           </a:p>
@@ -4817,7 +4817,7 @@
           <a:p>
             <a:fld id="{572F0586-0D06-461B-97BB-78406097ECB1}" type="datetimeFigureOut">
               <a:rPr lang="pt-BR" smtClean="0"/>
-              <a:t>13/03/2024</a:t>
+              <a:t>05/04/2024</a:t>
             </a:fld>
             <a:endParaRPr lang="pt-BR"/>
           </a:p>
@@ -5130,7 +5130,7 @@
           <a:p>
             <a:fld id="{572F0586-0D06-461B-97BB-78406097ECB1}" type="datetimeFigureOut">
               <a:rPr lang="pt-BR" smtClean="0"/>
-              <a:t>13/03/2024</a:t>
+              <a:t>05/04/2024</a:t>
             </a:fld>
             <a:endParaRPr lang="pt-BR"/>
           </a:p>
@@ -5408,7 +5408,7 @@
           <a:p>
             <a:fld id="{572F0586-0D06-461B-97BB-78406097ECB1}" type="datetimeFigureOut">
               <a:rPr lang="pt-BR" smtClean="0"/>
-              <a:t>13/03/2024</a:t>
+              <a:t>05/04/2024</a:t>
             </a:fld>
             <a:endParaRPr lang="pt-BR"/>
           </a:p>
@@ -5873,7 +5873,7 @@
                 <a16:creationId xmlns:a16="http://schemas.microsoft.com/office/drawing/2014/main" id="{597EA66B-2AAB-42B0-9F9D-38920D8D82D7}"/>
               </a:ext>
               <a:ext uri="{C183D7F6-B498-43B3-948B-1728B52AA6E4}">
-                <adec:decorative xmlns:adec="http://schemas.microsoft.com/office/drawing/2017/decorative" xmlns="" val="1"/>
+                <adec:decorative xmlns="" xmlns:adec="http://schemas.microsoft.com/office/drawing/2017/decorative" val="1"/>
               </a:ext>
             </a:extLst>
           </p:cNvPr>
@@ -6023,7 +6023,7 @@
                 <a16:creationId xmlns:a16="http://schemas.microsoft.com/office/drawing/2014/main" id="{D360EBE3-31BB-422F-AA87-FA3873DAE484}"/>
               </a:ext>
               <a:ext uri="{C183D7F6-B498-43B3-948B-1728B52AA6E4}">
-                <adec:decorative xmlns:adec="http://schemas.microsoft.com/office/drawing/2017/decorative" xmlns="" val="1"/>
+                <adec:decorative xmlns="" xmlns:adec="http://schemas.microsoft.com/office/drawing/2017/decorative" val="1"/>
               </a:ext>
             </a:extLst>
           </p:cNvPr>
@@ -6215,7 +6215,7 @@
           <a:effectLst/>
           <a:extLst>
             <a:ext uri="{91240B29-F687-4f45-9708-019B960494DF}">
-              <a14:hiddenLine xmlns:a14="http://schemas.microsoft.com/office/drawing/2010/main" xmlns:p14="http://schemas.microsoft.com/office/powerpoint/2010/main" xmlns:a16="http://schemas.microsoft.com/office/drawing/2014/main" xmlns="" w="9525">
+              <a14:hiddenLine xmlns="" xmlns:a16="http://schemas.microsoft.com/office/drawing/2014/main" xmlns:p14="http://schemas.microsoft.com/office/powerpoint/2010/main" xmlns:a14="http://schemas.microsoft.com/office/drawing/2010/main" w="9525">
                 <a:solidFill>
                   <a:srgbClr val="000000"/>
                 </a:solidFill>
@@ -7230,7 +7230,7 @@
                 <a16:creationId xmlns:a16="http://schemas.microsoft.com/office/drawing/2014/main" id="{E2264E67-6F59-4D8D-8E5F-8245B0FEAE76}"/>
               </a:ext>
               <a:ext uri="{C183D7F6-B498-43B3-948B-1728B52AA6E4}">
-                <adec:decorative xmlns:adec="http://schemas.microsoft.com/office/drawing/2017/decorative" xmlns="" val="1"/>
+                <adec:decorative xmlns="" xmlns:adec="http://schemas.microsoft.com/office/drawing/2017/decorative" val="1"/>
               </a:ext>
             </a:extLst>
           </p:cNvPr>
@@ -7293,7 +7293,7 @@
                 <a16:creationId xmlns:a16="http://schemas.microsoft.com/office/drawing/2014/main" id="{158E1C6E-D299-4F5D-B15B-155EBF7F62FD}"/>
               </a:ext>
               <a:ext uri="{C183D7F6-B498-43B3-948B-1728B52AA6E4}">
-                <adec:decorative xmlns:adec="http://schemas.microsoft.com/office/drawing/2017/decorative" xmlns="" val="1"/>
+                <adec:decorative xmlns="" xmlns:adec="http://schemas.microsoft.com/office/drawing/2017/decorative" val="1"/>
               </a:ext>
             </a:extLst>
           </p:cNvPr>
@@ -7677,7 +7677,7 @@
                 <a16:creationId xmlns:a16="http://schemas.microsoft.com/office/drawing/2014/main" id="{E2264E67-6F59-4D8D-8E5F-8245B0FEAE76}"/>
               </a:ext>
               <a:ext uri="{C183D7F6-B498-43B3-948B-1728B52AA6E4}">
-                <adec:decorative xmlns:adec="http://schemas.microsoft.com/office/drawing/2017/decorative" xmlns="" val="1"/>
+                <adec:decorative xmlns="" xmlns:adec="http://schemas.microsoft.com/office/drawing/2017/decorative" val="1"/>
               </a:ext>
             </a:extLst>
           </p:cNvPr>
@@ -7740,7 +7740,7 @@
                 <a16:creationId xmlns:a16="http://schemas.microsoft.com/office/drawing/2014/main" id="{158E1C6E-D299-4F5D-B15B-155EBF7F62FD}"/>
               </a:ext>
               <a:ext uri="{C183D7F6-B498-43B3-948B-1728B52AA6E4}">
-                <adec:decorative xmlns:adec="http://schemas.microsoft.com/office/drawing/2017/decorative" xmlns="" val="1"/>
+                <adec:decorative xmlns="" xmlns:adec="http://schemas.microsoft.com/office/drawing/2017/decorative" val="1"/>
               </a:ext>
             </a:extLst>
           </p:cNvPr>
@@ -8114,7 +8114,7 @@
                 <a16:creationId xmlns:a16="http://schemas.microsoft.com/office/drawing/2014/main" id="{E2264E67-6F59-4D8D-8E5F-8245B0FEAE76}"/>
               </a:ext>
               <a:ext uri="{C183D7F6-B498-43B3-948B-1728B52AA6E4}">
-                <adec:decorative xmlns:adec="http://schemas.microsoft.com/office/drawing/2017/decorative" xmlns="" val="1"/>
+                <adec:decorative xmlns="" xmlns:adec="http://schemas.microsoft.com/office/drawing/2017/decorative" val="1"/>
               </a:ext>
             </a:extLst>
           </p:cNvPr>
@@ -8177,7 +8177,7 @@
                 <a16:creationId xmlns:a16="http://schemas.microsoft.com/office/drawing/2014/main" id="{158E1C6E-D299-4F5D-B15B-155EBF7F62FD}"/>
               </a:ext>
               <a:ext uri="{C183D7F6-B498-43B3-948B-1728B52AA6E4}">
-                <adec:decorative xmlns:adec="http://schemas.microsoft.com/office/drawing/2017/decorative" xmlns="" val="1"/>
+                <adec:decorative xmlns="" xmlns:adec="http://schemas.microsoft.com/office/drawing/2017/decorative" val="1"/>
               </a:ext>
             </a:extLst>
           </p:cNvPr>
@@ -8551,7 +8551,7 @@
                 <a16:creationId xmlns:a16="http://schemas.microsoft.com/office/drawing/2014/main" id="{F1E0D4A3-ECB8-4689-ABDB-9CE848CE83B9}"/>
               </a:ext>
               <a:ext uri="{C183D7F6-B498-43B3-948B-1728B52AA6E4}">
-                <adec:decorative xmlns:adec="http://schemas.microsoft.com/office/drawing/2017/decorative" xmlns="" val="1"/>
+                <adec:decorative xmlns="" xmlns:adec="http://schemas.microsoft.com/office/drawing/2017/decorative" val="1"/>
               </a:ext>
             </a:extLst>
           </p:cNvPr>
@@ -8651,7 +8651,7 @@
                 <a16:creationId xmlns:a16="http://schemas.microsoft.com/office/drawing/2014/main" id="{8854772B-9C8F-4037-89E0-3A45208AB395}"/>
               </a:ext>
               <a:ext uri="{C183D7F6-B498-43B3-948B-1728B52AA6E4}">
-                <adec:decorative xmlns:adec="http://schemas.microsoft.com/office/drawing/2017/decorative" xmlns="" val="1"/>
+                <adec:decorative xmlns="" xmlns:adec="http://schemas.microsoft.com/office/drawing/2017/decorative" val="1"/>
               </a:ext>
             </a:extLst>
           </p:cNvPr>
@@ -9245,7 +9245,7 @@
                 <a16:creationId xmlns:a16="http://schemas.microsoft.com/office/drawing/2014/main" id="{089A69AF-D57B-49B4-886C-D4A5DC194421}"/>
               </a:ext>
               <a:ext uri="{C183D7F6-B498-43B3-948B-1728B52AA6E4}">
-                <adec:decorative xmlns:adec="http://schemas.microsoft.com/office/drawing/2017/decorative" xmlns="" val="1"/>
+                <adec:decorative xmlns="" xmlns:adec="http://schemas.microsoft.com/office/drawing/2017/decorative" val="1"/>
               </a:ext>
             </a:extLst>
           </p:cNvPr>
@@ -9305,7 +9305,7 @@
                 <a16:creationId xmlns:a16="http://schemas.microsoft.com/office/drawing/2014/main" id="{CABDC08D-6093-4397-92D4-54D00E2BB1C2}"/>
               </a:ext>
               <a:ext uri="{C183D7F6-B498-43B3-948B-1728B52AA6E4}">
-                <adec:decorative xmlns:adec="http://schemas.microsoft.com/office/drawing/2017/decorative" xmlns="" val="1"/>
+                <adec:decorative xmlns="" xmlns:adec="http://schemas.microsoft.com/office/drawing/2017/decorative" val="1"/>
               </a:ext>
             </a:extLst>
           </p:cNvPr>
@@ -9510,7 +9510,7 @@
           <a:effectLst/>
           <a:extLst>
             <a:ext uri="{91240B29-F687-4f45-9708-019B960494DF}">
-              <a14:hiddenLine xmlns:a16="http://schemas.microsoft.com/office/drawing/2014/main" xmlns:p14="http://schemas.microsoft.com/office/powerpoint/2010/main" xmlns:a14="http://schemas.microsoft.com/office/drawing/2010/main" xmlns="" w="9525">
+              <a14:hiddenLine xmlns="" xmlns:a14="http://schemas.microsoft.com/office/drawing/2010/main" xmlns:p14="http://schemas.microsoft.com/office/powerpoint/2010/main" xmlns:a16="http://schemas.microsoft.com/office/drawing/2014/main" w="9525">
                 <a:solidFill>
                   <a:srgbClr val="000000"/>
                 </a:solidFill>
@@ -9671,7 +9671,7 @@
                 <a16:creationId xmlns:a16="http://schemas.microsoft.com/office/drawing/2014/main" id="{F1E0D4A3-ECB8-4689-ABDB-9CE848CE83B9}"/>
               </a:ext>
               <a:ext uri="{C183D7F6-B498-43B3-948B-1728B52AA6E4}">
-                <adec:decorative xmlns:adec="http://schemas.microsoft.com/office/drawing/2017/decorative" xmlns="" val="1"/>
+                <adec:decorative xmlns="" xmlns:adec="http://schemas.microsoft.com/office/drawing/2017/decorative" val="1"/>
               </a:ext>
             </a:extLst>
           </p:cNvPr>
@@ -9771,7 +9771,7 @@
                 <a16:creationId xmlns:a16="http://schemas.microsoft.com/office/drawing/2014/main" id="{8854772B-9C8F-4037-89E0-3A45208AB395}"/>
               </a:ext>
               <a:ext uri="{C183D7F6-B498-43B3-948B-1728B52AA6E4}">
-                <adec:decorative xmlns:adec="http://schemas.microsoft.com/office/drawing/2017/decorative" xmlns="" val="1"/>
+                <adec:decorative xmlns="" xmlns:adec="http://schemas.microsoft.com/office/drawing/2017/decorative" val="1"/>
               </a:ext>
             </a:extLst>
           </p:cNvPr>
@@ -10031,11 +10031,7 @@
             </a:pPr>
             <a:r>
               <a:rPr lang="pt-BR" sz="1600" b="1" dirty="0"/>
-              <a:t>3</a:t>
-            </a:r>
-            <a:r>
-              <a:rPr lang="pt-BR" sz="1600" b="1" dirty="0"/>
-              <a:t>) Construa um algoritmo para pagamento de comissão de vendedores de peças, levando-se em consideração que sua comissão será de 5% do total da venda e que você precisará dos seguintes dados:</a:t>
+              <a:t>3) Construa um algoritmo para pagamento de comissão de vendedores de peças, levando-se em consideração que sua comissão será de 5% do total da venda e que você precisará dos seguintes dados:</a:t>
             </a:r>
           </a:p>
           <a:p>
@@ -10199,7 +10195,7 @@
                 <a16:creationId xmlns:a16="http://schemas.microsoft.com/office/drawing/2014/main" id="{F1E0D4A3-ECB8-4689-ABDB-9CE848CE83B9}"/>
               </a:ext>
               <a:ext uri="{C183D7F6-B498-43B3-948B-1728B52AA6E4}">
-                <adec:decorative xmlns:adec="http://schemas.microsoft.com/office/drawing/2017/decorative" xmlns="" val="1"/>
+                <adec:decorative xmlns="" xmlns:adec="http://schemas.microsoft.com/office/drawing/2017/decorative" val="1"/>
               </a:ext>
             </a:extLst>
           </p:cNvPr>
@@ -10299,7 +10295,7 @@
                 <a16:creationId xmlns:a16="http://schemas.microsoft.com/office/drawing/2014/main" id="{8854772B-9C8F-4037-89E0-3A45208AB395}"/>
               </a:ext>
               <a:ext uri="{C183D7F6-B498-43B3-948B-1728B52AA6E4}">
-                <adec:decorative xmlns:adec="http://schemas.microsoft.com/office/drawing/2017/decorative" xmlns="" val="1"/>
+                <adec:decorative xmlns="" xmlns:adec="http://schemas.microsoft.com/office/drawing/2017/decorative" val="1"/>
               </a:ext>
             </a:extLst>
           </p:cNvPr>
@@ -10559,11 +10555,7 @@
             </a:pPr>
             <a:r>
               <a:rPr lang="pt-BR" sz="1600" b="1" dirty="0"/>
-              <a:t>4</a:t>
-            </a:r>
-            <a:r>
-              <a:rPr lang="pt-BR" sz="1600" b="1" dirty="0"/>
-              <a:t>) O custo ao consumidor de um carro novo é a soma do custo de fábrica com a percentagem do distribuidor e dos impostos (aplicados, primeiro os impostos sobre o custo de fábrica, e depois a percentagem do distribuidor sobre o resultado). Supondo que a percentagem do distribuidor seja de 28% e os impostos 45%. Escrever um algoritmo que leia o custo de fábrica de um carro e informe o custo ao consumidor do mesmo.</a:t>
+              <a:t>4) O custo ao consumidor de um carro novo é a soma do custo de fábrica com a percentagem do distribuidor e dos impostos (aplicados, primeiro os impostos sobre o custo de fábrica, e depois a percentagem do distribuidor sobre o resultado). Supondo que a percentagem do distribuidor seja de 28% e os impostos 45%. Escrever um algoritmo que leia o custo de fábrica de um carro e informe o custo ao consumidor do mesmo.</a:t>
             </a:r>
           </a:p>
           <a:p>
@@ -10629,11 +10621,6 @@
               </a:rPr>
               <a:t>			Para o consumidor: R$ 46.400,00</a:t>
             </a:r>
-            <a:endParaRPr lang="pt-BR" sz="1600" b="1" dirty="0">
-              <a:solidFill>
-                <a:srgbClr val="FF0000"/>
-              </a:solidFill>
-            </a:endParaRPr>
           </a:p>
         </p:txBody>
       </p:sp>
@@ -10690,7 +10677,7 @@
                 <a16:creationId xmlns:a16="http://schemas.microsoft.com/office/drawing/2014/main" id="{F1E0D4A3-ECB8-4689-ABDB-9CE848CE83B9}"/>
               </a:ext>
               <a:ext uri="{C183D7F6-B498-43B3-948B-1728B52AA6E4}">
-                <adec:decorative xmlns:adec="http://schemas.microsoft.com/office/drawing/2017/decorative" xmlns="" val="1"/>
+                <adec:decorative xmlns="" xmlns:adec="http://schemas.microsoft.com/office/drawing/2017/decorative" val="1"/>
               </a:ext>
             </a:extLst>
           </p:cNvPr>
@@ -10790,7 +10777,7 @@
                 <a16:creationId xmlns:a16="http://schemas.microsoft.com/office/drawing/2014/main" id="{8854772B-9C8F-4037-89E0-3A45208AB395}"/>
               </a:ext>
               <a:ext uri="{C183D7F6-B498-43B3-948B-1728B52AA6E4}">
-                <adec:decorative xmlns:adec="http://schemas.microsoft.com/office/drawing/2017/decorative" xmlns="" val="1"/>
+                <adec:decorative xmlns="" xmlns:adec="http://schemas.microsoft.com/office/drawing/2017/decorative" val="1"/>
               </a:ext>
             </a:extLst>
           </p:cNvPr>
@@ -11075,7 +11062,15 @@
                   <a:srgbClr val="FF0000"/>
                 </a:solidFill>
               </a:rPr>
-              <a:t>exemplo 4h23 minutos equivale a 4.38 para fazer cálculos matemáticos</a:t>
+              <a:t>exemplo 4h23 minutos equivale a 4.38 para fazer cálculos </a:t>
+            </a:r>
+            <a:r>
+              <a:rPr lang="pt-BR" sz="1600" b="1" dirty="0" smtClean="0">
+                <a:solidFill>
+                  <a:srgbClr val="FF0000"/>
+                </a:solidFill>
+              </a:rPr>
+              <a:t>matemáticos</a:t>
             </a:r>
           </a:p>
           <a:p>
@@ -11087,23 +11082,22 @@
               <a:buChar char="Ø"/>
             </a:pPr>
             <a:r>
-              <a:rPr lang="pt-BR" sz="1600" b="1" dirty="0">
+              <a:rPr lang="pt-BR" sz="1600" b="1" dirty="0" smtClean="0">
                 <a:solidFill>
                   <a:srgbClr val="FF0000"/>
                 </a:solidFill>
               </a:rPr>
-              <a:t>Para chegar a essa conclusão: 23/60 = 0,38 </a:t>
-            </a:r>
-            <a:r>
-              <a:rPr lang="pt-BR" sz="1600" b="1" dirty="0">
+              <a:t>1h = 3600 </a:t>
+            </a:r>
+            <a:r>
+              <a:rPr lang="pt-BR" sz="1600" b="1" dirty="0" err="1" smtClean="0">
                 <a:solidFill>
                   <a:srgbClr val="FF0000"/>
                 </a:solidFill>
-                <a:sym typeface="Wingdings" panose="05000000000000000000" pitchFamily="2" charset="2"/>
               </a:rPr>
-              <a:t> 4+0,38 = 4,38</a:t>
-            </a:r>
-            <a:endParaRPr lang="pt-BR" sz="1600" b="1" dirty="0">
+              <a:t>seg</a:t>
+            </a:r>
+            <a:endParaRPr lang="pt-BR" sz="1600" b="1" dirty="0" smtClean="0">
               <a:solidFill>
                 <a:srgbClr val="FF0000"/>
               </a:solidFill>
@@ -11118,13 +11112,58 @@
               <a:buChar char="Ø"/>
             </a:pPr>
             <a:r>
+              <a:rPr lang="pt-BR" sz="1600" b="1" dirty="0" err="1" smtClean="0">
+                <a:solidFill>
+                  <a:srgbClr val="FF0000"/>
+                </a:solidFill>
+              </a:rPr>
+              <a:t>Qtde</a:t>
+            </a:r>
+            <a:r>
+              <a:rPr lang="pt-BR" sz="1600" b="1" dirty="0" smtClean="0">
+                <a:solidFill>
+                  <a:srgbClr val="FF0000"/>
+                </a:solidFill>
+              </a:rPr>
+              <a:t> em </a:t>
+            </a:r>
+            <a:r>
+              <a:rPr lang="pt-BR" sz="1600" b="1" dirty="0" err="1" smtClean="0">
+                <a:solidFill>
+                  <a:srgbClr val="FF0000"/>
+                </a:solidFill>
+              </a:rPr>
+              <a:t>seg</a:t>
+            </a:r>
+            <a:r>
+              <a:rPr lang="pt-BR" sz="1600" b="1" dirty="0" smtClean="0">
+                <a:solidFill>
+                  <a:srgbClr val="FF0000"/>
+                </a:solidFill>
+              </a:rPr>
+              <a:t> </a:t>
+            </a:r>
+            <a:r>
               <a:rPr lang="pt-BR" sz="1600" b="1" dirty="0">
                 <a:solidFill>
                   <a:srgbClr val="FF0000"/>
                 </a:solidFill>
               </a:rPr>
-              <a:t>	Para o Teste de Mesa</a:t>
-            </a:r>
+              <a:t>= </a:t>
+            </a:r>
+            <a:r>
+              <a:rPr lang="pt-BR" sz="1600" b="1" dirty="0" smtClean="0">
+                <a:solidFill>
+                  <a:srgbClr val="FF0000"/>
+                </a:solidFill>
+              </a:rPr>
+              <a:t>4.38 * 3600 = 15768 segundos</a:t>
+            </a:r>
+            <a:endParaRPr lang="pt-BR" sz="1600" b="1" dirty="0">
+              <a:solidFill>
+                <a:srgbClr val="FF0000"/>
+              </a:solidFill>
+            </a:endParaRPr>
           </a:p>
           <a:p>
             <a:pPr marL="0" indent="0">
@@ -11139,7 +11178,15 @@
                   <a:srgbClr val="FF0000"/>
                 </a:solidFill>
               </a:rPr>
-              <a:t>	3h40 = 3.67</a:t>
+              <a:t>	</a:t>
+            </a:r>
+            <a:r>
+              <a:rPr lang="pt-BR" sz="1600" b="1" dirty="0" smtClean="0">
+                <a:solidFill>
+                  <a:srgbClr val="FF0000"/>
+                </a:solidFill>
+              </a:rPr>
+              <a:t>Teste de mesa</a:t>
             </a:r>
           </a:p>
           <a:p>
@@ -11150,12 +11197,97 @@
               <a:buNone/>
             </a:pPr>
             <a:r>
+              <a:rPr lang="pt-BR" sz="1600" b="1" dirty="0" smtClean="0">
+                <a:solidFill>
+                  <a:srgbClr val="FF0000"/>
+                </a:solidFill>
+              </a:rPr>
+              <a:t>		3h40 </a:t>
+            </a:r>
+            <a:r>
               <a:rPr lang="pt-BR" sz="1600" b="1" dirty="0">
                 <a:solidFill>
                   <a:srgbClr val="FF0000"/>
                 </a:solidFill>
               </a:rPr>
-              <a:t>	1h32 = 1.52</a:t>
+              <a:t>= </a:t>
+            </a:r>
+            <a:r>
+              <a:rPr lang="pt-BR" sz="1600" b="1" dirty="0">
+                <a:solidFill>
+                  <a:srgbClr val="FF0000"/>
+                </a:solidFill>
+              </a:rPr>
+              <a:t>3.67 =&gt; </a:t>
+            </a:r>
+            <a:r>
+              <a:rPr lang="pt-BR" sz="1600" b="1" dirty="0" smtClean="0">
+                <a:solidFill>
+                  <a:srgbClr val="FF0000"/>
+                </a:solidFill>
+              </a:rPr>
+              <a:t>13.212 segundos</a:t>
+            </a:r>
+            <a:endParaRPr lang="pt-BR" sz="1600" b="1" dirty="0">
+              <a:solidFill>
+                <a:srgbClr val="FF0000"/>
+              </a:solidFill>
+            </a:endParaRPr>
+          </a:p>
+          <a:p>
+            <a:pPr marL="0" indent="0">
+              <a:lnSpc>
+                <a:spcPct val="150000"/>
+              </a:lnSpc>
+              <a:buNone/>
+            </a:pPr>
+            <a:r>
+              <a:rPr lang="pt-BR" sz="1600" b="1" dirty="0">
+                <a:solidFill>
+                  <a:srgbClr val="FF0000"/>
+                </a:solidFill>
+              </a:rPr>
+              <a:t>	</a:t>
+            </a:r>
+            <a:r>
+              <a:rPr lang="pt-BR" sz="1600" b="1" dirty="0" smtClean="0">
+                <a:solidFill>
+                  <a:srgbClr val="FF0000"/>
+                </a:solidFill>
+              </a:rPr>
+              <a:t>	1h32 </a:t>
+            </a:r>
+            <a:r>
+              <a:rPr lang="pt-BR" sz="1600" b="1" dirty="0">
+                <a:solidFill>
+                  <a:srgbClr val="FF0000"/>
+                </a:solidFill>
+              </a:rPr>
+              <a:t>= </a:t>
+            </a:r>
+            <a:r>
+              <a:rPr lang="pt-BR" sz="1600" b="1" dirty="0" smtClean="0">
+                <a:solidFill>
+                  <a:srgbClr val="FF0000"/>
+                </a:solidFill>
+              </a:rPr>
+              <a:t>1.52 </a:t>
+            </a:r>
+            <a:r>
+              <a:rPr lang="pt-BR" sz="1600" b="1" dirty="0">
+                <a:solidFill>
+                  <a:srgbClr val="FF0000"/>
+                </a:solidFill>
+              </a:rPr>
+              <a:t>=&gt; </a:t>
+            </a:r>
+            <a:r>
+              <a:rPr lang="pt-BR" sz="1600" b="1" smtClean="0">
+                <a:solidFill>
+                  <a:srgbClr val="FF0000"/>
+                </a:solidFill>
+              </a:rPr>
+              <a:t>5.472 segundos</a:t>
             </a:r>
             <a:endParaRPr lang="pt-BR" sz="1600" b="1" dirty="0">
               <a:solidFill>
@@ -11218,7 +11350,7 @@
                 <a16:creationId xmlns:a16="http://schemas.microsoft.com/office/drawing/2014/main" id="{F1E0D4A3-ECB8-4689-ABDB-9CE848CE83B9}"/>
               </a:ext>
               <a:ext uri="{C183D7F6-B498-43B3-948B-1728B52AA6E4}">
-                <adec:decorative xmlns:adec="http://schemas.microsoft.com/office/drawing/2017/decorative" xmlns="" val="1"/>
+                <adec:decorative xmlns="" xmlns:adec="http://schemas.microsoft.com/office/drawing/2017/decorative" val="1"/>
               </a:ext>
             </a:extLst>
           </p:cNvPr>
@@ -11318,7 +11450,7 @@
                 <a16:creationId xmlns:a16="http://schemas.microsoft.com/office/drawing/2014/main" id="{8854772B-9C8F-4037-89E0-3A45208AB395}"/>
               </a:ext>
               <a:ext uri="{C183D7F6-B498-43B3-948B-1728B52AA6E4}">
-                <adec:decorative xmlns:adec="http://schemas.microsoft.com/office/drawing/2017/decorative" xmlns="" val="1"/>
+                <adec:decorative xmlns="" xmlns:adec="http://schemas.microsoft.com/office/drawing/2017/decorative" val="1"/>
               </a:ext>
             </a:extLst>
           </p:cNvPr>
@@ -11578,11 +11710,7 @@
             </a:pPr>
             <a:r>
               <a:rPr lang="pt-BR" sz="1600" b="1" dirty="0"/>
-              <a:t>6) </a:t>
-            </a:r>
-            <a:r>
-              <a:rPr lang="pt-BR" sz="1600" b="1" dirty="0"/>
-              <a:t>Continuando do exercício anterior, um funcionário trabalha em determinada empresa e quer saber quanto irá ganhar de hora extra. Você deverá fazer um algoritmo que solicite quantas horas e quantos minutos ele trabalhou, solicite horas e minutos de forma separada. Depois pergunte quanto ele ganha por hora e informe quanto ele irá ganhar. Sabendo que nessa empresa o funcionário ganha 70% a mais pelas horas trabalhadas.</a:t>
+              <a:t>6) Continuando do exercício anterior, um funcionário trabalha em determinada empresa e quer saber quanto irá ganhar de hora extra. Você deverá fazer um algoritmo que solicite quantas horas e quantos minutos ele trabalhou, solicite horas e minutos de forma separada. Depois pergunte quanto ele ganha por hora e informe quanto ele irá ganhar. Sabendo que nessa empresa o funcionário ganha 70% a mais pelas horas trabalhadas.</a:t>
             </a:r>
           </a:p>
           <a:p>
@@ -11648,11 +11776,6 @@
               </a:rPr>
               <a:t>Outro teste de mesa: Se trabalhei 20h, devo ganhar R$ 850,00</a:t>
             </a:r>
-            <a:endParaRPr lang="pt-BR" sz="1600" b="1" dirty="0">
-              <a:solidFill>
-                <a:srgbClr val="FF0000"/>
-              </a:solidFill>
-            </a:endParaRPr>
           </a:p>
         </p:txBody>
       </p:sp>
@@ -11709,7 +11832,7 @@
                 <a16:creationId xmlns:a16="http://schemas.microsoft.com/office/drawing/2014/main" id="{F1E0D4A3-ECB8-4689-ABDB-9CE848CE83B9}"/>
               </a:ext>
               <a:ext uri="{C183D7F6-B498-43B3-948B-1728B52AA6E4}">
-                <adec:decorative xmlns:adec="http://schemas.microsoft.com/office/drawing/2017/decorative" xmlns="" val="1"/>
+                <adec:decorative xmlns="" xmlns:adec="http://schemas.microsoft.com/office/drawing/2017/decorative" val="1"/>
               </a:ext>
             </a:extLst>
           </p:cNvPr>
@@ -11809,7 +11932,7 @@
                 <a16:creationId xmlns:a16="http://schemas.microsoft.com/office/drawing/2014/main" id="{8854772B-9C8F-4037-89E0-3A45208AB395}"/>
               </a:ext>
               <a:ext uri="{C183D7F6-B498-43B3-948B-1728B52AA6E4}">
-                <adec:decorative xmlns:adec="http://schemas.microsoft.com/office/drawing/2017/decorative" xmlns="" val="1"/>
+                <adec:decorative xmlns="" xmlns:adec="http://schemas.microsoft.com/office/drawing/2017/decorative" val="1"/>
               </a:ext>
             </a:extLst>
           </p:cNvPr>
@@ -12069,11 +12192,7 @@
             </a:pPr>
             <a:r>
               <a:rPr lang="pt-BR" sz="1600" b="1" dirty="0"/>
-              <a:t>7) </a:t>
-            </a:r>
-            <a:r>
-              <a:rPr lang="pt-BR" sz="1600" b="1" dirty="0"/>
-              <a:t>Faça um algoritmo que calcule quanto o usuário irá gastar de gasolina em uma viagem, solicitando os seguinte dados:</a:t>
+              <a:t>7) Faça um algoritmo que calcule quanto o usuário irá gastar de gasolina em uma viagem, solicitando os seguinte dados:</a:t>
             </a:r>
           </a:p>
           <a:p>
@@ -12155,11 +12274,6 @@
               </a:rPr>
               <a:t>Ao final o sistema deverá responder ao usuário nesse caso que ele gastará em média: R$ 202,00 para ida ou R$ 404,00 para ida e volta.</a:t>
             </a:r>
-            <a:endParaRPr lang="pt-BR" sz="1600" b="1" dirty="0">
-              <a:solidFill>
-                <a:srgbClr val="FF0000"/>
-              </a:solidFill>
-            </a:endParaRPr>
           </a:p>
         </p:txBody>
       </p:sp>
@@ -12216,7 +12330,7 @@
                 <a16:creationId xmlns:a16="http://schemas.microsoft.com/office/drawing/2014/main" id="{F1E0D4A3-ECB8-4689-ABDB-9CE848CE83B9}"/>
               </a:ext>
               <a:ext uri="{C183D7F6-B498-43B3-948B-1728B52AA6E4}">
-                <adec:decorative xmlns:adec="http://schemas.microsoft.com/office/drawing/2017/decorative" xmlns="" val="1"/>
+                <adec:decorative xmlns="" xmlns:adec="http://schemas.microsoft.com/office/drawing/2017/decorative" val="1"/>
               </a:ext>
             </a:extLst>
           </p:cNvPr>
@@ -12316,7 +12430,7 @@
                 <a16:creationId xmlns:a16="http://schemas.microsoft.com/office/drawing/2014/main" id="{8854772B-9C8F-4037-89E0-3A45208AB395}"/>
               </a:ext>
               <a:ext uri="{C183D7F6-B498-43B3-948B-1728B52AA6E4}">
-                <adec:decorative xmlns:adec="http://schemas.microsoft.com/office/drawing/2017/decorative" xmlns="" val="1"/>
+                <adec:decorative xmlns="" xmlns:adec="http://schemas.microsoft.com/office/drawing/2017/decorative" val="1"/>
               </a:ext>
             </a:extLst>
           </p:cNvPr>
@@ -12659,11 +12773,6 @@
               </a:rPr>
               <a:t>Neste caso o exercício irá parar por aqui no entanto o assunto das próximas aulas incluirão operadores relacionais, lógicos e condições onde iremos calcular o valor da multa.</a:t>
             </a:r>
-            <a:endParaRPr lang="pt-BR" dirty="0">
-              <a:solidFill>
-                <a:srgbClr val="FF0000"/>
-              </a:solidFill>
-            </a:endParaRPr>
           </a:p>
         </p:txBody>
       </p:sp>
@@ -12720,7 +12829,7 @@
                 <a16:creationId xmlns:a16="http://schemas.microsoft.com/office/drawing/2014/main" id="{F1E0D4A3-ECB8-4689-ABDB-9CE848CE83B9}"/>
               </a:ext>
               <a:ext uri="{C183D7F6-B498-43B3-948B-1728B52AA6E4}">
-                <adec:decorative xmlns:adec="http://schemas.microsoft.com/office/drawing/2017/decorative" xmlns="" val="1"/>
+                <adec:decorative xmlns="" xmlns:adec="http://schemas.microsoft.com/office/drawing/2017/decorative" val="1"/>
               </a:ext>
             </a:extLst>
           </p:cNvPr>
@@ -12820,7 +12929,7 @@
                 <a16:creationId xmlns:a16="http://schemas.microsoft.com/office/drawing/2014/main" id="{8854772B-9C8F-4037-89E0-3A45208AB395}"/>
               </a:ext>
               <a:ext uri="{C183D7F6-B498-43B3-948B-1728B52AA6E4}">
-                <adec:decorative xmlns:adec="http://schemas.microsoft.com/office/drawing/2017/decorative" xmlns="" val="1"/>
+                <adec:decorative xmlns="" xmlns:adec="http://schemas.microsoft.com/office/drawing/2017/decorative" val="1"/>
               </a:ext>
             </a:extLst>
           </p:cNvPr>
@@ -13104,11 +13213,6 @@
               </a:rPr>
               <a:t>Faça os Fluxogramas de cada Exercício.</a:t>
             </a:r>
-            <a:endParaRPr lang="pt-BR" sz="4400" b="1" dirty="0">
-              <a:solidFill>
-                <a:srgbClr val="FF0000"/>
-              </a:solidFill>
-            </a:endParaRPr>
           </a:p>
         </p:txBody>
       </p:sp>

</xml_diff>